<commit_message>
Add table in databases. Fix bugs
</commit_message>
<xml_diff>
--- a/Спецкурс. Презентация.pptx
+++ b/Спецкурс. Презентация.pptx
@@ -14,7 +14,12 @@
     <p:sldId id="262" r:id="rId8"/>
     <p:sldId id="263" r:id="rId9"/>
     <p:sldId id="264" r:id="rId10"/>
-    <p:sldId id="265" r:id="rId11"/>
+    <p:sldId id="266" r:id="rId11"/>
+    <p:sldId id="268" r:id="rId12"/>
+    <p:sldId id="267" r:id="rId13"/>
+    <p:sldId id="269" r:id="rId14"/>
+    <p:sldId id="265" r:id="rId15"/>
+    <p:sldId id="270" r:id="rId16"/>
   </p:sldIdLst>
   <p:sldSz cx="9144000" cy="6858000" type="screen4x3"/>
   <p:notesSz cx="6858000" cy="9144000"/>
@@ -113,6 +118,22 @@
       </a:defRPr>
     </a:lvl9pPr>
   </p:defaultTextStyle>
+  <p:extLst>
+    <p:ext uri="{EFAFB233-063F-42B5-8137-9DF3F51BA10A}">
+      <p15:sldGuideLst xmlns:p15="http://schemas.microsoft.com/office/powerpoint/2012/main">
+        <p15:guide id="1" orient="horz" pos="2160">
+          <p15:clr>
+            <a:srgbClr val="A4A3A4"/>
+          </p15:clr>
+        </p15:guide>
+        <p15:guide id="2" pos="2880">
+          <p15:clr>
+            <a:srgbClr val="A4A3A4"/>
+          </p15:clr>
+        </p15:guide>
+      </p15:sldGuideLst>
+    </p:ext>
+  </p:extLst>
 </p:presentation>
 </file>
 
@@ -5107,6 +5128,532 @@
           <a:p>
             <a:r>
               <a:rPr lang="ru-RU" dirty="0" smtClean="0"/>
+              <a:t>Козлова Виталия</a:t>
+            </a:r>
+            <a:endParaRPr lang="ru-RU" dirty="0"/>
+          </a:p>
+        </p:txBody>
+      </p:sp>
+      <p:sp>
+        <p:nvSpPr>
+          <p:cNvPr id="3" name="Объект 2"/>
+          <p:cNvSpPr>
+            <a:spLocks noGrp="1"/>
+          </p:cNvSpPr>
+          <p:nvPr>
+            <p:ph sz="quarter" idx="1"/>
+          </p:nvPr>
+        </p:nvSpPr>
+        <p:spPr/>
+        <p:txBody>
+          <a:bodyPr/>
+          <a:lstStyle/>
+          <a:p>
+            <a:pPr marL="0" indent="0">
+              <a:buNone/>
+            </a:pPr>
+            <a:r>
+              <a:rPr lang="en-US" b="1" u="sng" dirty="0"/>
+              <a:t>User Story</a:t>
+            </a:r>
+            <a:r>
+              <a:rPr lang="ru-RU" dirty="0"/>
+              <a:t>:  удаление клиента.</a:t>
+            </a:r>
+          </a:p>
+          <a:p>
+            <a:pPr marL="0" indent="0">
+              <a:buNone/>
+            </a:pPr>
+            <a:r>
+              <a:rPr lang="ru-RU" dirty="0"/>
+              <a:t> </a:t>
+            </a:r>
+          </a:p>
+          <a:p>
+            <a:pPr marL="0" indent="0">
+              <a:buNone/>
+            </a:pPr>
+            <a:r>
+              <a:rPr lang="ru-RU" dirty="0"/>
+              <a:t>Команды:</a:t>
+            </a:r>
+          </a:p>
+          <a:p>
+            <a:r>
+              <a:rPr lang="ru-RU" dirty="0"/>
+              <a:t>- войти под ролью администратора</a:t>
+            </a:r>
+          </a:p>
+          <a:p>
+            <a:r>
+              <a:rPr lang="ru-RU" dirty="0"/>
+              <a:t>- выбрать операцию удаления клиента</a:t>
+            </a:r>
+          </a:p>
+          <a:p>
+            <a:r>
+              <a:rPr lang="ru-RU" dirty="0"/>
+              <a:t>- ввести </a:t>
+            </a:r>
+            <a:r>
+              <a:rPr lang="en-US" dirty="0"/>
+              <a:t>id </a:t>
+            </a:r>
+            <a:r>
+              <a:rPr lang="ru-RU" dirty="0"/>
+              <a:t>клиента </a:t>
+            </a:r>
+          </a:p>
+          <a:p>
+            <a:pPr marL="0" indent="0">
+              <a:buNone/>
+            </a:pPr>
+            <a:r>
+              <a:rPr lang="ru-RU" dirty="0"/>
+              <a:t>В случае корректного </a:t>
+            </a:r>
+            <a:r>
+              <a:rPr lang="en-US" dirty="0"/>
+              <a:t>id </a:t>
+            </a:r>
+            <a:r>
+              <a:rPr lang="ru-RU" dirty="0"/>
+              <a:t>клиента операция будет осуществлена. Иначе система выдаст сообщение об ошибке</a:t>
+            </a:r>
+            <a:r>
+              <a:rPr lang="ru-RU" dirty="0" smtClean="0"/>
+              <a:t>. Так как удаление осуществляется из двух таблиц используется механизм транзакции</a:t>
+            </a:r>
+            <a:endParaRPr lang="ru-RU" dirty="0"/>
+          </a:p>
+          <a:p>
+            <a:endParaRPr lang="ru-RU" dirty="0"/>
+          </a:p>
+        </p:txBody>
+      </p:sp>
+    </p:spTree>
+    <p:extLst>
+      <p:ext uri="{BB962C8B-B14F-4D97-AF65-F5344CB8AC3E}">
+        <p14:creationId xmlns:p14="http://schemas.microsoft.com/office/powerpoint/2010/main" val="3944070701"/>
+      </p:ext>
+    </p:extLst>
+  </p:cSld>
+  <p:clrMapOvr>
+    <a:masterClrMapping/>
+  </p:clrMapOvr>
+</p:sld>
+</file>
+
+<file path=ppt/slides/slide11.xml><?xml version="1.0" encoding="utf-8"?>
+<p:sld xmlns:a="http://schemas.openxmlformats.org/drawingml/2006/main" xmlns:r="http://schemas.openxmlformats.org/officeDocument/2006/relationships" xmlns:p="http://schemas.openxmlformats.org/presentationml/2006/main">
+  <p:cSld>
+    <p:spTree>
+      <p:nvGrpSpPr>
+        <p:cNvPr id="1" name=""/>
+        <p:cNvGrpSpPr/>
+        <p:nvPr/>
+      </p:nvGrpSpPr>
+      <p:grpSpPr>
+        <a:xfrm>
+          <a:off x="0" y="0"/>
+          <a:ext cx="0" cy="0"/>
+          <a:chOff x="0" y="0"/>
+          <a:chExt cx="0" cy="0"/>
+        </a:xfrm>
+      </p:grpSpPr>
+      <p:sp>
+        <p:nvSpPr>
+          <p:cNvPr id="2" name="Заголовок 1"/>
+          <p:cNvSpPr>
+            <a:spLocks noGrp="1"/>
+          </p:cNvSpPr>
+          <p:nvPr>
+            <p:ph type="title"/>
+          </p:nvPr>
+        </p:nvSpPr>
+        <p:spPr/>
+        <p:txBody>
+          <a:bodyPr/>
+          <a:lstStyle/>
+          <a:p>
+            <a:r>
+              <a:rPr lang="ru-RU" dirty="0" smtClean="0"/>
+              <a:t>Козлова Виталия</a:t>
+            </a:r>
+            <a:endParaRPr lang="ru-RU" dirty="0"/>
+          </a:p>
+        </p:txBody>
+      </p:sp>
+      <p:sp>
+        <p:nvSpPr>
+          <p:cNvPr id="3" name="Объект 2"/>
+          <p:cNvSpPr>
+            <a:spLocks noGrp="1"/>
+          </p:cNvSpPr>
+          <p:nvPr>
+            <p:ph sz="quarter" idx="1"/>
+          </p:nvPr>
+        </p:nvSpPr>
+        <p:spPr/>
+        <p:txBody>
+          <a:bodyPr/>
+          <a:lstStyle/>
+          <a:p>
+            <a:pPr marL="0" indent="0">
+              <a:buNone/>
+            </a:pPr>
+            <a:r>
+              <a:rPr lang="en-US" b="1" u="sng" dirty="0"/>
+              <a:t>User Story</a:t>
+            </a:r>
+            <a:r>
+              <a:rPr lang="ru-RU" dirty="0"/>
+              <a:t>: вывод списка всех удалённых клиентов.</a:t>
+            </a:r>
+          </a:p>
+          <a:p>
+            <a:pPr marL="0" indent="0">
+              <a:buNone/>
+            </a:pPr>
+            <a:r>
+              <a:rPr lang="ru-RU" dirty="0"/>
+              <a:t> </a:t>
+            </a:r>
+          </a:p>
+          <a:p>
+            <a:r>
+              <a:rPr lang="ru-RU" dirty="0"/>
+              <a:t>Команды:</a:t>
+            </a:r>
+          </a:p>
+          <a:p>
+            <a:r>
+              <a:rPr lang="ru-RU" dirty="0"/>
+              <a:t>- войти под ролью администратора</a:t>
+            </a:r>
+          </a:p>
+          <a:p>
+            <a:r>
+              <a:rPr lang="ru-RU" dirty="0"/>
+              <a:t>- выбрать операцию, позволяющую просмотреть список удалённых клиентов </a:t>
+            </a:r>
+          </a:p>
+          <a:p>
+            <a:endParaRPr lang="ru-RU" dirty="0"/>
+          </a:p>
+        </p:txBody>
+      </p:sp>
+    </p:spTree>
+    <p:extLst>
+      <p:ext uri="{BB962C8B-B14F-4D97-AF65-F5344CB8AC3E}">
+        <p14:creationId xmlns:p14="http://schemas.microsoft.com/office/powerpoint/2010/main" val="3372548797"/>
+      </p:ext>
+    </p:extLst>
+  </p:cSld>
+  <p:clrMapOvr>
+    <a:masterClrMapping/>
+  </p:clrMapOvr>
+</p:sld>
+</file>
+
+<file path=ppt/slides/slide12.xml><?xml version="1.0" encoding="utf-8"?>
+<p:sld xmlns:a="http://schemas.openxmlformats.org/drawingml/2006/main" xmlns:r="http://schemas.openxmlformats.org/officeDocument/2006/relationships" xmlns:p="http://schemas.openxmlformats.org/presentationml/2006/main">
+  <p:cSld>
+    <p:spTree>
+      <p:nvGrpSpPr>
+        <p:cNvPr id="1" name=""/>
+        <p:cNvGrpSpPr/>
+        <p:nvPr/>
+      </p:nvGrpSpPr>
+      <p:grpSpPr>
+        <a:xfrm>
+          <a:off x="0" y="0"/>
+          <a:ext cx="0" cy="0"/>
+          <a:chOff x="0" y="0"/>
+          <a:chExt cx="0" cy="0"/>
+        </a:xfrm>
+      </p:grpSpPr>
+      <p:sp>
+        <p:nvSpPr>
+          <p:cNvPr id="2" name="Заголовок 1"/>
+          <p:cNvSpPr>
+            <a:spLocks noGrp="1"/>
+          </p:cNvSpPr>
+          <p:nvPr>
+            <p:ph type="title"/>
+          </p:nvPr>
+        </p:nvSpPr>
+        <p:spPr/>
+        <p:txBody>
+          <a:bodyPr/>
+          <a:lstStyle/>
+          <a:p>
+            <a:r>
+              <a:rPr lang="ru-RU" dirty="0" err="1" smtClean="0"/>
+              <a:t>Барашко</a:t>
+            </a:r>
+            <a:r>
+              <a:rPr lang="ru-RU" dirty="0" smtClean="0"/>
+              <a:t> Мария</a:t>
+            </a:r>
+            <a:endParaRPr lang="ru-RU" dirty="0"/>
+          </a:p>
+        </p:txBody>
+      </p:sp>
+      <p:sp>
+        <p:nvSpPr>
+          <p:cNvPr id="3" name="Объект 2"/>
+          <p:cNvSpPr>
+            <a:spLocks noGrp="1"/>
+          </p:cNvSpPr>
+          <p:nvPr>
+            <p:ph sz="quarter" idx="1"/>
+          </p:nvPr>
+        </p:nvSpPr>
+        <p:spPr/>
+        <p:txBody>
+          <a:bodyPr>
+            <a:normAutofit/>
+          </a:bodyPr>
+          <a:lstStyle/>
+          <a:p>
+            <a:pPr marL="0" indent="0">
+              <a:buNone/>
+            </a:pPr>
+            <a:r>
+              <a:rPr lang="en-US" b="1" u="sng" dirty="0"/>
+              <a:t>User Story</a:t>
+            </a:r>
+            <a:r>
+              <a:rPr lang="ru-RU" dirty="0"/>
+              <a:t>: создание клиента.</a:t>
+            </a:r>
+          </a:p>
+          <a:p>
+            <a:pPr marL="0" indent="0">
+              <a:buNone/>
+            </a:pPr>
+            <a:r>
+              <a:rPr lang="ru-RU" dirty="0"/>
+              <a:t> </a:t>
+            </a:r>
+          </a:p>
+          <a:p>
+            <a:pPr marL="0" indent="0">
+              <a:buNone/>
+            </a:pPr>
+            <a:r>
+              <a:rPr lang="ru-RU" dirty="0"/>
+              <a:t>Команды:</a:t>
+            </a:r>
+          </a:p>
+          <a:p>
+            <a:r>
+              <a:rPr lang="ru-RU" dirty="0"/>
+              <a:t>- войти под ролью администратора</a:t>
+            </a:r>
+          </a:p>
+          <a:p>
+            <a:r>
+              <a:rPr lang="ru-RU" dirty="0"/>
+              <a:t>- выбрать операцию создания клиента</a:t>
+            </a:r>
+          </a:p>
+          <a:p>
+            <a:r>
+              <a:rPr lang="ru-RU" dirty="0"/>
+              <a:t>- ввести имя клиента</a:t>
+            </a:r>
+          </a:p>
+          <a:p>
+            <a:r>
+              <a:rPr lang="ru-RU" dirty="0"/>
+              <a:t>- ввести фамилию клиента</a:t>
+            </a:r>
+          </a:p>
+          <a:p>
+            <a:pPr marL="0" indent="0">
+              <a:buNone/>
+            </a:pPr>
+            <a:r>
+              <a:rPr lang="ru-RU" dirty="0"/>
+              <a:t>В случае корректного ввода информации о клиенте, операция будет осуществлена. Иначе система выдаст сообщение об </a:t>
+            </a:r>
+            <a:r>
+              <a:rPr lang="ru-RU" dirty="0" smtClean="0"/>
+              <a:t>ошибке</a:t>
+            </a:r>
+            <a:endParaRPr lang="ru-RU" dirty="0"/>
+          </a:p>
+          <a:p>
+            <a:endParaRPr lang="ru-RU" dirty="0"/>
+          </a:p>
+        </p:txBody>
+      </p:sp>
+    </p:spTree>
+    <p:extLst>
+      <p:ext uri="{BB962C8B-B14F-4D97-AF65-F5344CB8AC3E}">
+        <p14:creationId xmlns:p14="http://schemas.microsoft.com/office/powerpoint/2010/main" val="2685493219"/>
+      </p:ext>
+    </p:extLst>
+  </p:cSld>
+  <p:clrMapOvr>
+    <a:masterClrMapping/>
+  </p:clrMapOvr>
+</p:sld>
+</file>
+
+<file path=ppt/slides/slide13.xml><?xml version="1.0" encoding="utf-8"?>
+<p:sld xmlns:a="http://schemas.openxmlformats.org/drawingml/2006/main" xmlns:r="http://schemas.openxmlformats.org/officeDocument/2006/relationships" xmlns:p="http://schemas.openxmlformats.org/presentationml/2006/main">
+  <p:cSld>
+    <p:spTree>
+      <p:nvGrpSpPr>
+        <p:cNvPr id="1" name=""/>
+        <p:cNvGrpSpPr/>
+        <p:nvPr/>
+      </p:nvGrpSpPr>
+      <p:grpSpPr>
+        <a:xfrm>
+          <a:off x="0" y="0"/>
+          <a:ext cx="0" cy="0"/>
+          <a:chOff x="0" y="0"/>
+          <a:chExt cx="0" cy="0"/>
+        </a:xfrm>
+      </p:grpSpPr>
+      <p:sp>
+        <p:nvSpPr>
+          <p:cNvPr id="2" name="Заголовок 1"/>
+          <p:cNvSpPr>
+            <a:spLocks noGrp="1"/>
+          </p:cNvSpPr>
+          <p:nvPr>
+            <p:ph type="title"/>
+          </p:nvPr>
+        </p:nvSpPr>
+        <p:spPr/>
+        <p:txBody>
+          <a:bodyPr/>
+          <a:lstStyle/>
+          <a:p>
+            <a:r>
+              <a:rPr lang="ru-RU" dirty="0" err="1" smtClean="0"/>
+              <a:t>Барашко</a:t>
+            </a:r>
+            <a:r>
+              <a:rPr lang="ru-RU" dirty="0" smtClean="0"/>
+              <a:t> Мария</a:t>
+            </a:r>
+            <a:endParaRPr lang="ru-RU" dirty="0"/>
+          </a:p>
+        </p:txBody>
+      </p:sp>
+      <p:sp>
+        <p:nvSpPr>
+          <p:cNvPr id="3" name="Объект 2"/>
+          <p:cNvSpPr>
+            <a:spLocks noGrp="1"/>
+          </p:cNvSpPr>
+          <p:nvPr>
+            <p:ph sz="quarter" idx="1"/>
+          </p:nvPr>
+        </p:nvSpPr>
+        <p:spPr/>
+        <p:txBody>
+          <a:bodyPr/>
+          <a:lstStyle/>
+          <a:p>
+            <a:pPr marL="0" indent="0">
+              <a:buNone/>
+            </a:pPr>
+            <a:r>
+              <a:rPr lang="en-US" b="1" u="sng" dirty="0"/>
+              <a:t>User Story</a:t>
+            </a:r>
+            <a:r>
+              <a:rPr lang="ru-RU" dirty="0"/>
+              <a:t>: вывод списка всех клиентов.</a:t>
+            </a:r>
+          </a:p>
+          <a:p>
+            <a:pPr marL="0" indent="0">
+              <a:buNone/>
+            </a:pPr>
+            <a:r>
+              <a:rPr lang="ru-RU" dirty="0"/>
+              <a:t> </a:t>
+            </a:r>
+          </a:p>
+          <a:p>
+            <a:r>
+              <a:rPr lang="ru-RU" dirty="0"/>
+              <a:t>Команды:</a:t>
+            </a:r>
+          </a:p>
+          <a:p>
+            <a:r>
+              <a:rPr lang="ru-RU" dirty="0"/>
+              <a:t>- войти под ролью администратора</a:t>
+            </a:r>
+          </a:p>
+          <a:p>
+            <a:r>
+              <a:rPr lang="ru-RU" dirty="0"/>
+              <a:t>- выбрать операцию, позволяющую просмотреть список всех клиентов </a:t>
+            </a:r>
+          </a:p>
+          <a:p>
+            <a:endParaRPr lang="ru-RU" dirty="0"/>
+          </a:p>
+        </p:txBody>
+      </p:sp>
+    </p:spTree>
+    <p:extLst>
+      <p:ext uri="{BB962C8B-B14F-4D97-AF65-F5344CB8AC3E}">
+        <p14:creationId xmlns:p14="http://schemas.microsoft.com/office/powerpoint/2010/main" val="2134299114"/>
+      </p:ext>
+    </p:extLst>
+  </p:cSld>
+  <p:clrMapOvr>
+    <a:masterClrMapping/>
+  </p:clrMapOvr>
+</p:sld>
+</file>
+
+<file path=ppt/slides/slide14.xml><?xml version="1.0" encoding="utf-8"?>
+<p:sld xmlns:a="http://schemas.openxmlformats.org/drawingml/2006/main" xmlns:r="http://schemas.openxmlformats.org/officeDocument/2006/relationships" xmlns:p="http://schemas.openxmlformats.org/presentationml/2006/main">
+  <p:cSld>
+    <p:spTree>
+      <p:nvGrpSpPr>
+        <p:cNvPr id="1" name=""/>
+        <p:cNvGrpSpPr/>
+        <p:nvPr/>
+      </p:nvGrpSpPr>
+      <p:grpSpPr>
+        <a:xfrm>
+          <a:off x="0" y="0"/>
+          <a:ext cx="0" cy="0"/>
+          <a:chOff x="0" y="0"/>
+          <a:chExt cx="0" cy="0"/>
+        </a:xfrm>
+      </p:grpSpPr>
+      <p:sp>
+        <p:nvSpPr>
+          <p:cNvPr id="2" name="Заголовок 1"/>
+          <p:cNvSpPr>
+            <a:spLocks noGrp="1"/>
+          </p:cNvSpPr>
+          <p:nvPr>
+            <p:ph type="title"/>
+          </p:nvPr>
+        </p:nvSpPr>
+        <p:spPr/>
+        <p:txBody>
+          <a:bodyPr/>
+          <a:lstStyle/>
+          <a:p>
+            <a:r>
+              <a:rPr lang="ru-RU" dirty="0" smtClean="0"/>
               <a:t>Вклад каждого студента</a:t>
             </a:r>
             <a:endParaRPr lang="ru-RU" dirty="0"/>
@@ -5281,6 +5828,142 @@
     <p:extLst>
       <p:ext uri="{BB962C8B-B14F-4D97-AF65-F5344CB8AC3E}">
         <p14:creationId xmlns:p14="http://schemas.microsoft.com/office/powerpoint/2010/main" val="2672678260"/>
+      </p:ext>
+    </p:extLst>
+  </p:cSld>
+  <p:clrMapOvr>
+    <a:masterClrMapping/>
+  </p:clrMapOvr>
+</p:sld>
+</file>
+
+<file path=ppt/slides/slide15.xml><?xml version="1.0" encoding="utf-8"?>
+<p:sld xmlns:a="http://schemas.openxmlformats.org/drawingml/2006/main" xmlns:r="http://schemas.openxmlformats.org/officeDocument/2006/relationships" xmlns:p="http://schemas.openxmlformats.org/presentationml/2006/main">
+  <p:cSld>
+    <p:spTree>
+      <p:nvGrpSpPr>
+        <p:cNvPr id="1" name=""/>
+        <p:cNvGrpSpPr/>
+        <p:nvPr/>
+      </p:nvGrpSpPr>
+      <p:grpSpPr>
+        <a:xfrm>
+          <a:off x="0" y="0"/>
+          <a:ext cx="0" cy="0"/>
+          <a:chOff x="0" y="0"/>
+          <a:chExt cx="0" cy="0"/>
+        </a:xfrm>
+      </p:grpSpPr>
+      <p:sp>
+        <p:nvSpPr>
+          <p:cNvPr id="2" name="Заголовок 1"/>
+          <p:cNvSpPr>
+            <a:spLocks noGrp="1"/>
+          </p:cNvSpPr>
+          <p:nvPr>
+            <p:ph type="title"/>
+          </p:nvPr>
+        </p:nvSpPr>
+        <p:spPr/>
+        <p:txBody>
+          <a:bodyPr/>
+          <a:lstStyle/>
+          <a:p>
+            <a:r>
+              <a:rPr lang="ru-RU" dirty="0"/>
+              <a:t>Вклад каждого студента</a:t>
+            </a:r>
+          </a:p>
+        </p:txBody>
+      </p:sp>
+      <p:sp>
+        <p:nvSpPr>
+          <p:cNvPr id="3" name="Объект 2"/>
+          <p:cNvSpPr>
+            <a:spLocks noGrp="1"/>
+          </p:cNvSpPr>
+          <p:nvPr>
+            <p:ph sz="quarter" idx="1"/>
+          </p:nvPr>
+        </p:nvSpPr>
+        <p:spPr/>
+        <p:txBody>
+          <a:bodyPr/>
+          <a:lstStyle/>
+          <a:p>
+            <a:pPr marL="0" indent="0">
+              <a:buNone/>
+            </a:pPr>
+            <a:r>
+              <a:rPr lang="ru-RU" b="1" dirty="0"/>
+              <a:t>Козлова Виталия:</a:t>
+            </a:r>
+          </a:p>
+          <a:p>
+            <a:r>
+              <a:rPr lang="ru-RU" dirty="0" smtClean="0"/>
+              <a:t>выполнение </a:t>
+            </a:r>
+            <a:r>
+              <a:rPr lang="en-US" dirty="0"/>
+              <a:t>User Story</a:t>
+            </a:r>
+            <a:endParaRPr lang="ru-RU" dirty="0"/>
+          </a:p>
+          <a:p>
+            <a:r>
+              <a:rPr lang="ru-RU" dirty="0" smtClean="0"/>
+              <a:t>добавление </a:t>
+            </a:r>
+            <a:r>
+              <a:rPr lang="ru-RU" dirty="0"/>
+              <a:t>таблицы в базу </a:t>
+            </a:r>
+            <a:r>
+              <a:rPr lang="ru-RU" dirty="0" smtClean="0"/>
+              <a:t>данных</a:t>
+            </a:r>
+            <a:endParaRPr lang="en-US" dirty="0" smtClean="0"/>
+          </a:p>
+          <a:p>
+            <a:r>
+              <a:rPr lang="ru-RU" dirty="0"/>
+              <a:t> </a:t>
+            </a:r>
+          </a:p>
+          <a:p>
+            <a:pPr marL="0" indent="0">
+              <a:buNone/>
+            </a:pPr>
+            <a:r>
+              <a:rPr lang="ru-RU" b="1" dirty="0" err="1"/>
+              <a:t>Барашко</a:t>
+            </a:r>
+            <a:r>
+              <a:rPr lang="ru-RU" b="1" dirty="0"/>
+              <a:t> Мария:</a:t>
+            </a:r>
+          </a:p>
+          <a:p>
+            <a:r>
+              <a:rPr lang="ru-RU" dirty="0" smtClean="0"/>
+              <a:t>выполнение </a:t>
+            </a:r>
+            <a:r>
+              <a:rPr lang="en-US" dirty="0"/>
+              <a:t>User Story</a:t>
+            </a:r>
+            <a:endParaRPr lang="ru-RU" dirty="0"/>
+          </a:p>
+          <a:p>
+            <a:endParaRPr lang="ru-RU" dirty="0"/>
+          </a:p>
+        </p:txBody>
+      </p:sp>
+    </p:spTree>
+    <p:extLst>
+      <p:ext uri="{BB962C8B-B14F-4D97-AF65-F5344CB8AC3E}">
+        <p14:creationId xmlns:p14="http://schemas.microsoft.com/office/powerpoint/2010/main" val="820586939"/>
       </p:ext>
     </p:extLst>
   </p:cSld>

</xml_diff>

<commit_message>
Add section 'ProgramCode' to presentation
</commit_message>
<xml_diff>
--- a/Спецкурс. Презентация.pptx
+++ b/Спецкурс. Презентация.pptx
@@ -15,6 +15,9 @@
     <p:sldId id="263" r:id="rId9"/>
     <p:sldId id="264" r:id="rId10"/>
     <p:sldId id="265" r:id="rId11"/>
+    <p:sldId id="266" r:id="rId12"/>
+    <p:sldId id="267" r:id="rId13"/>
+    <p:sldId id="268" r:id="rId14"/>
   </p:sldIdLst>
   <p:sldSz cx="9144000" cy="6858000" type="screen4x3"/>
   <p:notesSz cx="6858000" cy="9144000"/>
@@ -5070,6 +5073,13 @@
   <p:clrMapOvr>
     <a:masterClrMapping/>
   </p:clrMapOvr>
+  <p:timing>
+    <p:tnLst>
+      <p:par>
+        <p:cTn id="1" dur="indefinite" restart="never" nodeType="tmRoot"/>
+      </p:par>
+    </p:tnLst>
+  </p:timing>
 </p:sld>
 </file>
 
@@ -5287,6 +5297,944 @@
   <p:clrMapOvr>
     <a:masterClrMapping/>
   </p:clrMapOvr>
+  <p:timing>
+    <p:tnLst>
+      <p:par>
+        <p:cTn id="1" dur="indefinite" restart="never" nodeType="tmRoot"/>
+      </p:par>
+    </p:tnLst>
+  </p:timing>
+</p:sld>
+</file>
+
+<file path=ppt/slides/slide11.xml><?xml version="1.0" encoding="utf-8"?>
+<p:sld xmlns:a="http://schemas.openxmlformats.org/drawingml/2006/main" xmlns:r="http://schemas.openxmlformats.org/officeDocument/2006/relationships" xmlns:p="http://schemas.openxmlformats.org/presentationml/2006/main">
+  <p:cSld>
+    <p:spTree>
+      <p:nvGrpSpPr>
+        <p:cNvPr id="1" name=""/>
+        <p:cNvGrpSpPr/>
+        <p:nvPr/>
+      </p:nvGrpSpPr>
+      <p:grpSpPr>
+        <a:xfrm>
+          <a:off x="0" y="0"/>
+          <a:ext cx="0" cy="0"/>
+          <a:chOff x="0" y="0"/>
+          <a:chExt cx="0" cy="0"/>
+        </a:xfrm>
+      </p:grpSpPr>
+      <p:sp>
+        <p:nvSpPr>
+          <p:cNvPr id="2" name="Заголовок 1"/>
+          <p:cNvSpPr>
+            <a:spLocks noGrp="1"/>
+          </p:cNvSpPr>
+          <p:nvPr>
+            <p:ph type="title"/>
+          </p:nvPr>
+        </p:nvSpPr>
+        <p:spPr>
+          <a:xfrm>
+            <a:off x="899592" y="2204864"/>
+            <a:ext cx="7467600" cy="1143000"/>
+          </a:xfrm>
+        </p:spPr>
+        <p:txBody>
+          <a:bodyPr>
+            <a:noAutofit/>
+          </a:bodyPr>
+          <a:lstStyle/>
+          <a:p>
+            <a:pPr algn="ctr"/>
+            <a:r>
+              <a:rPr lang="ru-RU" sz="5400" b="1" dirty="0">
+                <a:solidFill>
+                  <a:schemeClr val="tx1"/>
+                </a:solidFill>
+              </a:rPr>
+              <a:t>Программный код</a:t>
+            </a:r>
+            <a:br>
+              <a:rPr lang="ru-RU" sz="5400" b="1" dirty="0">
+                <a:solidFill>
+                  <a:schemeClr val="tx1"/>
+                </a:solidFill>
+              </a:rPr>
+            </a:br>
+            <a:endParaRPr lang="ru-RU" sz="5400" b="1" dirty="0">
+              <a:solidFill>
+                <a:schemeClr val="tx1"/>
+              </a:solidFill>
+            </a:endParaRPr>
+          </a:p>
+        </p:txBody>
+      </p:sp>
+    </p:spTree>
+    <p:extLst>
+      <p:ext uri="{BB962C8B-B14F-4D97-AF65-F5344CB8AC3E}">
+        <p14:creationId xmlns:p14="http://schemas.microsoft.com/office/powerpoint/2010/main" val="1667233573"/>
+      </p:ext>
+    </p:extLst>
+  </p:cSld>
+  <p:clrMapOvr>
+    <a:masterClrMapping/>
+  </p:clrMapOvr>
+  <p:timing>
+    <p:tnLst>
+      <p:par>
+        <p:cTn id="1" dur="indefinite" restart="never" nodeType="tmRoot"/>
+      </p:par>
+    </p:tnLst>
+  </p:timing>
+</p:sld>
+</file>
+
+<file path=ppt/slides/slide12.xml><?xml version="1.0" encoding="utf-8"?>
+<p:sld xmlns:a="http://schemas.openxmlformats.org/drawingml/2006/main" xmlns:r="http://schemas.openxmlformats.org/officeDocument/2006/relationships" xmlns:p="http://schemas.openxmlformats.org/presentationml/2006/main">
+  <p:cSld>
+    <p:spTree>
+      <p:nvGrpSpPr>
+        <p:cNvPr id="1" name=""/>
+        <p:cNvGrpSpPr/>
+        <p:nvPr/>
+      </p:nvGrpSpPr>
+      <p:grpSpPr>
+        <a:xfrm>
+          <a:off x="0" y="0"/>
+          <a:ext cx="0" cy="0"/>
+          <a:chOff x="0" y="0"/>
+          <a:chExt cx="0" cy="0"/>
+        </a:xfrm>
+      </p:grpSpPr>
+      <p:sp>
+        <p:nvSpPr>
+          <p:cNvPr id="2" name="Заголовок 1"/>
+          <p:cNvSpPr>
+            <a:spLocks noGrp="1"/>
+          </p:cNvSpPr>
+          <p:nvPr>
+            <p:ph type="title"/>
+          </p:nvPr>
+        </p:nvSpPr>
+        <p:spPr>
+          <a:xfrm>
+            <a:off x="251520" y="188640"/>
+            <a:ext cx="7467600" cy="864096"/>
+          </a:xfrm>
+        </p:spPr>
+        <p:txBody>
+          <a:bodyPr>
+            <a:normAutofit/>
+          </a:bodyPr>
+          <a:lstStyle/>
+          <a:p>
+            <a:pPr algn="ctr"/>
+            <a:r>
+              <a:rPr lang="ru-RU" sz="2700" dirty="0" smtClean="0"/>
+              <a:t>Ирина </a:t>
+            </a:r>
+            <a:r>
+              <a:rPr lang="ru-RU" sz="2700" dirty="0" err="1" smtClean="0"/>
+              <a:t>Макарушко</a:t>
+            </a:r>
+            <a:r>
+              <a:rPr lang="ru-RU" dirty="0" smtClean="0"/>
+              <a:t/>
+            </a:r>
+            <a:br>
+              <a:rPr lang="ru-RU" dirty="0" smtClean="0"/>
+            </a:br>
+            <a:r>
+              <a:rPr lang="ru-RU" sz="2200" b="1" u="sng" dirty="0" smtClean="0">
+                <a:solidFill>
+                  <a:schemeClr val="tx1"/>
+                </a:solidFill>
+              </a:rPr>
+              <a:t>аутентификация и авторизация</a:t>
+            </a:r>
+            <a:endParaRPr lang="ru-RU" sz="2200" b="1" u="sng" dirty="0">
+              <a:solidFill>
+                <a:schemeClr val="tx1"/>
+              </a:solidFill>
+            </a:endParaRPr>
+          </a:p>
+        </p:txBody>
+      </p:sp>
+      <p:sp>
+        <p:nvSpPr>
+          <p:cNvPr id="3" name="Объект 2"/>
+          <p:cNvSpPr>
+            <a:spLocks noGrp="1"/>
+          </p:cNvSpPr>
+          <p:nvPr>
+            <p:ph sz="quarter" idx="1"/>
+          </p:nvPr>
+        </p:nvSpPr>
+        <p:spPr>
+          <a:xfrm>
+            <a:off x="467544" y="1052736"/>
+            <a:ext cx="7467600" cy="5565232"/>
+          </a:xfrm>
+        </p:spPr>
+        <p:txBody>
+          <a:bodyPr>
+            <a:normAutofit fontScale="62500" lnSpcReduction="20000"/>
+          </a:bodyPr>
+          <a:lstStyle/>
+          <a:p>
+            <a:pPr marL="0" indent="0">
+              <a:buNone/>
+            </a:pPr>
+            <a:r>
+              <a:rPr lang="en-US" dirty="0" smtClean="0"/>
+              <a:t>void </a:t>
+            </a:r>
+            <a:r>
+              <a:rPr lang="en-US" dirty="0"/>
+              <a:t>authentication(){</a:t>
+            </a:r>
+          </a:p>
+          <a:p>
+            <a:pPr marL="0" indent="0">
+              <a:buNone/>
+            </a:pPr>
+            <a:r>
+              <a:rPr lang="en-US" dirty="0"/>
+              <a:t>	connection();</a:t>
+            </a:r>
+          </a:p>
+          <a:p>
+            <a:pPr marL="0" indent="0">
+              <a:buNone/>
+            </a:pPr>
+            <a:r>
+              <a:rPr lang="en-US" dirty="0"/>
+              <a:t>	char *</a:t>
+            </a:r>
+            <a:r>
+              <a:rPr lang="en-US" dirty="0" err="1"/>
+              <a:t>zErrMsg</a:t>
+            </a:r>
+            <a:r>
+              <a:rPr lang="en-US" dirty="0"/>
+              <a:t> = 0;</a:t>
+            </a:r>
+          </a:p>
+          <a:p>
+            <a:pPr marL="0" indent="0">
+              <a:buNone/>
+            </a:pPr>
+            <a:r>
+              <a:rPr lang="en-US" dirty="0"/>
+              <a:t>	</a:t>
+            </a:r>
+            <a:r>
+              <a:rPr lang="en-US" dirty="0" err="1"/>
+              <a:t>const</a:t>
+            </a:r>
+            <a:r>
+              <a:rPr lang="en-US" dirty="0"/>
+              <a:t> char* data = "Callback function called\n";</a:t>
+            </a:r>
+          </a:p>
+          <a:p>
+            <a:pPr marL="0" indent="0">
+              <a:buNone/>
+            </a:pPr>
+            <a:r>
+              <a:rPr lang="en-US" dirty="0"/>
+              <a:t>	char login[20];</a:t>
+            </a:r>
+          </a:p>
+          <a:p>
+            <a:pPr marL="0" indent="0">
+              <a:buNone/>
+            </a:pPr>
+            <a:r>
+              <a:rPr lang="en-US" dirty="0"/>
+              <a:t>	char password[20];</a:t>
+            </a:r>
+          </a:p>
+          <a:p>
+            <a:pPr marL="0" indent="0">
+              <a:buNone/>
+            </a:pPr>
+            <a:r>
+              <a:rPr lang="en-US" dirty="0"/>
+              <a:t>	</a:t>
+            </a:r>
+            <a:r>
+              <a:rPr lang="en-US" dirty="0" err="1"/>
+              <a:t>printf</a:t>
+            </a:r>
+            <a:r>
+              <a:rPr lang="en-US" dirty="0"/>
+              <a:t>("Enter login: ");</a:t>
+            </a:r>
+          </a:p>
+          <a:p>
+            <a:pPr marL="0" indent="0">
+              <a:buNone/>
+            </a:pPr>
+            <a:r>
+              <a:rPr lang="en-US" dirty="0"/>
+              <a:t>	</a:t>
+            </a:r>
+            <a:r>
+              <a:rPr lang="en-US" dirty="0" err="1"/>
+              <a:t>scanf</a:t>
+            </a:r>
+            <a:r>
+              <a:rPr lang="en-US" dirty="0"/>
+              <a:t>("%s", login);</a:t>
+            </a:r>
+          </a:p>
+          <a:p>
+            <a:pPr marL="0" indent="0">
+              <a:buNone/>
+            </a:pPr>
+            <a:r>
+              <a:rPr lang="en-US" dirty="0"/>
+              <a:t>	</a:t>
+            </a:r>
+            <a:r>
+              <a:rPr lang="en-US" dirty="0" err="1"/>
+              <a:t>printf</a:t>
+            </a:r>
+            <a:r>
+              <a:rPr lang="en-US" dirty="0"/>
+              <a:t>("Enter password: ");</a:t>
+            </a:r>
+          </a:p>
+          <a:p>
+            <a:pPr marL="0" indent="0">
+              <a:buNone/>
+            </a:pPr>
+            <a:r>
+              <a:rPr lang="en-US" dirty="0"/>
+              <a:t>	</a:t>
+            </a:r>
+            <a:r>
+              <a:rPr lang="en-US" dirty="0" err="1"/>
+              <a:t>scanf</a:t>
+            </a:r>
+            <a:r>
+              <a:rPr lang="en-US" dirty="0"/>
+              <a:t>("%s", password);</a:t>
+            </a:r>
+          </a:p>
+          <a:p>
+            <a:pPr marL="0" indent="0">
+              <a:buNone/>
+            </a:pPr>
+            <a:r>
+              <a:rPr lang="en-US" dirty="0"/>
+              <a:t>	char buffer [100];</a:t>
+            </a:r>
+          </a:p>
+          <a:p>
+            <a:pPr marL="0" indent="0">
+              <a:buNone/>
+            </a:pPr>
+            <a:r>
+              <a:rPr lang="en-US" dirty="0"/>
+              <a:t>	</a:t>
+            </a:r>
+            <a:r>
+              <a:rPr lang="en-US" dirty="0" err="1"/>
+              <a:t>sprintf</a:t>
+            </a:r>
+            <a:r>
+              <a:rPr lang="en-US" dirty="0"/>
+              <a:t>(</a:t>
+            </a:r>
+            <a:r>
+              <a:rPr lang="en-US" dirty="0" err="1"/>
+              <a:t>buffer,"select</a:t>
+            </a:r>
+            <a:r>
+              <a:rPr lang="en-US" dirty="0"/>
+              <a:t> role from </a:t>
+            </a:r>
+            <a:r>
+              <a:rPr lang="en-US" dirty="0" err="1"/>
+              <a:t>bank_personal</a:t>
+            </a:r>
+            <a:r>
+              <a:rPr lang="en-US" dirty="0"/>
+              <a:t> where login='%s' and password='%</a:t>
+            </a:r>
+            <a:r>
+              <a:rPr lang="en-US" dirty="0" err="1"/>
+              <a:t>s'",login</a:t>
+            </a:r>
+            <a:r>
+              <a:rPr lang="en-US" dirty="0"/>
+              <a:t>, password);</a:t>
+            </a:r>
+          </a:p>
+          <a:p>
+            <a:pPr marL="0" indent="0">
+              <a:buNone/>
+            </a:pPr>
+            <a:r>
+              <a:rPr lang="en-US" dirty="0"/>
+              <a:t>	</a:t>
+            </a:r>
+            <a:r>
+              <a:rPr lang="en-US" dirty="0" err="1"/>
+              <a:t>int</a:t>
+            </a:r>
+            <a:r>
+              <a:rPr lang="en-US" dirty="0"/>
+              <a:t> </a:t>
+            </a:r>
+            <a:r>
+              <a:rPr lang="en-US" dirty="0" err="1"/>
+              <a:t>rc</a:t>
+            </a:r>
+            <a:r>
+              <a:rPr lang="en-US" dirty="0"/>
+              <a:t> = sqlite3_exec(</a:t>
+            </a:r>
+            <a:r>
+              <a:rPr lang="en-US" dirty="0" err="1"/>
+              <a:t>conn,buffer,authorization</a:t>
+            </a:r>
+            <a:r>
+              <a:rPr lang="en-US" dirty="0"/>
+              <a:t>, (void*)data, &amp;</a:t>
+            </a:r>
+            <a:r>
+              <a:rPr lang="en-US" dirty="0" err="1"/>
+              <a:t>zErrMsg</a:t>
+            </a:r>
+            <a:r>
+              <a:rPr lang="en-US" dirty="0"/>
+              <a:t>);</a:t>
+            </a:r>
+          </a:p>
+          <a:p>
+            <a:pPr marL="0" indent="0">
+              <a:buNone/>
+            </a:pPr>
+            <a:r>
+              <a:rPr lang="en-US" dirty="0"/>
+              <a:t>	if(</a:t>
+            </a:r>
+            <a:r>
+              <a:rPr lang="en-US" dirty="0" err="1"/>
+              <a:t>rc</a:t>
+            </a:r>
+            <a:r>
+              <a:rPr lang="en-US" dirty="0"/>
+              <a:t>){</a:t>
+            </a:r>
+          </a:p>
+          <a:p>
+            <a:pPr marL="0" indent="0">
+              <a:buNone/>
+            </a:pPr>
+            <a:r>
+              <a:rPr lang="en-US" dirty="0"/>
+              <a:t>		</a:t>
+            </a:r>
+            <a:r>
+              <a:rPr lang="en-US" dirty="0" err="1"/>
+              <a:t>printf</a:t>
+            </a:r>
+            <a:r>
+              <a:rPr lang="en-US" dirty="0"/>
+              <a:t>("Error");</a:t>
+            </a:r>
+          </a:p>
+          <a:p>
+            <a:pPr marL="0" indent="0">
+              <a:buNone/>
+            </a:pPr>
+            <a:r>
+              <a:rPr lang="en-US" dirty="0"/>
+              <a:t>		return ;</a:t>
+            </a:r>
+          </a:p>
+          <a:p>
+            <a:pPr marL="0" indent="0">
+              <a:buNone/>
+            </a:pPr>
+            <a:r>
+              <a:rPr lang="en-US" dirty="0"/>
+              <a:t>	}</a:t>
+            </a:r>
+          </a:p>
+          <a:p>
+            <a:pPr marL="0" indent="0">
+              <a:buNone/>
+            </a:pPr>
+            <a:r>
+              <a:rPr lang="en-US" dirty="0"/>
+              <a:t>	sqlite3_close(conn);</a:t>
+            </a:r>
+          </a:p>
+          <a:p>
+            <a:pPr marL="0" indent="0">
+              <a:buNone/>
+            </a:pPr>
+            <a:r>
+              <a:rPr lang="en-US" dirty="0"/>
+              <a:t>	</a:t>
+            </a:r>
+            <a:r>
+              <a:rPr lang="en-US" dirty="0" err="1"/>
+              <a:t>chooseOperations</a:t>
+            </a:r>
+            <a:r>
+              <a:rPr lang="en-US" dirty="0"/>
+              <a:t>();</a:t>
+            </a:r>
+          </a:p>
+          <a:p>
+            <a:pPr marL="0" indent="0">
+              <a:buNone/>
+            </a:pPr>
+            <a:r>
+              <a:rPr lang="en-US" dirty="0"/>
+              <a:t>}</a:t>
+            </a:r>
+            <a:endParaRPr lang="ru-RU" dirty="0"/>
+          </a:p>
+        </p:txBody>
+      </p:sp>
+    </p:spTree>
+    <p:extLst>
+      <p:ext uri="{BB962C8B-B14F-4D97-AF65-F5344CB8AC3E}">
+        <p14:creationId xmlns:p14="http://schemas.microsoft.com/office/powerpoint/2010/main" val="1420703785"/>
+      </p:ext>
+    </p:extLst>
+  </p:cSld>
+  <p:clrMapOvr>
+    <a:masterClrMapping/>
+  </p:clrMapOvr>
+  <p:timing>
+    <p:tnLst>
+      <p:par>
+        <p:cTn id="1" dur="indefinite" restart="never" nodeType="tmRoot"/>
+      </p:par>
+    </p:tnLst>
+  </p:timing>
+</p:sld>
+</file>
+
+<file path=ppt/slides/slide13.xml><?xml version="1.0" encoding="utf-8"?>
+<p:sld xmlns:a="http://schemas.openxmlformats.org/drawingml/2006/main" xmlns:r="http://schemas.openxmlformats.org/officeDocument/2006/relationships" xmlns:p="http://schemas.openxmlformats.org/presentationml/2006/main">
+  <p:cSld>
+    <p:spTree>
+      <p:nvGrpSpPr>
+        <p:cNvPr id="1" name=""/>
+        <p:cNvGrpSpPr/>
+        <p:nvPr/>
+      </p:nvGrpSpPr>
+      <p:grpSpPr>
+        <a:xfrm>
+          <a:off x="0" y="0"/>
+          <a:ext cx="0" cy="0"/>
+          <a:chOff x="0" y="0"/>
+          <a:chExt cx="0" cy="0"/>
+        </a:xfrm>
+      </p:grpSpPr>
+      <p:sp>
+        <p:nvSpPr>
+          <p:cNvPr id="3" name="Объект 2"/>
+          <p:cNvSpPr>
+            <a:spLocks noGrp="1"/>
+          </p:cNvSpPr>
+          <p:nvPr>
+            <p:ph sz="quarter" idx="1"/>
+          </p:nvPr>
+        </p:nvSpPr>
+        <p:spPr>
+          <a:xfrm>
+            <a:off x="467544" y="404664"/>
+            <a:ext cx="7467600" cy="6025880"/>
+          </a:xfrm>
+        </p:spPr>
+        <p:txBody>
+          <a:bodyPr>
+            <a:normAutofit fontScale="55000" lnSpcReduction="20000"/>
+          </a:bodyPr>
+          <a:lstStyle/>
+          <a:p>
+            <a:pPr marL="0" indent="0">
+              <a:buNone/>
+            </a:pPr>
+            <a:r>
+              <a:rPr lang="en-US" sz="2500" dirty="0"/>
+              <a:t>void </a:t>
+            </a:r>
+            <a:r>
+              <a:rPr lang="en-US" sz="2500" dirty="0" err="1"/>
+              <a:t>chooseOperations</a:t>
+            </a:r>
+            <a:r>
+              <a:rPr lang="en-US" sz="2500" dirty="0"/>
+              <a:t>(){</a:t>
+            </a:r>
+          </a:p>
+          <a:p>
+            <a:pPr marL="0" indent="0">
+              <a:buNone/>
+            </a:pPr>
+            <a:r>
+              <a:rPr lang="en-US" sz="2500" dirty="0"/>
+              <a:t>	switch(</a:t>
+            </a:r>
+            <a:r>
+              <a:rPr lang="en-US" sz="2500" dirty="0" err="1"/>
+              <a:t>roleIdentified</a:t>
+            </a:r>
+            <a:r>
+              <a:rPr lang="en-US" sz="2500" dirty="0"/>
+              <a:t>){</a:t>
+            </a:r>
+          </a:p>
+          <a:p>
+            <a:pPr marL="0" indent="0">
+              <a:buNone/>
+            </a:pPr>
+            <a:r>
+              <a:rPr lang="en-US" sz="2500" dirty="0"/>
+              <a:t>	case(ADMIN):</a:t>
+            </a:r>
+          </a:p>
+          <a:p>
+            <a:pPr marL="0" indent="0">
+              <a:buNone/>
+            </a:pPr>
+            <a:r>
+              <a:rPr lang="en-US" sz="2500" dirty="0"/>
+              <a:t>		</a:t>
+            </a:r>
+            <a:r>
+              <a:rPr lang="en-US" sz="2500" dirty="0" err="1"/>
+              <a:t>printf</a:t>
+            </a:r>
+            <a:r>
+              <a:rPr lang="en-US" sz="2500" dirty="0"/>
+              <a:t>("You are admin.\n");</a:t>
+            </a:r>
+          </a:p>
+          <a:p>
+            <a:pPr marL="0" indent="0">
+              <a:buNone/>
+            </a:pPr>
+            <a:r>
+              <a:rPr lang="en-US" sz="2500" dirty="0"/>
+              <a:t>		</a:t>
+            </a:r>
+            <a:r>
+              <a:rPr lang="en-US" sz="2500" dirty="0" err="1"/>
+              <a:t>adminActions</a:t>
+            </a:r>
+            <a:r>
+              <a:rPr lang="en-US" sz="2500" dirty="0"/>
+              <a:t>();</a:t>
+            </a:r>
+          </a:p>
+          <a:p>
+            <a:pPr marL="0" indent="0">
+              <a:buNone/>
+            </a:pPr>
+            <a:r>
+              <a:rPr lang="en-US" sz="2500" dirty="0"/>
+              <a:t>		break;</a:t>
+            </a:r>
+          </a:p>
+          <a:p>
+            <a:pPr marL="0" indent="0">
+              <a:buNone/>
+            </a:pPr>
+            <a:r>
+              <a:rPr lang="en-US" sz="2500" dirty="0"/>
+              <a:t>	case(OPERATOR):</a:t>
+            </a:r>
+          </a:p>
+          <a:p>
+            <a:pPr marL="0" indent="0">
+              <a:buNone/>
+            </a:pPr>
+            <a:r>
+              <a:rPr lang="en-US" sz="2500" dirty="0"/>
+              <a:t>		</a:t>
+            </a:r>
+            <a:r>
+              <a:rPr lang="en-US" sz="2500" dirty="0" err="1"/>
+              <a:t>printf</a:t>
+            </a:r>
+            <a:r>
+              <a:rPr lang="en-US" sz="2500" dirty="0"/>
+              <a:t>("You are operator.\n");</a:t>
+            </a:r>
+          </a:p>
+          <a:p>
+            <a:pPr marL="0" indent="0">
+              <a:buNone/>
+            </a:pPr>
+            <a:r>
+              <a:rPr lang="en-US" sz="2500" dirty="0"/>
+              <a:t>		</a:t>
+            </a:r>
+            <a:r>
+              <a:rPr lang="en-US" sz="2500" dirty="0" err="1"/>
+              <a:t>operatorActions</a:t>
+            </a:r>
+            <a:r>
+              <a:rPr lang="en-US" sz="2500" dirty="0"/>
+              <a:t>();</a:t>
+            </a:r>
+          </a:p>
+          <a:p>
+            <a:pPr marL="0" indent="0">
+              <a:buNone/>
+            </a:pPr>
+            <a:r>
+              <a:rPr lang="en-US" sz="2500" dirty="0"/>
+              <a:t>		break;</a:t>
+            </a:r>
+          </a:p>
+          <a:p>
+            <a:pPr marL="0" indent="0">
+              <a:buNone/>
+            </a:pPr>
+            <a:r>
+              <a:rPr lang="en-US" sz="2500" dirty="0"/>
+              <a:t>	case(UNKNOWN):</a:t>
+            </a:r>
+          </a:p>
+          <a:p>
+            <a:pPr marL="0" indent="0">
+              <a:buNone/>
+            </a:pPr>
+            <a:r>
+              <a:rPr lang="en-US" sz="2500" dirty="0"/>
+              <a:t>		</a:t>
+            </a:r>
+            <a:r>
+              <a:rPr lang="en-US" sz="2500" dirty="0" err="1"/>
+              <a:t>printf</a:t>
+            </a:r>
+            <a:r>
+              <a:rPr lang="en-US" sz="2500" dirty="0"/>
+              <a:t>("</a:t>
+            </a:r>
+            <a:r>
+              <a:rPr lang="en-US" sz="2500" dirty="0" err="1"/>
+              <a:t>ERROR!You</a:t>
+            </a:r>
+            <a:r>
+              <a:rPr lang="en-US" sz="2500" dirty="0"/>
+              <a:t> are not </a:t>
+            </a:r>
+            <a:r>
+              <a:rPr lang="en-US" sz="2500" dirty="0" err="1"/>
+              <a:t>registred</a:t>
+            </a:r>
+            <a:r>
+              <a:rPr lang="en-US" sz="2500" dirty="0"/>
+              <a:t> in system!\n");</a:t>
+            </a:r>
+          </a:p>
+          <a:p>
+            <a:pPr marL="0" indent="0">
+              <a:buNone/>
+            </a:pPr>
+            <a:r>
+              <a:rPr lang="en-US" sz="2500" dirty="0"/>
+              <a:t>		break;</a:t>
+            </a:r>
+          </a:p>
+          <a:p>
+            <a:pPr marL="0" indent="0">
+              <a:buNone/>
+            </a:pPr>
+            <a:r>
+              <a:rPr lang="en-US" sz="2500" dirty="0"/>
+              <a:t>	}</a:t>
+            </a:r>
+          </a:p>
+          <a:p>
+            <a:pPr marL="0" indent="0">
+              <a:buNone/>
+            </a:pPr>
+            <a:r>
+              <a:rPr lang="en-US" sz="2500" dirty="0" smtClean="0"/>
+              <a:t>}</a:t>
+            </a:r>
+            <a:endParaRPr lang="ru-RU" sz="2500" dirty="0" smtClean="0"/>
+          </a:p>
+          <a:p>
+            <a:pPr marL="0" indent="0">
+              <a:buNone/>
+            </a:pPr>
+            <a:endParaRPr lang="en-US" sz="2500" dirty="0"/>
+          </a:p>
+          <a:p>
+            <a:pPr marL="0" indent="0">
+              <a:buNone/>
+            </a:pPr>
+            <a:r>
+              <a:rPr lang="en-US" sz="2500" dirty="0"/>
+              <a:t>static </a:t>
+            </a:r>
+            <a:r>
+              <a:rPr lang="en-US" sz="2500" dirty="0" err="1"/>
+              <a:t>int</a:t>
+            </a:r>
+            <a:r>
+              <a:rPr lang="en-US" sz="2500" dirty="0"/>
+              <a:t> authorization(void *data, </a:t>
+            </a:r>
+            <a:r>
+              <a:rPr lang="en-US" sz="2500" dirty="0" err="1"/>
+              <a:t>int</a:t>
+            </a:r>
+            <a:r>
+              <a:rPr lang="en-US" sz="2500" dirty="0"/>
+              <a:t> </a:t>
+            </a:r>
+            <a:r>
+              <a:rPr lang="en-US" sz="2500" dirty="0" err="1"/>
+              <a:t>argc</a:t>
+            </a:r>
+            <a:r>
+              <a:rPr lang="en-US" sz="2500" dirty="0"/>
+              <a:t>, char **</a:t>
+            </a:r>
+            <a:r>
+              <a:rPr lang="en-US" sz="2500" dirty="0" err="1"/>
+              <a:t>argv</a:t>
+            </a:r>
+            <a:r>
+              <a:rPr lang="en-US" sz="2500" dirty="0"/>
+              <a:t>, char **</a:t>
+            </a:r>
+            <a:r>
+              <a:rPr lang="en-US" sz="2500" dirty="0" err="1"/>
+              <a:t>azColName</a:t>
+            </a:r>
+            <a:r>
+              <a:rPr lang="en-US" sz="2500" dirty="0"/>
+              <a:t>){</a:t>
+            </a:r>
+          </a:p>
+          <a:p>
+            <a:pPr marL="0" indent="0">
+              <a:buNone/>
+            </a:pPr>
+            <a:r>
+              <a:rPr lang="en-US" sz="2500" dirty="0"/>
+              <a:t>	string role=</a:t>
+            </a:r>
+            <a:r>
+              <a:rPr lang="en-US" sz="2500" dirty="0" err="1"/>
+              <a:t>argv</a:t>
+            </a:r>
+            <a:r>
+              <a:rPr lang="en-US" sz="2500" dirty="0"/>
+              <a:t>[0];</a:t>
+            </a:r>
+          </a:p>
+          <a:p>
+            <a:pPr marL="0" indent="0">
+              <a:buNone/>
+            </a:pPr>
+            <a:r>
+              <a:rPr lang="en-US" sz="2500" dirty="0"/>
+              <a:t>	if(role=="admin")</a:t>
+            </a:r>
+          </a:p>
+          <a:p>
+            <a:pPr marL="0" indent="0">
+              <a:buNone/>
+            </a:pPr>
+            <a:r>
+              <a:rPr lang="en-US" sz="2500" dirty="0"/>
+              <a:t>		</a:t>
+            </a:r>
+            <a:r>
+              <a:rPr lang="en-US" sz="2500" dirty="0" err="1"/>
+              <a:t>roleIdentified</a:t>
+            </a:r>
+            <a:r>
+              <a:rPr lang="en-US" sz="2500" dirty="0"/>
+              <a:t>=ADMIN;</a:t>
+            </a:r>
+          </a:p>
+          <a:p>
+            <a:pPr marL="0" indent="0">
+              <a:buNone/>
+            </a:pPr>
+            <a:r>
+              <a:rPr lang="en-US" sz="2500" dirty="0"/>
+              <a:t>	if(role=="operator")</a:t>
+            </a:r>
+          </a:p>
+          <a:p>
+            <a:pPr marL="0" indent="0">
+              <a:buNone/>
+            </a:pPr>
+            <a:r>
+              <a:rPr lang="en-US" sz="2500" dirty="0"/>
+              <a:t>		</a:t>
+            </a:r>
+            <a:r>
+              <a:rPr lang="en-US" sz="2500" dirty="0" err="1"/>
+              <a:t>roleIdentified</a:t>
+            </a:r>
+            <a:r>
+              <a:rPr lang="en-US" sz="2500" dirty="0"/>
+              <a:t>=OPERATOR;</a:t>
+            </a:r>
+          </a:p>
+          <a:p>
+            <a:pPr marL="0" indent="0">
+              <a:buNone/>
+            </a:pPr>
+            <a:r>
+              <a:rPr lang="en-US" sz="2500" dirty="0"/>
+              <a:t>	return 0;</a:t>
+            </a:r>
+          </a:p>
+          <a:p>
+            <a:pPr marL="0" indent="0">
+              <a:buNone/>
+            </a:pPr>
+            <a:r>
+              <a:rPr lang="en-US" sz="2500" dirty="0"/>
+              <a:t>}</a:t>
+            </a:r>
+          </a:p>
+          <a:p>
+            <a:endParaRPr lang="ru-RU" dirty="0"/>
+          </a:p>
+        </p:txBody>
+      </p:sp>
+    </p:spTree>
+    <p:extLst>
+      <p:ext uri="{BB962C8B-B14F-4D97-AF65-F5344CB8AC3E}">
+        <p14:creationId xmlns:p14="http://schemas.microsoft.com/office/powerpoint/2010/main" val="1596642243"/>
+      </p:ext>
+    </p:extLst>
+  </p:cSld>
+  <p:clrMapOvr>
+    <a:masterClrMapping/>
+  </p:clrMapOvr>
+  <p:timing>
+    <p:tnLst>
+      <p:par>
+        <p:cTn id="1" dur="indefinite" restart="never" nodeType="tmRoot"/>
+      </p:par>
+    </p:tnLst>
+  </p:timing>
 </p:sld>
 </file>
 
@@ -5433,6 +6381,13 @@
   <p:clrMapOvr>
     <a:masterClrMapping/>
   </p:clrMapOvr>
+  <p:timing>
+    <p:tnLst>
+      <p:par>
+        <p:cTn id="1" dur="indefinite" restart="never" nodeType="tmRoot"/>
+      </p:par>
+    </p:tnLst>
+  </p:timing>
 </p:sld>
 </file>
 
@@ -5566,6 +6521,13 @@
   <p:clrMapOvr>
     <a:masterClrMapping/>
   </p:clrMapOvr>
+  <p:timing>
+    <p:tnLst>
+      <p:par>
+        <p:cTn id="1" dur="indefinite" restart="never" nodeType="tmRoot"/>
+      </p:par>
+    </p:tnLst>
+  </p:timing>
 </p:sld>
 </file>
 
@@ -5671,6 +6633,13 @@
   <p:clrMapOvr>
     <a:masterClrMapping/>
   </p:clrMapOvr>
+  <p:timing>
+    <p:tnLst>
+      <p:par>
+        <p:cTn id="1" dur="indefinite" restart="never" nodeType="tmRoot"/>
+      </p:par>
+    </p:tnLst>
+  </p:timing>
 </p:sld>
 </file>
 
@@ -5752,6 +6721,13 @@
   <p:clrMapOvr>
     <a:masterClrMapping/>
   </p:clrMapOvr>
+  <p:timing>
+    <p:tnLst>
+      <p:par>
+        <p:cTn id="1" dur="indefinite" restart="never" nodeType="tmRoot"/>
+      </p:par>
+    </p:tnLst>
+  </p:timing>
 </p:sld>
 </file>
 
@@ -5893,6 +6869,13 @@
   <p:clrMapOvr>
     <a:masterClrMapping/>
   </p:clrMapOvr>
+  <p:timing>
+    <p:tnLst>
+      <p:par>
+        <p:cTn id="1" dur="indefinite" restart="never" nodeType="tmRoot"/>
+      </p:par>
+    </p:tnLst>
+  </p:timing>
 </p:sld>
 </file>
 
@@ -5981,6 +6964,13 @@
   <p:clrMapOvr>
     <a:masterClrMapping/>
   </p:clrMapOvr>
+  <p:timing>
+    <p:tnLst>
+      <p:par>
+        <p:cTn id="1" dur="indefinite" restart="never" nodeType="tmRoot"/>
+      </p:par>
+    </p:tnLst>
+  </p:timing>
 </p:sld>
 </file>
 
@@ -6118,6 +7108,13 @@
   <p:clrMapOvr>
     <a:masterClrMapping/>
   </p:clrMapOvr>
+  <p:timing>
+    <p:tnLst>
+      <p:par>
+        <p:cTn id="1" dur="indefinite" restart="never" nodeType="tmRoot"/>
+      </p:par>
+    </p:tnLst>
+  </p:timing>
 </p:sld>
 </file>
 
@@ -6331,6 +7328,13 @@
   <p:clrMapOvr>
     <a:masterClrMapping/>
   </p:clrMapOvr>
+  <p:timing>
+    <p:tnLst>
+      <p:par>
+        <p:cTn id="1" dur="indefinite" restart="never" nodeType="tmRoot"/>
+      </p:par>
+    </p:tnLst>
+  </p:timing>
 </p:sld>
 </file>
 

</xml_diff>

<commit_message>
Add new slides with program code
</commit_message>
<xml_diff>
--- a/Спецкурс. Презентация.pptx
+++ b/Спецкурс. Презентация.pptx
@@ -14,10 +14,15 @@
     <p:sldId id="262" r:id="rId8"/>
     <p:sldId id="263" r:id="rId9"/>
     <p:sldId id="264" r:id="rId10"/>
-    <p:sldId id="265" r:id="rId11"/>
-    <p:sldId id="266" r:id="rId12"/>
-    <p:sldId id="267" r:id="rId13"/>
-    <p:sldId id="268" r:id="rId14"/>
+    <p:sldId id="274" r:id="rId11"/>
+    <p:sldId id="275" r:id="rId12"/>
+    <p:sldId id="276" r:id="rId13"/>
+    <p:sldId id="277" r:id="rId14"/>
+    <p:sldId id="265" r:id="rId15"/>
+    <p:sldId id="273" r:id="rId16"/>
+    <p:sldId id="266" r:id="rId17"/>
+    <p:sldId id="267" r:id="rId18"/>
+    <p:sldId id="268" r:id="rId19"/>
   </p:sldIdLst>
   <p:sldSz cx="9144000" cy="6858000" type="screen4x3"/>
   <p:notesSz cx="6858000" cy="9144000"/>
@@ -5117,7 +5122,7 @@
           <a:p>
             <a:r>
               <a:rPr lang="ru-RU" dirty="0" smtClean="0"/>
-              <a:t>Вклад каждого студента</a:t>
+              <a:t>Козлова Виталия</a:t>
             </a:r>
             <a:endParaRPr lang="ru-RU" dirty="0"/>
           </a:p>
@@ -5142,72 +5147,12 @@
               <a:buNone/>
             </a:pPr>
             <a:r>
-              <a:rPr lang="ru-RU" b="1" dirty="0"/>
-              <a:t>Ирина </a:t>
-            </a:r>
-            <a:r>
-              <a:rPr lang="ru-RU" b="1" dirty="0" err="1"/>
-              <a:t>Макарушко</a:t>
-            </a:r>
-            <a:r>
-              <a:rPr lang="ru-RU" b="1" dirty="0"/>
-              <a:t>:</a:t>
-            </a:r>
-          </a:p>
-          <a:p>
-            <a:r>
-              <a:rPr lang="ru-RU" dirty="0" smtClean="0"/>
-              <a:t>выполнение </a:t>
-            </a:r>
-            <a:r>
-              <a:rPr lang="en-US" dirty="0"/>
+              <a:rPr lang="en-US" b="1" u="sng" dirty="0"/>
               <a:t>User Story</a:t>
             </a:r>
-            <a:endParaRPr lang="ru-RU" dirty="0"/>
-          </a:p>
-          <a:p>
-            <a:r>
-              <a:rPr lang="ru-RU" dirty="0" smtClean="0"/>
-              <a:t>настройка </a:t>
-            </a:r>
-            <a:r>
-              <a:rPr lang="ru-RU" dirty="0" err="1"/>
-              <a:t>репозитория</a:t>
-            </a:r>
             <a:r>
               <a:rPr lang="ru-RU" dirty="0"/>
-              <a:t> для хранения проекта на </a:t>
-            </a:r>
-            <a:r>
-              <a:rPr lang="en-US" dirty="0" err="1"/>
-              <a:t>github</a:t>
-            </a:r>
-            <a:r>
-              <a:rPr lang="ru-RU" dirty="0"/>
-              <a:t>.</a:t>
-            </a:r>
-            <a:r>
-              <a:rPr lang="en-US" dirty="0"/>
-              <a:t>com</a:t>
-            </a:r>
-            <a:endParaRPr lang="ru-RU" dirty="0"/>
-          </a:p>
-          <a:p>
-            <a:r>
-              <a:rPr lang="ru-RU" dirty="0" smtClean="0"/>
-              <a:t>настройка </a:t>
-            </a:r>
-            <a:r>
-              <a:rPr lang="ru-RU" dirty="0"/>
-              <a:t>запуска программы через </a:t>
-            </a:r>
-            <a:r>
-              <a:rPr lang="en-US" dirty="0"/>
-              <a:t>bat</a:t>
-            </a:r>
-            <a:r>
-              <a:rPr lang="ru-RU" dirty="0"/>
-              <a:t>-файл</a:t>
+              <a:t>:  удаление клиента.</a:t>
             </a:r>
           </a:p>
           <a:p>
@@ -5224,65 +5169,59 @@
               <a:buNone/>
             </a:pPr>
             <a:r>
-              <a:rPr lang="ru-RU" b="1" dirty="0"/>
-              <a:t>Павлова Маргарита:</a:t>
-            </a:r>
-          </a:p>
-          <a:p>
+              <a:rPr lang="ru-RU" dirty="0"/>
+              <a:t>Команды:</a:t>
+            </a:r>
+          </a:p>
+          <a:p>
+            <a:r>
+              <a:rPr lang="ru-RU" dirty="0"/>
+              <a:t>- войти под ролью администратора</a:t>
+            </a:r>
+          </a:p>
+          <a:p>
+            <a:r>
+              <a:rPr lang="ru-RU" dirty="0"/>
+              <a:t>- выбрать операцию удаления клиента</a:t>
+            </a:r>
+          </a:p>
+          <a:p>
+            <a:r>
+              <a:rPr lang="ru-RU" dirty="0"/>
+              <a:t>- ввести </a:t>
+            </a:r>
+            <a:r>
+              <a:rPr lang="en-US" dirty="0"/>
+              <a:t>id </a:t>
+            </a:r>
+            <a:r>
+              <a:rPr lang="ru-RU" dirty="0"/>
+              <a:t>клиента </a:t>
+            </a:r>
+          </a:p>
+          <a:p>
+            <a:pPr marL="0" indent="0">
+              <a:buNone/>
+            </a:pPr>
+            <a:r>
+              <a:rPr lang="ru-RU" dirty="0"/>
+              <a:t>В случае корректного </a:t>
+            </a:r>
+            <a:r>
+              <a:rPr lang="en-US" dirty="0"/>
+              <a:t>id </a:t>
+            </a:r>
+            <a:r>
+              <a:rPr lang="ru-RU" dirty="0"/>
+              <a:t>клиента операция будет осуществлена. Иначе система выдаст сообщение об ошибке</a:t>
+            </a:r>
             <a:r>
               <a:rPr lang="ru-RU" dirty="0" smtClean="0"/>
-              <a:t>выполнение </a:t>
-            </a:r>
-            <a:r>
-              <a:rPr lang="en-US" dirty="0"/>
-              <a:t>User Story</a:t>
+              <a:t>. Так как удаление осуществляется из двух таблиц используется механизм транзакции</a:t>
             </a:r>
             <a:endParaRPr lang="ru-RU" dirty="0"/>
           </a:p>
           <a:p>
-            <a:r>
-              <a:rPr lang="ru-RU" dirty="0" smtClean="0"/>
-              <a:t>настройка </a:t>
-            </a:r>
-            <a:r>
-              <a:rPr lang="en-US" dirty="0" err="1"/>
-              <a:t>targetprocess</a:t>
-            </a:r>
-            <a:r>
-              <a:rPr lang="ru-RU" dirty="0"/>
-              <a:t>.</a:t>
-            </a:r>
-            <a:r>
-              <a:rPr lang="en-US" dirty="0"/>
-              <a:t>com</a:t>
-            </a:r>
-            <a:r>
-              <a:rPr lang="ru-RU" dirty="0"/>
-              <a:t> для распределения задач между студентами</a:t>
-            </a:r>
-          </a:p>
-          <a:p>
-            <a:r>
-              <a:rPr lang="ru-RU" dirty="0" smtClean="0"/>
-              <a:t>настройка </a:t>
-            </a:r>
-            <a:r>
-              <a:rPr lang="ru-RU" dirty="0"/>
-              <a:t>запуска программы через </a:t>
-            </a:r>
-            <a:r>
-              <a:rPr lang="en-US" dirty="0"/>
-              <a:t>bat</a:t>
-            </a:r>
-            <a:r>
-              <a:rPr lang="ru-RU" dirty="0"/>
-              <a:t>-файл</a:t>
-            </a:r>
-          </a:p>
-          <a:p>
-            <a:pPr marL="0" indent="0">
-              <a:buNone/>
-            </a:pPr>
             <a:endParaRPr lang="ru-RU" dirty="0"/>
           </a:p>
         </p:txBody>
@@ -5290,7 +5229,7 @@
     </p:spTree>
     <p:extLst>
       <p:ext uri="{BB962C8B-B14F-4D97-AF65-F5344CB8AC3E}">
-        <p14:creationId xmlns:p14="http://schemas.microsoft.com/office/powerpoint/2010/main" val="2672678260"/>
+        <p14:creationId xmlns:p14="http://schemas.microsoft.com/office/powerpoint/2010/main" val="2160967055"/>
       </p:ext>
     </p:extLst>
   </p:cSld>
@@ -5334,46 +5273,82 @@
             <p:ph type="title"/>
           </p:nvPr>
         </p:nvSpPr>
-        <p:spPr>
-          <a:xfrm>
-            <a:off x="899592" y="2204864"/>
-            <a:ext cx="7467600" cy="1143000"/>
-          </a:xfrm>
-        </p:spPr>
-        <p:txBody>
-          <a:bodyPr>
-            <a:noAutofit/>
-          </a:bodyPr>
-          <a:lstStyle/>
-          <a:p>
-            <a:pPr algn="ctr"/>
-            <a:r>
-              <a:rPr lang="ru-RU" sz="5400" b="1" dirty="0">
-                <a:solidFill>
-                  <a:schemeClr val="tx1"/>
-                </a:solidFill>
-              </a:rPr>
-              <a:t>Программный код</a:t>
-            </a:r>
-            <a:br>
-              <a:rPr lang="ru-RU" sz="5400" b="1" dirty="0">
-                <a:solidFill>
-                  <a:schemeClr val="tx1"/>
-                </a:solidFill>
-              </a:rPr>
-            </a:br>
-            <a:endParaRPr lang="ru-RU" sz="5400" b="1" dirty="0">
-              <a:solidFill>
-                <a:schemeClr val="tx1"/>
-              </a:solidFill>
-            </a:endParaRPr>
+        <p:spPr/>
+        <p:txBody>
+          <a:bodyPr/>
+          <a:lstStyle/>
+          <a:p>
+            <a:r>
+              <a:rPr lang="ru-RU" dirty="0" smtClean="0"/>
+              <a:t>Козлова Виталия</a:t>
+            </a:r>
+            <a:endParaRPr lang="ru-RU" dirty="0"/>
+          </a:p>
+        </p:txBody>
+      </p:sp>
+      <p:sp>
+        <p:nvSpPr>
+          <p:cNvPr id="3" name="Объект 2"/>
+          <p:cNvSpPr>
+            <a:spLocks noGrp="1"/>
+          </p:cNvSpPr>
+          <p:nvPr>
+            <p:ph sz="quarter" idx="1"/>
+          </p:nvPr>
+        </p:nvSpPr>
+        <p:spPr/>
+        <p:txBody>
+          <a:bodyPr/>
+          <a:lstStyle/>
+          <a:p>
+            <a:pPr marL="0" indent="0">
+              <a:buNone/>
+            </a:pPr>
+            <a:r>
+              <a:rPr lang="en-US" b="1" u="sng" dirty="0"/>
+              <a:t>User Story</a:t>
+            </a:r>
+            <a:r>
+              <a:rPr lang="ru-RU" dirty="0"/>
+              <a:t>: вывод списка всех удалённых клиентов.</a:t>
+            </a:r>
+          </a:p>
+          <a:p>
+            <a:pPr marL="0" indent="0">
+              <a:buNone/>
+            </a:pPr>
+            <a:r>
+              <a:rPr lang="ru-RU" dirty="0"/>
+              <a:t> </a:t>
+            </a:r>
+          </a:p>
+          <a:p>
+            <a:r>
+              <a:rPr lang="ru-RU" dirty="0"/>
+              <a:t>Команды:</a:t>
+            </a:r>
+          </a:p>
+          <a:p>
+            <a:r>
+              <a:rPr lang="ru-RU" dirty="0"/>
+              <a:t>- войти под ролью администратора</a:t>
+            </a:r>
+          </a:p>
+          <a:p>
+            <a:r>
+              <a:rPr lang="ru-RU" dirty="0"/>
+              <a:t>- выбрать операцию, позволяющую просмотреть список удалённых клиентов </a:t>
+            </a:r>
+          </a:p>
+          <a:p>
+            <a:endParaRPr lang="ru-RU" dirty="0"/>
           </a:p>
         </p:txBody>
       </p:sp>
     </p:spTree>
     <p:extLst>
       <p:ext uri="{BB962C8B-B14F-4D97-AF65-F5344CB8AC3E}">
-        <p14:creationId xmlns:p14="http://schemas.microsoft.com/office/powerpoint/2010/main" val="1667233573"/>
+        <p14:creationId xmlns:p14="http://schemas.microsoft.com/office/powerpoint/2010/main" val="1860270514"/>
       </p:ext>
     </p:extLst>
   </p:cSld>
@@ -5417,6 +5392,733 @@
             <p:ph type="title"/>
           </p:nvPr>
         </p:nvSpPr>
+        <p:spPr/>
+        <p:txBody>
+          <a:bodyPr/>
+          <a:lstStyle/>
+          <a:p>
+            <a:r>
+              <a:rPr lang="ru-RU" dirty="0" err="1" smtClean="0"/>
+              <a:t>Барашко</a:t>
+            </a:r>
+            <a:r>
+              <a:rPr lang="ru-RU" dirty="0" smtClean="0"/>
+              <a:t> Мария</a:t>
+            </a:r>
+            <a:endParaRPr lang="ru-RU" dirty="0"/>
+          </a:p>
+        </p:txBody>
+      </p:sp>
+      <p:sp>
+        <p:nvSpPr>
+          <p:cNvPr id="3" name="Объект 2"/>
+          <p:cNvSpPr>
+            <a:spLocks noGrp="1"/>
+          </p:cNvSpPr>
+          <p:nvPr>
+            <p:ph sz="quarter" idx="1"/>
+          </p:nvPr>
+        </p:nvSpPr>
+        <p:spPr/>
+        <p:txBody>
+          <a:bodyPr>
+            <a:normAutofit/>
+          </a:bodyPr>
+          <a:lstStyle/>
+          <a:p>
+            <a:pPr marL="0" indent="0">
+              <a:buNone/>
+            </a:pPr>
+            <a:r>
+              <a:rPr lang="en-US" b="1" u="sng" dirty="0"/>
+              <a:t>User Story</a:t>
+            </a:r>
+            <a:r>
+              <a:rPr lang="ru-RU" dirty="0"/>
+              <a:t>: создание клиента.</a:t>
+            </a:r>
+          </a:p>
+          <a:p>
+            <a:pPr marL="0" indent="0">
+              <a:buNone/>
+            </a:pPr>
+            <a:r>
+              <a:rPr lang="ru-RU" dirty="0"/>
+              <a:t> </a:t>
+            </a:r>
+          </a:p>
+          <a:p>
+            <a:pPr marL="0" indent="0">
+              <a:buNone/>
+            </a:pPr>
+            <a:r>
+              <a:rPr lang="ru-RU" dirty="0"/>
+              <a:t>Команды:</a:t>
+            </a:r>
+          </a:p>
+          <a:p>
+            <a:r>
+              <a:rPr lang="ru-RU" dirty="0"/>
+              <a:t>- войти под ролью администратора</a:t>
+            </a:r>
+          </a:p>
+          <a:p>
+            <a:r>
+              <a:rPr lang="ru-RU" dirty="0"/>
+              <a:t>- выбрать операцию создания клиента</a:t>
+            </a:r>
+          </a:p>
+          <a:p>
+            <a:r>
+              <a:rPr lang="ru-RU" dirty="0"/>
+              <a:t>- ввести имя клиента</a:t>
+            </a:r>
+          </a:p>
+          <a:p>
+            <a:r>
+              <a:rPr lang="ru-RU" dirty="0"/>
+              <a:t>- ввести фамилию клиента</a:t>
+            </a:r>
+          </a:p>
+          <a:p>
+            <a:pPr marL="0" indent="0">
+              <a:buNone/>
+            </a:pPr>
+            <a:r>
+              <a:rPr lang="ru-RU" dirty="0"/>
+              <a:t>В случае корректного ввода информации о клиенте, операция будет осуществлена. Иначе система выдаст сообщение об </a:t>
+            </a:r>
+            <a:r>
+              <a:rPr lang="ru-RU" dirty="0" smtClean="0"/>
+              <a:t>ошибке</a:t>
+            </a:r>
+            <a:endParaRPr lang="ru-RU" dirty="0"/>
+          </a:p>
+          <a:p>
+            <a:endParaRPr lang="ru-RU" dirty="0"/>
+          </a:p>
+        </p:txBody>
+      </p:sp>
+    </p:spTree>
+    <p:extLst>
+      <p:ext uri="{BB962C8B-B14F-4D97-AF65-F5344CB8AC3E}">
+        <p14:creationId xmlns:p14="http://schemas.microsoft.com/office/powerpoint/2010/main" val="2554246441"/>
+      </p:ext>
+    </p:extLst>
+  </p:cSld>
+  <p:clrMapOvr>
+    <a:masterClrMapping/>
+  </p:clrMapOvr>
+  <p:timing>
+    <p:tnLst>
+      <p:par>
+        <p:cTn id="1" dur="indefinite" restart="never" nodeType="tmRoot"/>
+      </p:par>
+    </p:tnLst>
+  </p:timing>
+</p:sld>
+</file>
+
+<file path=ppt/slides/slide13.xml><?xml version="1.0" encoding="utf-8"?>
+<p:sld xmlns:a="http://schemas.openxmlformats.org/drawingml/2006/main" xmlns:r="http://schemas.openxmlformats.org/officeDocument/2006/relationships" xmlns:p="http://schemas.openxmlformats.org/presentationml/2006/main">
+  <p:cSld>
+    <p:spTree>
+      <p:nvGrpSpPr>
+        <p:cNvPr id="1" name=""/>
+        <p:cNvGrpSpPr/>
+        <p:nvPr/>
+      </p:nvGrpSpPr>
+      <p:grpSpPr>
+        <a:xfrm>
+          <a:off x="0" y="0"/>
+          <a:ext cx="0" cy="0"/>
+          <a:chOff x="0" y="0"/>
+          <a:chExt cx="0" cy="0"/>
+        </a:xfrm>
+      </p:grpSpPr>
+      <p:sp>
+        <p:nvSpPr>
+          <p:cNvPr id="2" name="Заголовок 1"/>
+          <p:cNvSpPr>
+            <a:spLocks noGrp="1"/>
+          </p:cNvSpPr>
+          <p:nvPr>
+            <p:ph type="title"/>
+          </p:nvPr>
+        </p:nvSpPr>
+        <p:spPr/>
+        <p:txBody>
+          <a:bodyPr/>
+          <a:lstStyle/>
+          <a:p>
+            <a:r>
+              <a:rPr lang="ru-RU" dirty="0" err="1" smtClean="0"/>
+              <a:t>Барашко</a:t>
+            </a:r>
+            <a:r>
+              <a:rPr lang="ru-RU" dirty="0" smtClean="0"/>
+              <a:t> Мария</a:t>
+            </a:r>
+            <a:endParaRPr lang="ru-RU" dirty="0"/>
+          </a:p>
+        </p:txBody>
+      </p:sp>
+      <p:sp>
+        <p:nvSpPr>
+          <p:cNvPr id="3" name="Объект 2"/>
+          <p:cNvSpPr>
+            <a:spLocks noGrp="1"/>
+          </p:cNvSpPr>
+          <p:nvPr>
+            <p:ph sz="quarter" idx="1"/>
+          </p:nvPr>
+        </p:nvSpPr>
+        <p:spPr/>
+        <p:txBody>
+          <a:bodyPr/>
+          <a:lstStyle/>
+          <a:p>
+            <a:pPr marL="0" indent="0">
+              <a:buNone/>
+            </a:pPr>
+            <a:r>
+              <a:rPr lang="en-US" b="1" u="sng" dirty="0"/>
+              <a:t>User Story</a:t>
+            </a:r>
+            <a:r>
+              <a:rPr lang="ru-RU" dirty="0"/>
+              <a:t>: вывод списка всех клиентов.</a:t>
+            </a:r>
+          </a:p>
+          <a:p>
+            <a:pPr marL="0" indent="0">
+              <a:buNone/>
+            </a:pPr>
+            <a:r>
+              <a:rPr lang="ru-RU" dirty="0"/>
+              <a:t> </a:t>
+            </a:r>
+          </a:p>
+          <a:p>
+            <a:r>
+              <a:rPr lang="ru-RU" dirty="0"/>
+              <a:t>Команды:</a:t>
+            </a:r>
+          </a:p>
+          <a:p>
+            <a:r>
+              <a:rPr lang="ru-RU" dirty="0"/>
+              <a:t>- войти под ролью администратора</a:t>
+            </a:r>
+          </a:p>
+          <a:p>
+            <a:r>
+              <a:rPr lang="ru-RU" dirty="0"/>
+              <a:t>- выбрать операцию, позволяющую просмотреть список всех клиентов </a:t>
+            </a:r>
+          </a:p>
+          <a:p>
+            <a:endParaRPr lang="ru-RU" dirty="0"/>
+          </a:p>
+        </p:txBody>
+      </p:sp>
+    </p:spTree>
+    <p:extLst>
+      <p:ext uri="{BB962C8B-B14F-4D97-AF65-F5344CB8AC3E}">
+        <p14:creationId xmlns:p14="http://schemas.microsoft.com/office/powerpoint/2010/main" val="532784084"/>
+      </p:ext>
+    </p:extLst>
+  </p:cSld>
+  <p:clrMapOvr>
+    <a:masterClrMapping/>
+  </p:clrMapOvr>
+  <p:timing>
+    <p:tnLst>
+      <p:par>
+        <p:cTn id="1" dur="indefinite" restart="never" nodeType="tmRoot"/>
+      </p:par>
+    </p:tnLst>
+  </p:timing>
+</p:sld>
+</file>
+
+<file path=ppt/slides/slide14.xml><?xml version="1.0" encoding="utf-8"?>
+<p:sld xmlns:a="http://schemas.openxmlformats.org/drawingml/2006/main" xmlns:r="http://schemas.openxmlformats.org/officeDocument/2006/relationships" xmlns:p="http://schemas.openxmlformats.org/presentationml/2006/main">
+  <p:cSld>
+    <p:spTree>
+      <p:nvGrpSpPr>
+        <p:cNvPr id="1" name=""/>
+        <p:cNvGrpSpPr/>
+        <p:nvPr/>
+      </p:nvGrpSpPr>
+      <p:grpSpPr>
+        <a:xfrm>
+          <a:off x="0" y="0"/>
+          <a:ext cx="0" cy="0"/>
+          <a:chOff x="0" y="0"/>
+          <a:chExt cx="0" cy="0"/>
+        </a:xfrm>
+      </p:grpSpPr>
+      <p:sp>
+        <p:nvSpPr>
+          <p:cNvPr id="2" name="Заголовок 1"/>
+          <p:cNvSpPr>
+            <a:spLocks noGrp="1"/>
+          </p:cNvSpPr>
+          <p:nvPr>
+            <p:ph type="title"/>
+          </p:nvPr>
+        </p:nvSpPr>
+        <p:spPr/>
+        <p:txBody>
+          <a:bodyPr/>
+          <a:lstStyle/>
+          <a:p>
+            <a:r>
+              <a:rPr lang="ru-RU" dirty="0" smtClean="0"/>
+              <a:t>Вклад каждого студента</a:t>
+            </a:r>
+            <a:endParaRPr lang="ru-RU" dirty="0"/>
+          </a:p>
+        </p:txBody>
+      </p:sp>
+      <p:sp>
+        <p:nvSpPr>
+          <p:cNvPr id="3" name="Объект 2"/>
+          <p:cNvSpPr>
+            <a:spLocks noGrp="1"/>
+          </p:cNvSpPr>
+          <p:nvPr>
+            <p:ph sz="quarter" idx="1"/>
+          </p:nvPr>
+        </p:nvSpPr>
+        <p:spPr/>
+        <p:txBody>
+          <a:bodyPr/>
+          <a:lstStyle/>
+          <a:p>
+            <a:pPr marL="0" indent="0">
+              <a:buNone/>
+            </a:pPr>
+            <a:r>
+              <a:rPr lang="ru-RU" b="1" dirty="0"/>
+              <a:t>Ирина </a:t>
+            </a:r>
+            <a:r>
+              <a:rPr lang="ru-RU" b="1" dirty="0" err="1"/>
+              <a:t>Макарушко</a:t>
+            </a:r>
+            <a:r>
+              <a:rPr lang="ru-RU" b="1" dirty="0"/>
+              <a:t>:</a:t>
+            </a:r>
+          </a:p>
+          <a:p>
+            <a:r>
+              <a:rPr lang="ru-RU" dirty="0" smtClean="0"/>
+              <a:t>выполнение </a:t>
+            </a:r>
+            <a:r>
+              <a:rPr lang="en-US" dirty="0"/>
+              <a:t>User Story</a:t>
+            </a:r>
+            <a:endParaRPr lang="ru-RU" dirty="0"/>
+          </a:p>
+          <a:p>
+            <a:r>
+              <a:rPr lang="ru-RU" dirty="0" smtClean="0"/>
+              <a:t>настройка </a:t>
+            </a:r>
+            <a:r>
+              <a:rPr lang="ru-RU" dirty="0" err="1"/>
+              <a:t>репозитория</a:t>
+            </a:r>
+            <a:r>
+              <a:rPr lang="ru-RU" dirty="0"/>
+              <a:t> для хранения проекта на </a:t>
+            </a:r>
+            <a:r>
+              <a:rPr lang="en-US" dirty="0" err="1"/>
+              <a:t>github</a:t>
+            </a:r>
+            <a:r>
+              <a:rPr lang="ru-RU" dirty="0"/>
+              <a:t>.</a:t>
+            </a:r>
+            <a:r>
+              <a:rPr lang="en-US" dirty="0"/>
+              <a:t>com</a:t>
+            </a:r>
+            <a:endParaRPr lang="ru-RU" dirty="0"/>
+          </a:p>
+          <a:p>
+            <a:r>
+              <a:rPr lang="ru-RU" dirty="0" smtClean="0"/>
+              <a:t>настройка </a:t>
+            </a:r>
+            <a:r>
+              <a:rPr lang="ru-RU" dirty="0"/>
+              <a:t>запуска программы через </a:t>
+            </a:r>
+            <a:r>
+              <a:rPr lang="en-US" dirty="0"/>
+              <a:t>bat</a:t>
+            </a:r>
+            <a:r>
+              <a:rPr lang="ru-RU" dirty="0"/>
+              <a:t>-файл</a:t>
+            </a:r>
+          </a:p>
+          <a:p>
+            <a:pPr marL="0" indent="0">
+              <a:buNone/>
+            </a:pPr>
+            <a:r>
+              <a:rPr lang="ru-RU" dirty="0"/>
+              <a:t> </a:t>
+            </a:r>
+          </a:p>
+          <a:p>
+            <a:pPr marL="0" indent="0">
+              <a:buNone/>
+            </a:pPr>
+            <a:r>
+              <a:rPr lang="ru-RU" b="1" dirty="0"/>
+              <a:t>Павлова Маргарита:</a:t>
+            </a:r>
+          </a:p>
+          <a:p>
+            <a:r>
+              <a:rPr lang="ru-RU" dirty="0" smtClean="0"/>
+              <a:t>выполнение </a:t>
+            </a:r>
+            <a:r>
+              <a:rPr lang="en-US" dirty="0"/>
+              <a:t>User Story</a:t>
+            </a:r>
+            <a:endParaRPr lang="ru-RU" dirty="0"/>
+          </a:p>
+          <a:p>
+            <a:r>
+              <a:rPr lang="ru-RU" dirty="0" smtClean="0"/>
+              <a:t>настройка </a:t>
+            </a:r>
+            <a:r>
+              <a:rPr lang="en-US" dirty="0" err="1"/>
+              <a:t>targetprocess</a:t>
+            </a:r>
+            <a:r>
+              <a:rPr lang="ru-RU" dirty="0"/>
+              <a:t>.</a:t>
+            </a:r>
+            <a:r>
+              <a:rPr lang="en-US" dirty="0"/>
+              <a:t>com</a:t>
+            </a:r>
+            <a:r>
+              <a:rPr lang="ru-RU" dirty="0"/>
+              <a:t> для распределения задач между студентами</a:t>
+            </a:r>
+          </a:p>
+          <a:p>
+            <a:r>
+              <a:rPr lang="ru-RU" dirty="0" smtClean="0"/>
+              <a:t>настройка </a:t>
+            </a:r>
+            <a:r>
+              <a:rPr lang="ru-RU" dirty="0"/>
+              <a:t>запуска программы через </a:t>
+            </a:r>
+            <a:r>
+              <a:rPr lang="en-US" dirty="0"/>
+              <a:t>bat</a:t>
+            </a:r>
+            <a:r>
+              <a:rPr lang="ru-RU" dirty="0"/>
+              <a:t>-файл</a:t>
+            </a:r>
+          </a:p>
+          <a:p>
+            <a:pPr marL="0" indent="0">
+              <a:buNone/>
+            </a:pPr>
+            <a:endParaRPr lang="ru-RU" dirty="0"/>
+          </a:p>
+        </p:txBody>
+      </p:sp>
+    </p:spTree>
+    <p:extLst>
+      <p:ext uri="{BB962C8B-B14F-4D97-AF65-F5344CB8AC3E}">
+        <p14:creationId xmlns:p14="http://schemas.microsoft.com/office/powerpoint/2010/main" val="2672678260"/>
+      </p:ext>
+    </p:extLst>
+  </p:cSld>
+  <p:clrMapOvr>
+    <a:masterClrMapping/>
+  </p:clrMapOvr>
+  <p:timing>
+    <p:tnLst>
+      <p:par>
+        <p:cTn id="1" dur="indefinite" restart="never" nodeType="tmRoot"/>
+      </p:par>
+    </p:tnLst>
+  </p:timing>
+</p:sld>
+</file>
+
+<file path=ppt/slides/slide15.xml><?xml version="1.0" encoding="utf-8"?>
+<p:sld xmlns:a="http://schemas.openxmlformats.org/drawingml/2006/main" xmlns:r="http://schemas.openxmlformats.org/officeDocument/2006/relationships" xmlns:p="http://schemas.openxmlformats.org/presentationml/2006/main">
+  <p:cSld>
+    <p:spTree>
+      <p:nvGrpSpPr>
+        <p:cNvPr id="1" name=""/>
+        <p:cNvGrpSpPr/>
+        <p:nvPr/>
+      </p:nvGrpSpPr>
+      <p:grpSpPr>
+        <a:xfrm>
+          <a:off x="0" y="0"/>
+          <a:ext cx="0" cy="0"/>
+          <a:chOff x="0" y="0"/>
+          <a:chExt cx="0" cy="0"/>
+        </a:xfrm>
+      </p:grpSpPr>
+      <p:sp>
+        <p:nvSpPr>
+          <p:cNvPr id="2" name="Заголовок 1"/>
+          <p:cNvSpPr>
+            <a:spLocks noGrp="1"/>
+          </p:cNvSpPr>
+          <p:nvPr>
+            <p:ph type="title"/>
+          </p:nvPr>
+        </p:nvSpPr>
+        <p:spPr/>
+        <p:txBody>
+          <a:bodyPr/>
+          <a:lstStyle/>
+          <a:p>
+            <a:r>
+              <a:rPr lang="ru-RU" dirty="0"/>
+              <a:t>Вклад каждого студента</a:t>
+            </a:r>
+          </a:p>
+        </p:txBody>
+      </p:sp>
+      <p:sp>
+        <p:nvSpPr>
+          <p:cNvPr id="3" name="Объект 2"/>
+          <p:cNvSpPr>
+            <a:spLocks noGrp="1"/>
+          </p:cNvSpPr>
+          <p:nvPr>
+            <p:ph sz="quarter" idx="1"/>
+          </p:nvPr>
+        </p:nvSpPr>
+        <p:spPr/>
+        <p:txBody>
+          <a:bodyPr/>
+          <a:lstStyle/>
+          <a:p>
+            <a:pPr marL="0" indent="0">
+              <a:buNone/>
+            </a:pPr>
+            <a:r>
+              <a:rPr lang="ru-RU" b="1" dirty="0"/>
+              <a:t>Козлова Виталия:</a:t>
+            </a:r>
+          </a:p>
+          <a:p>
+            <a:r>
+              <a:rPr lang="ru-RU" dirty="0" smtClean="0"/>
+              <a:t>выполнение </a:t>
+            </a:r>
+            <a:r>
+              <a:rPr lang="en-US" dirty="0"/>
+              <a:t>User Story</a:t>
+            </a:r>
+            <a:endParaRPr lang="ru-RU" dirty="0"/>
+          </a:p>
+          <a:p>
+            <a:r>
+              <a:rPr lang="ru-RU" dirty="0" smtClean="0"/>
+              <a:t>добавление </a:t>
+            </a:r>
+            <a:r>
+              <a:rPr lang="ru-RU" dirty="0"/>
+              <a:t>таблицы в базу </a:t>
+            </a:r>
+            <a:r>
+              <a:rPr lang="ru-RU" dirty="0" smtClean="0"/>
+              <a:t>данных</a:t>
+            </a:r>
+            <a:endParaRPr lang="en-US" dirty="0" smtClean="0"/>
+          </a:p>
+          <a:p>
+            <a:r>
+              <a:rPr lang="ru-RU" dirty="0"/>
+              <a:t> </a:t>
+            </a:r>
+          </a:p>
+          <a:p>
+            <a:pPr marL="0" indent="0">
+              <a:buNone/>
+            </a:pPr>
+            <a:r>
+              <a:rPr lang="ru-RU" b="1" dirty="0" err="1"/>
+              <a:t>Барашко</a:t>
+            </a:r>
+            <a:r>
+              <a:rPr lang="ru-RU" b="1" dirty="0"/>
+              <a:t> Мария:</a:t>
+            </a:r>
+          </a:p>
+          <a:p>
+            <a:r>
+              <a:rPr lang="ru-RU" dirty="0" smtClean="0"/>
+              <a:t>выполнение </a:t>
+            </a:r>
+            <a:r>
+              <a:rPr lang="en-US" dirty="0"/>
+              <a:t>User Story</a:t>
+            </a:r>
+            <a:endParaRPr lang="ru-RU" dirty="0"/>
+          </a:p>
+          <a:p>
+            <a:endParaRPr lang="ru-RU" dirty="0"/>
+          </a:p>
+        </p:txBody>
+      </p:sp>
+    </p:spTree>
+    <p:extLst>
+      <p:ext uri="{BB962C8B-B14F-4D97-AF65-F5344CB8AC3E}">
+        <p14:creationId xmlns:p14="http://schemas.microsoft.com/office/powerpoint/2010/main" val="283242137"/>
+      </p:ext>
+    </p:extLst>
+  </p:cSld>
+  <p:clrMapOvr>
+    <a:masterClrMapping/>
+  </p:clrMapOvr>
+  <p:timing>
+    <p:tnLst>
+      <p:par>
+        <p:cTn id="1" dur="indefinite" restart="never" nodeType="tmRoot"/>
+      </p:par>
+    </p:tnLst>
+  </p:timing>
+</p:sld>
+</file>
+
+<file path=ppt/slides/slide16.xml><?xml version="1.0" encoding="utf-8"?>
+<p:sld xmlns:a="http://schemas.openxmlformats.org/drawingml/2006/main" xmlns:r="http://schemas.openxmlformats.org/officeDocument/2006/relationships" xmlns:p="http://schemas.openxmlformats.org/presentationml/2006/main">
+  <p:cSld>
+    <p:spTree>
+      <p:nvGrpSpPr>
+        <p:cNvPr id="1" name=""/>
+        <p:cNvGrpSpPr/>
+        <p:nvPr/>
+      </p:nvGrpSpPr>
+      <p:grpSpPr>
+        <a:xfrm>
+          <a:off x="0" y="0"/>
+          <a:ext cx="0" cy="0"/>
+          <a:chOff x="0" y="0"/>
+          <a:chExt cx="0" cy="0"/>
+        </a:xfrm>
+      </p:grpSpPr>
+      <p:sp>
+        <p:nvSpPr>
+          <p:cNvPr id="2" name="Заголовок 1"/>
+          <p:cNvSpPr>
+            <a:spLocks noGrp="1"/>
+          </p:cNvSpPr>
+          <p:nvPr>
+            <p:ph type="title"/>
+          </p:nvPr>
+        </p:nvSpPr>
+        <p:spPr>
+          <a:xfrm>
+            <a:off x="899592" y="2204864"/>
+            <a:ext cx="7467600" cy="1143000"/>
+          </a:xfrm>
+        </p:spPr>
+        <p:txBody>
+          <a:bodyPr>
+            <a:noAutofit/>
+          </a:bodyPr>
+          <a:lstStyle/>
+          <a:p>
+            <a:pPr algn="ctr"/>
+            <a:r>
+              <a:rPr lang="ru-RU" sz="5400" b="1" dirty="0">
+                <a:solidFill>
+                  <a:schemeClr val="tx1"/>
+                </a:solidFill>
+              </a:rPr>
+              <a:t>Программный код</a:t>
+            </a:r>
+            <a:br>
+              <a:rPr lang="ru-RU" sz="5400" b="1" dirty="0">
+                <a:solidFill>
+                  <a:schemeClr val="tx1"/>
+                </a:solidFill>
+              </a:rPr>
+            </a:br>
+            <a:endParaRPr lang="ru-RU" sz="5400" b="1" dirty="0">
+              <a:solidFill>
+                <a:schemeClr val="tx1"/>
+              </a:solidFill>
+            </a:endParaRPr>
+          </a:p>
+        </p:txBody>
+      </p:sp>
+    </p:spTree>
+    <p:extLst>
+      <p:ext uri="{BB962C8B-B14F-4D97-AF65-F5344CB8AC3E}">
+        <p14:creationId xmlns:p14="http://schemas.microsoft.com/office/powerpoint/2010/main" val="1667233573"/>
+      </p:ext>
+    </p:extLst>
+  </p:cSld>
+  <p:clrMapOvr>
+    <a:masterClrMapping/>
+  </p:clrMapOvr>
+  <p:timing>
+    <p:tnLst>
+      <p:par>
+        <p:cTn id="1" dur="indefinite" restart="never" nodeType="tmRoot"/>
+      </p:par>
+    </p:tnLst>
+  </p:timing>
+</p:sld>
+</file>
+
+<file path=ppt/slides/slide17.xml><?xml version="1.0" encoding="utf-8"?>
+<p:sld xmlns:a="http://schemas.openxmlformats.org/drawingml/2006/main" xmlns:r="http://schemas.openxmlformats.org/officeDocument/2006/relationships" xmlns:p="http://schemas.openxmlformats.org/presentationml/2006/main">
+  <p:cSld>
+    <p:spTree>
+      <p:nvGrpSpPr>
+        <p:cNvPr id="1" name=""/>
+        <p:cNvGrpSpPr/>
+        <p:nvPr/>
+      </p:nvGrpSpPr>
+      <p:grpSpPr>
+        <a:xfrm>
+          <a:off x="0" y="0"/>
+          <a:ext cx="0" cy="0"/>
+          <a:chOff x="0" y="0"/>
+          <a:chExt cx="0" cy="0"/>
+        </a:xfrm>
+      </p:grpSpPr>
+      <p:sp>
+        <p:nvSpPr>
+          <p:cNvPr id="2" name="Заголовок 1"/>
+          <p:cNvSpPr>
+            <a:spLocks noGrp="1"/>
+          </p:cNvSpPr>
+          <p:nvPr>
+            <p:ph type="title"/>
+          </p:nvPr>
+        </p:nvSpPr>
         <p:spPr>
           <a:xfrm>
             <a:off x="251520" y="188640"/>
@@ -5825,7 +6527,7 @@
 </p:sld>
 </file>
 
-<file path=ppt/slides/slide13.xml><?xml version="1.0" encoding="utf-8"?>
+<file path=ppt/slides/slide18.xml><?xml version="1.0" encoding="utf-8"?>
 <p:sld xmlns:a="http://schemas.openxmlformats.org/drawingml/2006/main" xmlns:r="http://schemas.openxmlformats.org/officeDocument/2006/relationships" xmlns:p="http://schemas.openxmlformats.org/presentationml/2006/main">
   <p:cSld>
     <p:spTree>

</xml_diff>

<commit_message>
add code to ppt
</commit_message>
<xml_diff>
--- a/Спецкурс. Презентация.pptx
+++ b/Спецкурс. Презентация.pptx
@@ -23,6 +23,14 @@
     <p:sldId id="266" r:id="rId17"/>
     <p:sldId id="267" r:id="rId18"/>
     <p:sldId id="268" r:id="rId19"/>
+    <p:sldId id="278" r:id="rId20"/>
+    <p:sldId id="279" r:id="rId21"/>
+    <p:sldId id="280" r:id="rId22"/>
+    <p:sldId id="281" r:id="rId23"/>
+    <p:sldId id="283" r:id="rId24"/>
+    <p:sldId id="285" r:id="rId25"/>
+    <p:sldId id="286" r:id="rId26"/>
+    <p:sldId id="287" r:id="rId27"/>
   </p:sldIdLst>
   <p:sldSz cx="9144000" cy="6858000" type="screen4x3"/>
   <p:notesSz cx="6858000" cy="9144000"/>
@@ -261,7 +269,7 @@
           <a:p>
             <a:fld id="{7A95E4BD-7038-42D0-B34B-216E9C7F8F75}" type="datetimeFigureOut">
               <a:rPr lang="ru-RU" smtClean="0"/>
-              <a:t>09.12.2014</a:t>
+              <a:t>10.12.2014</a:t>
             </a:fld>
             <a:endParaRPr lang="ru-RU"/>
           </a:p>
@@ -1130,7 +1138,7 @@
           <a:p>
             <a:fld id="{7A95E4BD-7038-42D0-B34B-216E9C7F8F75}" type="datetimeFigureOut">
               <a:rPr lang="ru-RU" smtClean="0"/>
-              <a:t>09.12.2014</a:t>
+              <a:t>10.12.2014</a:t>
             </a:fld>
             <a:endParaRPr lang="ru-RU"/>
           </a:p>
@@ -1305,7 +1313,7 @@
           <a:p>
             <a:fld id="{7A95E4BD-7038-42D0-B34B-216E9C7F8F75}" type="datetimeFigureOut">
               <a:rPr lang="ru-RU" smtClean="0"/>
-              <a:t>09.12.2014</a:t>
+              <a:t>10.12.2014</a:t>
             </a:fld>
             <a:endParaRPr lang="ru-RU"/>
           </a:p>
@@ -1475,7 +1483,7 @@
           <a:p>
             <a:fld id="{7A95E4BD-7038-42D0-B34B-216E9C7F8F75}" type="datetimeFigureOut">
               <a:rPr lang="ru-RU" smtClean="0"/>
-              <a:t>09.12.2014</a:t>
+              <a:t>10.12.2014</a:t>
             </a:fld>
             <a:endParaRPr lang="ru-RU"/>
           </a:p>
@@ -1685,7 +1693,7 @@
           <a:p>
             <a:fld id="{7A95E4BD-7038-42D0-B34B-216E9C7F8F75}" type="datetimeFigureOut">
               <a:rPr lang="ru-RU" smtClean="0"/>
-              <a:t>09.12.2014</a:t>
+              <a:t>10.12.2014</a:t>
             </a:fld>
             <a:endParaRPr lang="ru-RU"/>
           </a:p>
@@ -2499,7 +2507,7 @@
           <a:p>
             <a:fld id="{7A95E4BD-7038-42D0-B34B-216E9C7F8F75}" type="datetimeFigureOut">
               <a:rPr lang="ru-RU" smtClean="0"/>
-              <a:t>09.12.2014</a:t>
+              <a:t>10.12.2014</a:t>
             </a:fld>
             <a:endParaRPr lang="ru-RU"/>
           </a:p>
@@ -2735,7 +2743,7 @@
           <a:p>
             <a:fld id="{7A95E4BD-7038-42D0-B34B-216E9C7F8F75}" type="datetimeFigureOut">
               <a:rPr lang="ru-RU" smtClean="0"/>
-              <a:t>09.12.2014</a:t>
+              <a:t>10.12.2014</a:t>
             </a:fld>
             <a:endParaRPr lang="ru-RU"/>
           </a:p>
@@ -3058,7 +3066,7 @@
           <a:p>
             <a:fld id="{7A95E4BD-7038-42D0-B34B-216E9C7F8F75}" type="datetimeFigureOut">
               <a:rPr lang="ru-RU" smtClean="0"/>
-              <a:t>09.12.2014</a:t>
+              <a:t>10.12.2014</a:t>
             </a:fld>
             <a:endParaRPr lang="ru-RU"/>
           </a:p>
@@ -3148,7 +3156,7 @@
           <a:p>
             <a:fld id="{7A95E4BD-7038-42D0-B34B-216E9C7F8F75}" type="datetimeFigureOut">
               <a:rPr lang="ru-RU" smtClean="0"/>
-              <a:t>09.12.2014</a:t>
+              <a:t>10.12.2014</a:t>
             </a:fld>
             <a:endParaRPr lang="ru-RU"/>
           </a:p>
@@ -3665,7 +3673,7 @@
           <a:p>
             <a:fld id="{7A95E4BD-7038-42D0-B34B-216E9C7F8F75}" type="datetimeFigureOut">
               <a:rPr lang="ru-RU" smtClean="0"/>
-              <a:t>09.12.2014</a:t>
+              <a:t>10.12.2014</a:t>
             </a:fld>
             <a:endParaRPr lang="ru-RU"/>
           </a:p>
@@ -4176,7 +4184,7 @@
           <a:p>
             <a:fld id="{7A95E4BD-7038-42D0-B34B-216E9C7F8F75}" type="datetimeFigureOut">
               <a:rPr lang="ru-RU" smtClean="0"/>
-              <a:t>09.12.2014</a:t>
+              <a:t>10.12.2014</a:t>
             </a:fld>
             <a:endParaRPr lang="ru-RU"/>
           </a:p>
@@ -4421,7 +4429,7 @@
           <a:p>
             <a:fld id="{7A95E4BD-7038-42D0-B34B-216E9C7F8F75}" type="datetimeFigureOut">
               <a:rPr lang="ru-RU" smtClean="0"/>
-              <a:t>09.12.2014</a:t>
+              <a:t>10.12.2014</a:t>
             </a:fld>
             <a:endParaRPr lang="ru-RU"/>
           </a:p>
@@ -6940,6 +6948,322 @@
 </p:sld>
 </file>
 
+<file path=ppt/slides/slide19.xml><?xml version="1.0" encoding="utf-8"?>
+<p:sld xmlns:a="http://schemas.openxmlformats.org/drawingml/2006/main" xmlns:r="http://schemas.openxmlformats.org/officeDocument/2006/relationships" xmlns:p="http://schemas.openxmlformats.org/presentationml/2006/main">
+  <p:cSld>
+    <p:spTree>
+      <p:nvGrpSpPr>
+        <p:cNvPr id="1" name=""/>
+        <p:cNvGrpSpPr/>
+        <p:nvPr/>
+      </p:nvGrpSpPr>
+      <p:grpSpPr>
+        <a:xfrm>
+          <a:off x="0" y="0"/>
+          <a:ext cx="0" cy="0"/>
+          <a:chOff x="0" y="0"/>
+          <a:chExt cx="0" cy="0"/>
+        </a:xfrm>
+      </p:grpSpPr>
+      <p:sp>
+        <p:nvSpPr>
+          <p:cNvPr id="2" name="Заголовок 1"/>
+          <p:cNvSpPr>
+            <a:spLocks noGrp="1"/>
+          </p:cNvSpPr>
+          <p:nvPr>
+            <p:ph type="title"/>
+          </p:nvPr>
+        </p:nvSpPr>
+        <p:spPr/>
+        <p:txBody>
+          <a:bodyPr>
+            <a:normAutofit/>
+          </a:bodyPr>
+          <a:lstStyle/>
+          <a:p>
+            <a:pPr algn="ctr"/>
+            <a:r>
+              <a:rPr lang="ru-RU" sz="3600" dirty="0" smtClean="0"/>
+              <a:t>Маргарита Павлова</a:t>
+            </a:r>
+            <a:br>
+              <a:rPr lang="ru-RU" sz="3600" dirty="0" smtClean="0"/>
+            </a:br>
+            <a:r>
+              <a:rPr lang="ru-RU" sz="3200" b="1" u="sng" dirty="0" smtClean="0">
+                <a:solidFill>
+                  <a:schemeClr val="tx1"/>
+                </a:solidFill>
+              </a:rPr>
+              <a:t>Действия </a:t>
+            </a:r>
+            <a:r>
+              <a:rPr lang="ru-RU" sz="3200" b="1" u="sng" dirty="0" err="1" smtClean="0">
+                <a:solidFill>
+                  <a:schemeClr val="tx1"/>
+                </a:solidFill>
+              </a:rPr>
+              <a:t>операциониста</a:t>
+            </a:r>
+            <a:endParaRPr lang="ru-RU" dirty="0"/>
+          </a:p>
+        </p:txBody>
+      </p:sp>
+      <p:sp>
+        <p:nvSpPr>
+          <p:cNvPr id="3" name="Объект 2"/>
+          <p:cNvSpPr>
+            <a:spLocks noGrp="1"/>
+          </p:cNvSpPr>
+          <p:nvPr>
+            <p:ph sz="quarter" idx="1"/>
+          </p:nvPr>
+        </p:nvSpPr>
+        <p:spPr/>
+        <p:txBody>
+          <a:bodyPr>
+            <a:normAutofit fontScale="55000" lnSpcReduction="20000"/>
+          </a:bodyPr>
+          <a:lstStyle/>
+          <a:p>
+            <a:pPr marL="0" indent="0">
+              <a:buNone/>
+            </a:pPr>
+            <a:r>
+              <a:rPr lang="en-US" dirty="0" err="1"/>
+              <a:t>int</a:t>
+            </a:r>
+            <a:r>
+              <a:rPr lang="en-US" dirty="0"/>
+              <a:t> </a:t>
+            </a:r>
+            <a:r>
+              <a:rPr lang="en-US" dirty="0" err="1"/>
+              <a:t>addMoney</a:t>
+            </a:r>
+            <a:r>
+              <a:rPr lang="en-US" dirty="0"/>
+              <a:t>(</a:t>
+            </a:r>
+            <a:r>
+              <a:rPr lang="en-US" dirty="0" err="1"/>
+              <a:t>int</a:t>
+            </a:r>
+            <a:r>
+              <a:rPr lang="en-US" dirty="0"/>
+              <a:t> &amp; balance1, </a:t>
+            </a:r>
+            <a:r>
+              <a:rPr lang="en-US" dirty="0" err="1"/>
+              <a:t>int</a:t>
+            </a:r>
+            <a:r>
+              <a:rPr lang="en-US" dirty="0"/>
+              <a:t> totalTransaction1, </a:t>
+            </a:r>
+            <a:r>
+              <a:rPr lang="en-US" dirty="0" err="1"/>
+              <a:t>int</a:t>
+            </a:r>
+            <a:r>
+              <a:rPr lang="en-US" dirty="0"/>
+              <a:t> currentBalance1, </a:t>
+            </a:r>
+            <a:r>
+              <a:rPr lang="en-US" dirty="0" err="1"/>
+              <a:t>int</a:t>
+            </a:r>
+            <a:r>
+              <a:rPr lang="en-US" dirty="0"/>
+              <a:t> &amp; currentTransaction1,int monthlyQuota1 ){</a:t>
+            </a:r>
+          </a:p>
+          <a:p>
+            <a:pPr marL="0" indent="0">
+              <a:buNone/>
+            </a:pPr>
+            <a:r>
+              <a:rPr lang="en-US" dirty="0"/>
+              <a:t>	</a:t>
+            </a:r>
+            <a:r>
+              <a:rPr lang="en-US" dirty="0" err="1"/>
+              <a:t>int</a:t>
+            </a:r>
+            <a:r>
+              <a:rPr lang="en-US" dirty="0"/>
+              <a:t> fee = 0;</a:t>
+            </a:r>
+          </a:p>
+          <a:p>
+            <a:pPr marL="0" indent="0">
+              <a:buNone/>
+            </a:pPr>
+            <a:r>
+              <a:rPr lang="en-US" dirty="0"/>
+              <a:t>	if (totalTransaction1 &lt; currentTransaction1){</a:t>
+            </a:r>
+          </a:p>
+          <a:p>
+            <a:pPr marL="0" indent="0">
+              <a:buNone/>
+            </a:pPr>
+            <a:r>
+              <a:rPr lang="en-US" dirty="0"/>
+              <a:t>		fee = (currentTransaction1 + 1 - totalTransaction1) * monthlyQuota1;</a:t>
+            </a:r>
+          </a:p>
+          <a:p>
+            <a:pPr marL="0" indent="0">
+              <a:buNone/>
+            </a:pPr>
+            <a:r>
+              <a:rPr lang="en-US" dirty="0"/>
+              <a:t>	}</a:t>
+            </a:r>
+          </a:p>
+          <a:p>
+            <a:pPr marL="0" indent="0">
+              <a:buNone/>
+            </a:pPr>
+            <a:r>
+              <a:rPr lang="en-US" dirty="0"/>
+              <a:t>	if( balance1 + currentBalance1 - fee &lt; 0){</a:t>
+            </a:r>
+          </a:p>
+          <a:p>
+            <a:pPr marL="0" indent="0">
+              <a:buNone/>
+            </a:pPr>
+            <a:r>
+              <a:rPr lang="en-US" dirty="0"/>
+              <a:t>		</a:t>
+            </a:r>
+            <a:r>
+              <a:rPr lang="en-US" dirty="0" err="1"/>
+              <a:t>printf</a:t>
+            </a:r>
+            <a:r>
+              <a:rPr lang="en-US" dirty="0"/>
+              <a:t>("It is not possible to commit the transaction\n");</a:t>
+            </a:r>
+          </a:p>
+          <a:p>
+            <a:pPr marL="0" indent="0">
+              <a:buNone/>
+            </a:pPr>
+            <a:r>
+              <a:rPr lang="en-US" dirty="0"/>
+              <a:t>		return -1;</a:t>
+            </a:r>
+          </a:p>
+          <a:p>
+            <a:pPr marL="0" indent="0">
+              <a:buNone/>
+            </a:pPr>
+            <a:r>
+              <a:rPr lang="en-US" dirty="0"/>
+              <a:t>	}</a:t>
+            </a:r>
+          </a:p>
+          <a:p>
+            <a:pPr marL="0" indent="0">
+              <a:buNone/>
+            </a:pPr>
+            <a:r>
+              <a:rPr lang="en-US" dirty="0"/>
+              <a:t>	currentTransaction1++;</a:t>
+            </a:r>
+          </a:p>
+          <a:p>
+            <a:pPr marL="0" indent="0">
+              <a:buNone/>
+            </a:pPr>
+            <a:r>
+              <a:rPr lang="en-US" dirty="0"/>
+              <a:t>	if(currentTransaction1 &gt; totalTransaction1){</a:t>
+            </a:r>
+          </a:p>
+          <a:p>
+            <a:pPr marL="0" indent="0">
+              <a:buNone/>
+            </a:pPr>
+            <a:r>
+              <a:rPr lang="en-US" dirty="0"/>
+              <a:t>		balance1 = balance1 + currentBalance1 - fee;</a:t>
+            </a:r>
+          </a:p>
+          <a:p>
+            <a:pPr marL="0" indent="0">
+              <a:buNone/>
+            </a:pPr>
+            <a:r>
+              <a:rPr lang="en-US" dirty="0"/>
+              <a:t>	} else{</a:t>
+            </a:r>
+          </a:p>
+          <a:p>
+            <a:pPr marL="0" indent="0">
+              <a:buNone/>
+            </a:pPr>
+            <a:r>
+              <a:rPr lang="en-US" dirty="0"/>
+              <a:t>		balance1 = balance1 + currentBalance1;</a:t>
+            </a:r>
+          </a:p>
+          <a:p>
+            <a:pPr marL="0" indent="0">
+              <a:buNone/>
+            </a:pPr>
+            <a:r>
+              <a:rPr lang="en-US" dirty="0"/>
+              <a:t>	}</a:t>
+            </a:r>
+          </a:p>
+          <a:p>
+            <a:pPr marL="0" indent="0">
+              <a:buNone/>
+            </a:pPr>
+            <a:r>
+              <a:rPr lang="en-US" dirty="0"/>
+              <a:t>	return 0;</a:t>
+            </a:r>
+          </a:p>
+          <a:p>
+            <a:pPr marL="0" indent="0">
+              <a:buNone/>
+            </a:pPr>
+            <a:r>
+              <a:rPr lang="en-US" dirty="0"/>
+              <a:t>}</a:t>
+            </a:r>
+          </a:p>
+          <a:p>
+            <a:pPr marL="0" indent="0">
+              <a:buNone/>
+            </a:pPr>
+            <a:r>
+              <a:rPr lang="en-US" dirty="0" smtClean="0"/>
+              <a:t>}</a:t>
+            </a:r>
+            <a:endParaRPr lang="ru-RU" dirty="0"/>
+          </a:p>
+        </p:txBody>
+      </p:sp>
+    </p:spTree>
+    <p:extLst>
+      <p:ext uri="{BB962C8B-B14F-4D97-AF65-F5344CB8AC3E}">
+        <p14:creationId xmlns:p14="http://schemas.microsoft.com/office/powerpoint/2010/main" val="345863046"/>
+      </p:ext>
+    </p:extLst>
+  </p:cSld>
+  <p:clrMapOvr>
+    <a:masterClrMapping/>
+  </p:clrMapOvr>
+</p:sld>
+</file>
+
 <file path=ppt/slides/slide2.xml><?xml version="1.0" encoding="utf-8"?>
 <p:sld xmlns:a="http://schemas.openxmlformats.org/drawingml/2006/main" xmlns:r="http://schemas.openxmlformats.org/officeDocument/2006/relationships" xmlns:p="http://schemas.openxmlformats.org/presentationml/2006/main">
   <p:cSld>
@@ -7090,6 +7414,2903 @@
       </p:par>
     </p:tnLst>
   </p:timing>
+</p:sld>
+</file>
+
+<file path=ppt/slides/slide20.xml><?xml version="1.0" encoding="utf-8"?>
+<p:sld xmlns:a="http://schemas.openxmlformats.org/drawingml/2006/main" xmlns:r="http://schemas.openxmlformats.org/officeDocument/2006/relationships" xmlns:p="http://schemas.openxmlformats.org/presentationml/2006/main">
+  <p:cSld>
+    <p:spTree>
+      <p:nvGrpSpPr>
+        <p:cNvPr id="1" name=""/>
+        <p:cNvGrpSpPr/>
+        <p:nvPr/>
+      </p:nvGrpSpPr>
+      <p:grpSpPr>
+        <a:xfrm>
+          <a:off x="0" y="0"/>
+          <a:ext cx="0" cy="0"/>
+          <a:chOff x="0" y="0"/>
+          <a:chExt cx="0" cy="0"/>
+        </a:xfrm>
+      </p:grpSpPr>
+      <p:sp>
+        <p:nvSpPr>
+          <p:cNvPr id="2" name="Заголовок 1"/>
+          <p:cNvSpPr>
+            <a:spLocks noGrp="1"/>
+          </p:cNvSpPr>
+          <p:nvPr>
+            <p:ph type="title"/>
+          </p:nvPr>
+        </p:nvSpPr>
+        <p:spPr/>
+        <p:txBody>
+          <a:bodyPr/>
+          <a:lstStyle/>
+          <a:p>
+            <a:endParaRPr lang="ru-RU"/>
+          </a:p>
+        </p:txBody>
+      </p:sp>
+      <p:sp>
+        <p:nvSpPr>
+          <p:cNvPr id="3" name="Объект 2"/>
+          <p:cNvSpPr>
+            <a:spLocks noGrp="1"/>
+          </p:cNvSpPr>
+          <p:nvPr>
+            <p:ph sz="quarter" idx="1"/>
+          </p:nvPr>
+        </p:nvSpPr>
+        <p:spPr/>
+        <p:txBody>
+          <a:bodyPr>
+            <a:normAutofit fontScale="62500" lnSpcReduction="20000"/>
+          </a:bodyPr>
+          <a:lstStyle/>
+          <a:p>
+            <a:pPr marL="0" indent="0">
+              <a:buNone/>
+            </a:pPr>
+            <a:r>
+              <a:rPr lang="en-US" dirty="0" err="1"/>
+              <a:t>int</a:t>
+            </a:r>
+            <a:r>
+              <a:rPr lang="en-US" dirty="0"/>
+              <a:t> </a:t>
+            </a:r>
+            <a:r>
+              <a:rPr lang="en-US" dirty="0" err="1"/>
+              <a:t>withdrawMoney</a:t>
+            </a:r>
+            <a:r>
+              <a:rPr lang="en-US" dirty="0"/>
+              <a:t>(</a:t>
+            </a:r>
+            <a:r>
+              <a:rPr lang="en-US" dirty="0" err="1"/>
+              <a:t>int</a:t>
+            </a:r>
+            <a:r>
+              <a:rPr lang="en-US" dirty="0"/>
+              <a:t> &amp; balance1, </a:t>
+            </a:r>
+            <a:r>
+              <a:rPr lang="en-US" dirty="0" err="1"/>
+              <a:t>int</a:t>
+            </a:r>
+            <a:r>
+              <a:rPr lang="en-US" dirty="0"/>
+              <a:t> totalTransaction1, </a:t>
+            </a:r>
+            <a:r>
+              <a:rPr lang="en-US" dirty="0" err="1"/>
+              <a:t>int</a:t>
+            </a:r>
+            <a:r>
+              <a:rPr lang="en-US" dirty="0"/>
+              <a:t> currentBalance1, </a:t>
+            </a:r>
+            <a:r>
+              <a:rPr lang="en-US" dirty="0" err="1"/>
+              <a:t>int</a:t>
+            </a:r>
+            <a:r>
+              <a:rPr lang="en-US" dirty="0"/>
+              <a:t> &amp; currentTransaction1,int monthlyQuota1 ){</a:t>
+            </a:r>
+          </a:p>
+          <a:p>
+            <a:pPr marL="0" indent="0">
+              <a:buNone/>
+            </a:pPr>
+            <a:r>
+              <a:rPr lang="en-US" dirty="0"/>
+              <a:t>	</a:t>
+            </a:r>
+            <a:r>
+              <a:rPr lang="en-US" dirty="0" err="1"/>
+              <a:t>int</a:t>
+            </a:r>
+            <a:r>
+              <a:rPr lang="en-US" dirty="0"/>
+              <a:t> fee = 0;</a:t>
+            </a:r>
+          </a:p>
+          <a:p>
+            <a:pPr marL="0" indent="0">
+              <a:buNone/>
+            </a:pPr>
+            <a:r>
+              <a:rPr lang="en-US" dirty="0"/>
+              <a:t>	if (totalTransaction1 &lt; currentTransaction1){</a:t>
+            </a:r>
+          </a:p>
+          <a:p>
+            <a:pPr marL="0" indent="0">
+              <a:buNone/>
+            </a:pPr>
+            <a:r>
+              <a:rPr lang="en-US" dirty="0"/>
+              <a:t>		fee = (currentTransaction1 + 1 - totalTransaction1) * monthlyQuota1;</a:t>
+            </a:r>
+          </a:p>
+          <a:p>
+            <a:pPr marL="0" indent="0">
+              <a:buNone/>
+            </a:pPr>
+            <a:r>
+              <a:rPr lang="en-US" dirty="0"/>
+              <a:t>	}</a:t>
+            </a:r>
+          </a:p>
+          <a:p>
+            <a:pPr marL="0" indent="0">
+              <a:buNone/>
+            </a:pPr>
+            <a:r>
+              <a:rPr lang="en-US" dirty="0"/>
+              <a:t>	if(currentBalance1 - balance1 - fee &lt; 0){</a:t>
+            </a:r>
+          </a:p>
+          <a:p>
+            <a:pPr marL="0" indent="0">
+              <a:buNone/>
+            </a:pPr>
+            <a:r>
+              <a:rPr lang="en-US" dirty="0"/>
+              <a:t>		</a:t>
+            </a:r>
+            <a:r>
+              <a:rPr lang="en-US" dirty="0" err="1"/>
+              <a:t>printf</a:t>
+            </a:r>
+            <a:r>
+              <a:rPr lang="en-US" dirty="0"/>
+              <a:t>("It is not possible to commit the transaction\n");</a:t>
+            </a:r>
+          </a:p>
+          <a:p>
+            <a:pPr marL="0" indent="0">
+              <a:buNone/>
+            </a:pPr>
+            <a:r>
+              <a:rPr lang="en-US" dirty="0"/>
+              <a:t>		return -1;</a:t>
+            </a:r>
+          </a:p>
+          <a:p>
+            <a:pPr marL="0" indent="0">
+              <a:buNone/>
+            </a:pPr>
+            <a:r>
+              <a:rPr lang="en-US" dirty="0"/>
+              <a:t>	}</a:t>
+            </a:r>
+          </a:p>
+          <a:p>
+            <a:pPr marL="0" indent="0">
+              <a:buNone/>
+            </a:pPr>
+            <a:r>
+              <a:rPr lang="en-US" dirty="0"/>
+              <a:t>	currentTransaction1++;</a:t>
+            </a:r>
+          </a:p>
+          <a:p>
+            <a:pPr marL="0" indent="0">
+              <a:buNone/>
+            </a:pPr>
+            <a:r>
+              <a:rPr lang="en-US" dirty="0"/>
+              <a:t>	if(currentTransaction1 &gt; totalTransaction1){</a:t>
+            </a:r>
+          </a:p>
+          <a:p>
+            <a:pPr marL="0" indent="0">
+              <a:buNone/>
+            </a:pPr>
+            <a:r>
+              <a:rPr lang="en-US" dirty="0"/>
+              <a:t>		balance1 = currentBalance1 - balance1 - fee;</a:t>
+            </a:r>
+          </a:p>
+          <a:p>
+            <a:pPr marL="0" indent="0">
+              <a:buNone/>
+            </a:pPr>
+            <a:r>
+              <a:rPr lang="en-US" dirty="0"/>
+              <a:t>	} else{</a:t>
+            </a:r>
+          </a:p>
+          <a:p>
+            <a:pPr marL="0" indent="0">
+              <a:buNone/>
+            </a:pPr>
+            <a:r>
+              <a:rPr lang="en-US" dirty="0"/>
+              <a:t>		balance1 = currentBalance1 - balance1;</a:t>
+            </a:r>
+          </a:p>
+          <a:p>
+            <a:pPr marL="0" indent="0">
+              <a:buNone/>
+            </a:pPr>
+            <a:r>
+              <a:rPr lang="en-US" dirty="0"/>
+              <a:t>	}</a:t>
+            </a:r>
+          </a:p>
+          <a:p>
+            <a:pPr marL="0" indent="0">
+              <a:buNone/>
+            </a:pPr>
+            <a:r>
+              <a:rPr lang="en-US" dirty="0"/>
+              <a:t>	return 0;</a:t>
+            </a:r>
+          </a:p>
+          <a:p>
+            <a:pPr marL="0" indent="0">
+              <a:buNone/>
+            </a:pPr>
+            <a:endParaRPr lang="ru-RU" dirty="0"/>
+          </a:p>
+        </p:txBody>
+      </p:sp>
+    </p:spTree>
+    <p:extLst>
+      <p:ext uri="{BB962C8B-B14F-4D97-AF65-F5344CB8AC3E}">
+        <p14:creationId xmlns:p14="http://schemas.microsoft.com/office/powerpoint/2010/main" val="1028935381"/>
+      </p:ext>
+    </p:extLst>
+  </p:cSld>
+  <p:clrMapOvr>
+    <a:masterClrMapping/>
+  </p:clrMapOvr>
+</p:sld>
+</file>
+
+<file path=ppt/slides/slide21.xml><?xml version="1.0" encoding="utf-8"?>
+<p:sld xmlns:a="http://schemas.openxmlformats.org/drawingml/2006/main" xmlns:r="http://schemas.openxmlformats.org/officeDocument/2006/relationships" xmlns:p="http://schemas.openxmlformats.org/presentationml/2006/main">
+  <p:cSld>
+    <p:spTree>
+      <p:nvGrpSpPr>
+        <p:cNvPr id="1" name=""/>
+        <p:cNvGrpSpPr/>
+        <p:nvPr/>
+      </p:nvGrpSpPr>
+      <p:grpSpPr>
+        <a:xfrm>
+          <a:off x="0" y="0"/>
+          <a:ext cx="0" cy="0"/>
+          <a:chOff x="0" y="0"/>
+          <a:chExt cx="0" cy="0"/>
+        </a:xfrm>
+      </p:grpSpPr>
+      <p:sp>
+        <p:nvSpPr>
+          <p:cNvPr id="2" name="Заголовок 1"/>
+          <p:cNvSpPr>
+            <a:spLocks noGrp="1"/>
+          </p:cNvSpPr>
+          <p:nvPr>
+            <p:ph type="title"/>
+          </p:nvPr>
+        </p:nvSpPr>
+        <p:spPr/>
+        <p:txBody>
+          <a:bodyPr/>
+          <a:lstStyle/>
+          <a:p>
+            <a:endParaRPr lang="ru-RU"/>
+          </a:p>
+        </p:txBody>
+      </p:sp>
+      <p:sp>
+        <p:nvSpPr>
+          <p:cNvPr id="3" name="Объект 2"/>
+          <p:cNvSpPr>
+            <a:spLocks noGrp="1"/>
+          </p:cNvSpPr>
+          <p:nvPr>
+            <p:ph sz="quarter" idx="1"/>
+          </p:nvPr>
+        </p:nvSpPr>
+        <p:spPr/>
+        <p:txBody>
+          <a:bodyPr>
+            <a:normAutofit fontScale="62500" lnSpcReduction="20000"/>
+          </a:bodyPr>
+          <a:lstStyle/>
+          <a:p>
+            <a:pPr marL="0" indent="0">
+              <a:buNone/>
+            </a:pPr>
+            <a:r>
+              <a:rPr lang="en-US" dirty="0"/>
+              <a:t>static </a:t>
+            </a:r>
+            <a:r>
+              <a:rPr lang="en-US" dirty="0" err="1"/>
+              <a:t>int</a:t>
+            </a:r>
+            <a:r>
+              <a:rPr lang="en-US" dirty="0"/>
+              <a:t> </a:t>
+            </a:r>
+            <a:r>
+              <a:rPr lang="en-US" dirty="0" err="1"/>
+              <a:t>showList</a:t>
+            </a:r>
+            <a:r>
+              <a:rPr lang="en-US" dirty="0"/>
+              <a:t>(void *data, </a:t>
+            </a:r>
+            <a:r>
+              <a:rPr lang="en-US" dirty="0" err="1"/>
+              <a:t>int</a:t>
+            </a:r>
+            <a:r>
+              <a:rPr lang="en-US" dirty="0"/>
+              <a:t> </a:t>
+            </a:r>
+            <a:r>
+              <a:rPr lang="en-US" dirty="0" err="1"/>
+              <a:t>argc</a:t>
+            </a:r>
+            <a:r>
+              <a:rPr lang="en-US" dirty="0"/>
+              <a:t>, char **</a:t>
+            </a:r>
+            <a:r>
+              <a:rPr lang="en-US" dirty="0" err="1"/>
+              <a:t>argv</a:t>
+            </a:r>
+            <a:r>
+              <a:rPr lang="en-US" dirty="0"/>
+              <a:t>, char **</a:t>
+            </a:r>
+            <a:r>
+              <a:rPr lang="en-US" dirty="0" err="1"/>
+              <a:t>azColName</a:t>
+            </a:r>
+            <a:r>
+              <a:rPr lang="en-US" dirty="0"/>
+              <a:t>){</a:t>
+            </a:r>
+          </a:p>
+          <a:p>
+            <a:pPr marL="0" indent="0">
+              <a:buNone/>
+            </a:pPr>
+            <a:r>
+              <a:rPr lang="en-US" dirty="0"/>
+              <a:t>	for(</a:t>
+            </a:r>
+            <a:r>
+              <a:rPr lang="en-US" dirty="0" err="1"/>
+              <a:t>int</a:t>
+            </a:r>
+            <a:r>
+              <a:rPr lang="en-US" dirty="0"/>
+              <a:t> i=0; i&lt;</a:t>
+            </a:r>
+            <a:r>
+              <a:rPr lang="en-US" dirty="0" err="1"/>
+              <a:t>argc</a:t>
+            </a:r>
+            <a:r>
+              <a:rPr lang="en-US" dirty="0"/>
+              <a:t>; i++){</a:t>
+            </a:r>
+          </a:p>
+          <a:p>
+            <a:pPr marL="0" indent="0">
+              <a:buNone/>
+            </a:pPr>
+            <a:r>
+              <a:rPr lang="en-US" dirty="0"/>
+              <a:t>		</a:t>
+            </a:r>
+            <a:r>
+              <a:rPr lang="en-US" dirty="0" err="1"/>
+              <a:t>printf</a:t>
+            </a:r>
+            <a:r>
+              <a:rPr lang="en-US" dirty="0"/>
+              <a:t>("%s = %s\n", </a:t>
+            </a:r>
+            <a:r>
+              <a:rPr lang="en-US" dirty="0" err="1"/>
+              <a:t>azColName</a:t>
+            </a:r>
+            <a:r>
+              <a:rPr lang="en-US" dirty="0"/>
+              <a:t>[i], </a:t>
+            </a:r>
+            <a:r>
+              <a:rPr lang="en-US" dirty="0" err="1"/>
+              <a:t>argv</a:t>
+            </a:r>
+            <a:r>
+              <a:rPr lang="en-US" dirty="0"/>
+              <a:t>[i] ? </a:t>
+            </a:r>
+            <a:r>
+              <a:rPr lang="en-US" dirty="0" err="1"/>
+              <a:t>argv</a:t>
+            </a:r>
+            <a:r>
+              <a:rPr lang="en-US" dirty="0"/>
+              <a:t>[i] : "NULL");</a:t>
+            </a:r>
+          </a:p>
+          <a:p>
+            <a:pPr marL="0" indent="0">
+              <a:buNone/>
+            </a:pPr>
+            <a:r>
+              <a:rPr lang="en-US" dirty="0"/>
+              <a:t>	}</a:t>
+            </a:r>
+          </a:p>
+          <a:p>
+            <a:pPr marL="0" indent="0">
+              <a:buNone/>
+            </a:pPr>
+            <a:r>
+              <a:rPr lang="en-US" dirty="0"/>
+              <a:t>	</a:t>
+            </a:r>
+            <a:r>
+              <a:rPr lang="en-US" dirty="0" err="1"/>
+              <a:t>printf</a:t>
+            </a:r>
+            <a:r>
+              <a:rPr lang="en-US" dirty="0"/>
+              <a:t>("\n");</a:t>
+            </a:r>
+          </a:p>
+          <a:p>
+            <a:pPr marL="0" indent="0">
+              <a:buNone/>
+            </a:pPr>
+            <a:r>
+              <a:rPr lang="en-US" dirty="0"/>
+              <a:t>	return 0;</a:t>
+            </a:r>
+          </a:p>
+          <a:p>
+            <a:pPr marL="0" indent="0">
+              <a:buNone/>
+            </a:pPr>
+            <a:r>
+              <a:rPr lang="en-US" dirty="0"/>
+              <a:t>}</a:t>
+            </a:r>
+          </a:p>
+          <a:p>
+            <a:pPr marL="0" indent="0">
+              <a:buNone/>
+            </a:pPr>
+            <a:r>
+              <a:rPr lang="en-US" dirty="0"/>
+              <a:t>static </a:t>
+            </a:r>
+            <a:r>
+              <a:rPr lang="en-US" dirty="0" err="1"/>
+              <a:t>int</a:t>
+            </a:r>
+            <a:r>
+              <a:rPr lang="en-US" dirty="0"/>
+              <a:t> </a:t>
+            </a:r>
+            <a:r>
+              <a:rPr lang="en-US" dirty="0" err="1"/>
+              <a:t>getCurrentBalance</a:t>
+            </a:r>
+            <a:r>
+              <a:rPr lang="en-US" dirty="0"/>
+              <a:t>(void *data, </a:t>
+            </a:r>
+            <a:r>
+              <a:rPr lang="en-US" dirty="0" err="1"/>
+              <a:t>int</a:t>
+            </a:r>
+            <a:r>
+              <a:rPr lang="en-US" dirty="0"/>
+              <a:t> </a:t>
+            </a:r>
+            <a:r>
+              <a:rPr lang="en-US" dirty="0" err="1"/>
+              <a:t>argc</a:t>
+            </a:r>
+            <a:r>
+              <a:rPr lang="en-US" dirty="0"/>
+              <a:t>, char **</a:t>
+            </a:r>
+            <a:r>
+              <a:rPr lang="en-US" dirty="0" err="1"/>
+              <a:t>argv</a:t>
+            </a:r>
+            <a:r>
+              <a:rPr lang="en-US" dirty="0"/>
+              <a:t>, char **</a:t>
+            </a:r>
+            <a:r>
+              <a:rPr lang="en-US" dirty="0" err="1"/>
+              <a:t>azColName</a:t>
+            </a:r>
+            <a:r>
+              <a:rPr lang="en-US" dirty="0"/>
+              <a:t>){</a:t>
+            </a:r>
+          </a:p>
+          <a:p>
+            <a:pPr marL="0" indent="0">
+              <a:buNone/>
+            </a:pPr>
+            <a:r>
+              <a:rPr lang="en-US" dirty="0"/>
+              <a:t>	</a:t>
+            </a:r>
+            <a:r>
+              <a:rPr lang="en-US" dirty="0" err="1"/>
+              <a:t>currentBalance</a:t>
+            </a:r>
+            <a:r>
+              <a:rPr lang="en-US" dirty="0"/>
+              <a:t>=</a:t>
+            </a:r>
+            <a:r>
+              <a:rPr lang="en-US" dirty="0" err="1"/>
+              <a:t>atoi</a:t>
+            </a:r>
+            <a:r>
+              <a:rPr lang="en-US" dirty="0"/>
+              <a:t>(</a:t>
+            </a:r>
+            <a:r>
+              <a:rPr lang="en-US" dirty="0" err="1"/>
+              <a:t>argv</a:t>
+            </a:r>
+            <a:r>
+              <a:rPr lang="en-US" dirty="0"/>
+              <a:t>[0]);</a:t>
+            </a:r>
+          </a:p>
+          <a:p>
+            <a:pPr marL="0" indent="0">
+              <a:buNone/>
+            </a:pPr>
+            <a:r>
+              <a:rPr lang="en-US" dirty="0"/>
+              <a:t>	</a:t>
+            </a:r>
+            <a:r>
+              <a:rPr lang="en-US" dirty="0" err="1"/>
+              <a:t>currentTransaction</a:t>
+            </a:r>
+            <a:r>
+              <a:rPr lang="en-US" dirty="0"/>
+              <a:t>=</a:t>
+            </a:r>
+            <a:r>
+              <a:rPr lang="en-US" dirty="0" err="1"/>
+              <a:t>atoi</a:t>
+            </a:r>
+            <a:r>
+              <a:rPr lang="en-US" dirty="0"/>
+              <a:t>(</a:t>
+            </a:r>
+            <a:r>
+              <a:rPr lang="en-US" dirty="0" err="1"/>
+              <a:t>argv</a:t>
+            </a:r>
+            <a:r>
+              <a:rPr lang="en-US" dirty="0"/>
+              <a:t>[1]);</a:t>
+            </a:r>
+          </a:p>
+          <a:p>
+            <a:pPr marL="0" indent="0">
+              <a:buNone/>
+            </a:pPr>
+            <a:r>
+              <a:rPr lang="en-US" dirty="0"/>
+              <a:t>	return 0;</a:t>
+            </a:r>
+          </a:p>
+          <a:p>
+            <a:pPr marL="0" indent="0">
+              <a:buNone/>
+            </a:pPr>
+            <a:r>
+              <a:rPr lang="en-US" dirty="0"/>
+              <a:t>}</a:t>
+            </a:r>
+          </a:p>
+          <a:p>
+            <a:pPr marL="0" indent="0">
+              <a:buNone/>
+            </a:pPr>
+            <a:r>
+              <a:rPr lang="en-US" dirty="0"/>
+              <a:t>static </a:t>
+            </a:r>
+            <a:r>
+              <a:rPr lang="en-US" dirty="0" err="1"/>
+              <a:t>int</a:t>
+            </a:r>
+            <a:r>
+              <a:rPr lang="en-US" dirty="0"/>
+              <a:t> </a:t>
+            </a:r>
+            <a:r>
+              <a:rPr lang="en-US" dirty="0" err="1"/>
+              <a:t>setSystemConfig</a:t>
+            </a:r>
+            <a:r>
+              <a:rPr lang="en-US" dirty="0"/>
+              <a:t>(void *data, </a:t>
+            </a:r>
+            <a:r>
+              <a:rPr lang="en-US" dirty="0" err="1"/>
+              <a:t>int</a:t>
+            </a:r>
+            <a:r>
+              <a:rPr lang="en-US" dirty="0"/>
+              <a:t> </a:t>
+            </a:r>
+            <a:r>
+              <a:rPr lang="en-US" dirty="0" err="1"/>
+              <a:t>argc</a:t>
+            </a:r>
+            <a:r>
+              <a:rPr lang="en-US" dirty="0"/>
+              <a:t>, char **</a:t>
+            </a:r>
+            <a:r>
+              <a:rPr lang="en-US" dirty="0" err="1"/>
+              <a:t>argv</a:t>
+            </a:r>
+            <a:r>
+              <a:rPr lang="en-US" dirty="0"/>
+              <a:t>, char **</a:t>
+            </a:r>
+            <a:r>
+              <a:rPr lang="en-US" dirty="0" err="1"/>
+              <a:t>azColName</a:t>
+            </a:r>
+            <a:r>
+              <a:rPr lang="en-US" dirty="0"/>
+              <a:t>){</a:t>
+            </a:r>
+          </a:p>
+          <a:p>
+            <a:pPr marL="0" indent="0">
+              <a:buNone/>
+            </a:pPr>
+            <a:r>
+              <a:rPr lang="en-US" dirty="0"/>
+              <a:t>	</a:t>
+            </a:r>
+            <a:r>
+              <a:rPr lang="en-US" dirty="0" err="1"/>
+              <a:t>totalTransaction</a:t>
+            </a:r>
+            <a:r>
+              <a:rPr lang="en-US" dirty="0"/>
+              <a:t>=</a:t>
+            </a:r>
+            <a:r>
+              <a:rPr lang="en-US" dirty="0" err="1"/>
+              <a:t>atoi</a:t>
+            </a:r>
+            <a:r>
+              <a:rPr lang="en-US" dirty="0"/>
+              <a:t>(</a:t>
+            </a:r>
+            <a:r>
+              <a:rPr lang="en-US" dirty="0" err="1"/>
+              <a:t>argv</a:t>
+            </a:r>
+            <a:r>
+              <a:rPr lang="en-US" dirty="0"/>
+              <a:t>[0]);</a:t>
+            </a:r>
+          </a:p>
+          <a:p>
+            <a:pPr marL="0" indent="0">
+              <a:buNone/>
+            </a:pPr>
+            <a:r>
+              <a:rPr lang="en-US" dirty="0"/>
+              <a:t>	</a:t>
+            </a:r>
+            <a:r>
+              <a:rPr lang="en-US" dirty="0" err="1"/>
+              <a:t>monthlyQuota</a:t>
+            </a:r>
+            <a:r>
+              <a:rPr lang="en-US" dirty="0"/>
+              <a:t>=</a:t>
+            </a:r>
+            <a:r>
+              <a:rPr lang="en-US" dirty="0" err="1"/>
+              <a:t>atoi</a:t>
+            </a:r>
+            <a:r>
+              <a:rPr lang="en-US" dirty="0"/>
+              <a:t>(</a:t>
+            </a:r>
+            <a:r>
+              <a:rPr lang="en-US" dirty="0" err="1"/>
+              <a:t>argv</a:t>
+            </a:r>
+            <a:r>
+              <a:rPr lang="en-US" dirty="0"/>
+              <a:t>[1]);</a:t>
+            </a:r>
+          </a:p>
+          <a:p>
+            <a:pPr marL="0" indent="0">
+              <a:buNone/>
+            </a:pPr>
+            <a:r>
+              <a:rPr lang="en-US" dirty="0"/>
+              <a:t>	return 0;</a:t>
+            </a:r>
+          </a:p>
+          <a:p>
+            <a:pPr marL="0" indent="0">
+              <a:buNone/>
+            </a:pPr>
+            <a:r>
+              <a:rPr lang="en-US" dirty="0"/>
+              <a:t>}</a:t>
+            </a:r>
+            <a:endParaRPr lang="ru-RU" dirty="0"/>
+          </a:p>
+        </p:txBody>
+      </p:sp>
+    </p:spTree>
+    <p:extLst>
+      <p:ext uri="{BB962C8B-B14F-4D97-AF65-F5344CB8AC3E}">
+        <p14:creationId xmlns:p14="http://schemas.microsoft.com/office/powerpoint/2010/main" val="3417633656"/>
+      </p:ext>
+    </p:extLst>
+  </p:cSld>
+  <p:clrMapOvr>
+    <a:masterClrMapping/>
+  </p:clrMapOvr>
+</p:sld>
+</file>
+
+<file path=ppt/slides/slide22.xml><?xml version="1.0" encoding="utf-8"?>
+<p:sld xmlns:a="http://schemas.openxmlformats.org/drawingml/2006/main" xmlns:r="http://schemas.openxmlformats.org/officeDocument/2006/relationships" xmlns:p="http://schemas.openxmlformats.org/presentationml/2006/main">
+  <p:cSld>
+    <p:spTree>
+      <p:nvGrpSpPr>
+        <p:cNvPr id="1" name=""/>
+        <p:cNvGrpSpPr/>
+        <p:nvPr/>
+      </p:nvGrpSpPr>
+      <p:grpSpPr>
+        <a:xfrm>
+          <a:off x="0" y="0"/>
+          <a:ext cx="0" cy="0"/>
+          <a:chOff x="0" y="0"/>
+          <a:chExt cx="0" cy="0"/>
+        </a:xfrm>
+      </p:grpSpPr>
+      <p:sp>
+        <p:nvSpPr>
+          <p:cNvPr id="2" name="Заголовок 1"/>
+          <p:cNvSpPr>
+            <a:spLocks noGrp="1"/>
+          </p:cNvSpPr>
+          <p:nvPr>
+            <p:ph type="title"/>
+          </p:nvPr>
+        </p:nvSpPr>
+        <p:spPr/>
+        <p:txBody>
+          <a:bodyPr/>
+          <a:lstStyle/>
+          <a:p>
+            <a:endParaRPr lang="ru-RU"/>
+          </a:p>
+        </p:txBody>
+      </p:sp>
+      <p:sp>
+        <p:nvSpPr>
+          <p:cNvPr id="3" name="Объект 2"/>
+          <p:cNvSpPr>
+            <a:spLocks noGrp="1"/>
+          </p:cNvSpPr>
+          <p:nvPr>
+            <p:ph sz="quarter" idx="1"/>
+          </p:nvPr>
+        </p:nvSpPr>
+        <p:spPr>
+          <a:xfrm>
+            <a:off x="0" y="0"/>
+            <a:ext cx="9144000" cy="6858000"/>
+          </a:xfrm>
+        </p:spPr>
+        <p:txBody>
+          <a:bodyPr>
+            <a:noAutofit/>
+          </a:bodyPr>
+          <a:lstStyle/>
+          <a:p>
+            <a:pPr marL="0" indent="0">
+              <a:buNone/>
+            </a:pPr>
+            <a:r>
+              <a:rPr lang="en-US" sz="1050" dirty="0"/>
+              <a:t>void </a:t>
+            </a:r>
+            <a:r>
+              <a:rPr lang="en-US" sz="1050" dirty="0" err="1"/>
+              <a:t>operatorActions</a:t>
+            </a:r>
+            <a:r>
+              <a:rPr lang="en-US" sz="1050" dirty="0"/>
+              <a:t>(){</a:t>
+            </a:r>
+          </a:p>
+          <a:p>
+            <a:pPr marL="0" indent="0">
+              <a:buNone/>
+            </a:pPr>
+            <a:r>
+              <a:rPr lang="en-US" sz="1050" dirty="0"/>
+              <a:t>	char *</a:t>
+            </a:r>
+            <a:r>
+              <a:rPr lang="en-US" sz="1050" dirty="0" err="1"/>
+              <a:t>zErrMsg</a:t>
+            </a:r>
+            <a:r>
+              <a:rPr lang="en-US" sz="1050" dirty="0"/>
+              <a:t>;</a:t>
+            </a:r>
+          </a:p>
+          <a:p>
+            <a:pPr marL="0" indent="0">
+              <a:buNone/>
+            </a:pPr>
+            <a:r>
+              <a:rPr lang="en-US" sz="1050" dirty="0"/>
+              <a:t>	</a:t>
+            </a:r>
+            <a:r>
+              <a:rPr lang="en-US" sz="1050" dirty="0" err="1"/>
+              <a:t>const</a:t>
+            </a:r>
+            <a:r>
+              <a:rPr lang="en-US" sz="1050" dirty="0"/>
+              <a:t> char* data;</a:t>
+            </a:r>
+          </a:p>
+          <a:p>
+            <a:pPr marL="0" indent="0">
+              <a:buNone/>
+            </a:pPr>
+            <a:r>
+              <a:rPr lang="en-US" sz="1050" dirty="0"/>
+              <a:t>	</a:t>
+            </a:r>
+            <a:r>
+              <a:rPr lang="en-US" sz="1050" dirty="0" err="1"/>
+              <a:t>int</a:t>
+            </a:r>
+            <a:r>
+              <a:rPr lang="en-US" sz="1050" dirty="0"/>
+              <a:t> </a:t>
+            </a:r>
+            <a:r>
+              <a:rPr lang="en-US" sz="1050" dirty="0" err="1"/>
+              <a:t>rc</a:t>
+            </a:r>
+            <a:r>
+              <a:rPr lang="en-US" sz="1050" dirty="0"/>
+              <a:t>;</a:t>
+            </a:r>
+          </a:p>
+          <a:p>
+            <a:pPr marL="0" indent="0">
+              <a:buNone/>
+            </a:pPr>
+            <a:r>
+              <a:rPr lang="en-US" sz="1050" dirty="0"/>
+              <a:t>	</a:t>
+            </a:r>
+            <a:r>
+              <a:rPr lang="en-US" sz="1050" dirty="0" err="1"/>
+              <a:t>int</a:t>
+            </a:r>
+            <a:r>
+              <a:rPr lang="en-US" sz="1050" dirty="0"/>
+              <a:t> </a:t>
+            </a:r>
+            <a:r>
+              <a:rPr lang="en-US" sz="1050" dirty="0" err="1"/>
+              <a:t>idClient</a:t>
+            </a:r>
+            <a:r>
+              <a:rPr lang="en-US" sz="1050" dirty="0"/>
+              <a:t>=0;</a:t>
+            </a:r>
+          </a:p>
+          <a:p>
+            <a:pPr marL="0" indent="0">
+              <a:buNone/>
+            </a:pPr>
+            <a:r>
+              <a:rPr lang="en-US" sz="1050" dirty="0"/>
+              <a:t>	</a:t>
+            </a:r>
+            <a:r>
+              <a:rPr lang="en-US" sz="1050" dirty="0" err="1"/>
+              <a:t>int</a:t>
+            </a:r>
+            <a:r>
+              <a:rPr lang="en-US" sz="1050" dirty="0"/>
+              <a:t> </a:t>
+            </a:r>
+            <a:r>
+              <a:rPr lang="en-US" sz="1050" dirty="0" err="1"/>
+              <a:t>idAccount</a:t>
+            </a:r>
+            <a:r>
+              <a:rPr lang="en-US" sz="1050" dirty="0"/>
+              <a:t>=0;</a:t>
+            </a:r>
+          </a:p>
+          <a:p>
+            <a:pPr marL="0" indent="0">
+              <a:buNone/>
+            </a:pPr>
+            <a:r>
+              <a:rPr lang="en-US" sz="1050" dirty="0"/>
+              <a:t>	</a:t>
+            </a:r>
+            <a:r>
+              <a:rPr lang="en-US" sz="1050" dirty="0" err="1"/>
+              <a:t>zErrMsg</a:t>
+            </a:r>
+            <a:r>
+              <a:rPr lang="en-US" sz="1050" dirty="0"/>
+              <a:t>=0;</a:t>
+            </a:r>
+          </a:p>
+          <a:p>
+            <a:pPr marL="0" indent="0">
+              <a:buNone/>
+            </a:pPr>
+            <a:r>
+              <a:rPr lang="en-US" sz="1050" dirty="0"/>
+              <a:t>	data = "Callback function called\n";</a:t>
+            </a:r>
+          </a:p>
+          <a:p>
+            <a:pPr marL="0" indent="0">
+              <a:buNone/>
+            </a:pPr>
+            <a:r>
+              <a:rPr lang="en-US" sz="1050" dirty="0"/>
+              <a:t>	</a:t>
+            </a:r>
+            <a:r>
+              <a:rPr lang="en-US" sz="1050" dirty="0" err="1"/>
+              <a:t>rc</a:t>
+            </a:r>
+            <a:r>
+              <a:rPr lang="en-US" sz="1050" dirty="0"/>
+              <a:t> = sqlite3_open("12.db",&amp;conn);</a:t>
+            </a:r>
+          </a:p>
+          <a:p>
+            <a:pPr marL="0" indent="0">
+              <a:buNone/>
+            </a:pPr>
+            <a:r>
+              <a:rPr lang="en-US" sz="1050" dirty="0"/>
+              <a:t>	if(</a:t>
+            </a:r>
+            <a:r>
+              <a:rPr lang="en-US" sz="1050" dirty="0" err="1"/>
+              <a:t>rc</a:t>
+            </a:r>
+            <a:r>
+              <a:rPr lang="en-US" sz="1050" dirty="0"/>
+              <a:t>){</a:t>
+            </a:r>
+          </a:p>
+          <a:p>
+            <a:pPr marL="0" indent="0">
+              <a:buNone/>
+            </a:pPr>
+            <a:r>
+              <a:rPr lang="en-US" sz="1050" dirty="0"/>
+              <a:t>		</a:t>
+            </a:r>
+            <a:r>
+              <a:rPr lang="en-US" sz="1050" dirty="0" err="1"/>
+              <a:t>printf</a:t>
+            </a:r>
+            <a:r>
+              <a:rPr lang="en-US" sz="1050" dirty="0"/>
+              <a:t>("Error\n");</a:t>
+            </a:r>
+          </a:p>
+          <a:p>
+            <a:pPr marL="0" indent="0">
+              <a:buNone/>
+            </a:pPr>
+            <a:r>
+              <a:rPr lang="en-US" sz="1050" dirty="0"/>
+              <a:t>		sqlite3_close(conn);</a:t>
+            </a:r>
+          </a:p>
+          <a:p>
+            <a:pPr marL="0" indent="0">
+              <a:buNone/>
+            </a:pPr>
+            <a:r>
+              <a:rPr lang="en-US" sz="1050" dirty="0"/>
+              <a:t>		return;</a:t>
+            </a:r>
+          </a:p>
+          <a:p>
+            <a:pPr marL="0" indent="0">
+              <a:buNone/>
+            </a:pPr>
+            <a:r>
+              <a:rPr lang="en-US" sz="1050" dirty="0"/>
+              <a:t>	}</a:t>
+            </a:r>
+          </a:p>
+          <a:p>
+            <a:pPr marL="0" indent="0">
+              <a:buNone/>
+            </a:pPr>
+            <a:r>
+              <a:rPr lang="en-US" sz="1050" dirty="0"/>
+              <a:t>	</a:t>
+            </a:r>
+            <a:r>
+              <a:rPr lang="en-US" sz="1050" dirty="0" err="1"/>
+              <a:t>rc</a:t>
+            </a:r>
+            <a:r>
+              <a:rPr lang="en-US" sz="1050" dirty="0"/>
+              <a:t> = sqlite3_exec(</a:t>
+            </a:r>
+            <a:r>
+              <a:rPr lang="en-US" sz="1050" dirty="0" err="1"/>
+              <a:t>conn,"select</a:t>
+            </a:r>
+            <a:r>
+              <a:rPr lang="en-US" sz="1050" dirty="0"/>
+              <a:t> </a:t>
+            </a:r>
+            <a:r>
+              <a:rPr lang="en-US" sz="1050" dirty="0" err="1"/>
+              <a:t>total_transactions</a:t>
+            </a:r>
+            <a:r>
+              <a:rPr lang="en-US" sz="1050" dirty="0"/>
+              <a:t>, </a:t>
+            </a:r>
+            <a:r>
+              <a:rPr lang="en-US" sz="1050" dirty="0" err="1"/>
+              <a:t>monthly_quota</a:t>
+            </a:r>
+            <a:r>
+              <a:rPr lang="en-US" sz="1050" dirty="0"/>
+              <a:t> from system_</a:t>
+            </a:r>
+            <a:r>
+              <a:rPr lang="en-US" sz="1050" dirty="0" err="1"/>
+              <a:t>config</a:t>
+            </a:r>
+            <a:r>
+              <a:rPr lang="en-US" sz="1050" dirty="0"/>
+              <a:t>",</a:t>
+            </a:r>
+            <a:r>
+              <a:rPr lang="en-US" sz="1050" dirty="0" err="1"/>
+              <a:t>setSystemConfig</a:t>
+            </a:r>
+            <a:r>
+              <a:rPr lang="en-US" sz="1050" dirty="0"/>
+              <a:t>, (void*)data, &amp;</a:t>
+            </a:r>
+            <a:r>
+              <a:rPr lang="en-US" sz="1050" dirty="0" err="1"/>
+              <a:t>zErrMsg</a:t>
+            </a:r>
+            <a:r>
+              <a:rPr lang="en-US" sz="1050" dirty="0"/>
+              <a:t>);</a:t>
+            </a:r>
+          </a:p>
+          <a:p>
+            <a:pPr marL="0" indent="0">
+              <a:buNone/>
+            </a:pPr>
+            <a:r>
+              <a:rPr lang="en-US" sz="1050" dirty="0"/>
+              <a:t>	if(</a:t>
+            </a:r>
+            <a:r>
+              <a:rPr lang="en-US" sz="1050" dirty="0" err="1"/>
+              <a:t>rc</a:t>
+            </a:r>
+            <a:r>
+              <a:rPr lang="en-US" sz="1050" dirty="0"/>
+              <a:t>){</a:t>
+            </a:r>
+          </a:p>
+          <a:p>
+            <a:pPr marL="0" indent="0">
+              <a:buNone/>
+            </a:pPr>
+            <a:r>
+              <a:rPr lang="en-US" sz="1050" dirty="0"/>
+              <a:t>		</a:t>
+            </a:r>
+            <a:r>
+              <a:rPr lang="en-US" sz="1050" dirty="0" err="1"/>
+              <a:t>printf</a:t>
+            </a:r>
+            <a:r>
+              <a:rPr lang="en-US" sz="1050" dirty="0"/>
+              <a:t>("Error!\n");</a:t>
+            </a:r>
+          </a:p>
+          <a:p>
+            <a:pPr marL="0" indent="0">
+              <a:buNone/>
+            </a:pPr>
+            <a:r>
+              <a:rPr lang="en-US" sz="1050" dirty="0"/>
+              <a:t>		sqlite3_close(conn);</a:t>
+            </a:r>
+          </a:p>
+          <a:p>
+            <a:pPr marL="0" indent="0">
+              <a:buNone/>
+            </a:pPr>
+            <a:r>
+              <a:rPr lang="en-US" sz="1050" dirty="0"/>
+              <a:t>		return;</a:t>
+            </a:r>
+          </a:p>
+          <a:p>
+            <a:pPr marL="0" indent="0">
+              <a:buNone/>
+            </a:pPr>
+            <a:r>
+              <a:rPr lang="en-US" sz="1050" dirty="0"/>
+              <a:t>	}</a:t>
+            </a:r>
+          </a:p>
+          <a:p>
+            <a:pPr marL="0" indent="0">
+              <a:buNone/>
+            </a:pPr>
+            <a:r>
+              <a:rPr lang="en-US" sz="1050" dirty="0"/>
+              <a:t>	char </a:t>
+            </a:r>
+            <a:r>
+              <a:rPr lang="en-US" sz="1050" dirty="0" err="1"/>
+              <a:t>bufferSelect</a:t>
+            </a:r>
+            <a:r>
+              <a:rPr lang="en-US" sz="1050" dirty="0"/>
+              <a:t>[500];</a:t>
+            </a:r>
+          </a:p>
+          <a:p>
+            <a:pPr marL="0" indent="0">
+              <a:buNone/>
+            </a:pPr>
+            <a:r>
+              <a:rPr lang="en-US" sz="1050" dirty="0"/>
+              <a:t>	</a:t>
+            </a:r>
+            <a:r>
+              <a:rPr lang="en-US" sz="1050" dirty="0" err="1"/>
+              <a:t>sprintf</a:t>
+            </a:r>
+            <a:r>
+              <a:rPr lang="en-US" sz="1050" dirty="0"/>
+              <a:t>(</a:t>
+            </a:r>
+            <a:r>
+              <a:rPr lang="en-US" sz="1050" dirty="0" err="1"/>
+              <a:t>bufferSelect</a:t>
+            </a:r>
+            <a:r>
+              <a:rPr lang="en-US" sz="1050" dirty="0"/>
+              <a:t>,"select </a:t>
+            </a:r>
+            <a:r>
+              <a:rPr lang="en-US" sz="1050" dirty="0" err="1"/>
+              <a:t>client_id,first_name</a:t>
+            </a:r>
+            <a:r>
+              <a:rPr lang="en-US" sz="1050" dirty="0"/>
+              <a:t>, </a:t>
+            </a:r>
+            <a:r>
+              <a:rPr lang="en-US" sz="1050" dirty="0" err="1"/>
+              <a:t>last_name</a:t>
+            </a:r>
+            <a:r>
+              <a:rPr lang="en-US" sz="1050" dirty="0"/>
+              <a:t> from client");</a:t>
+            </a:r>
+          </a:p>
+          <a:p>
+            <a:pPr marL="0" indent="0">
+              <a:buNone/>
+            </a:pPr>
+            <a:r>
+              <a:rPr lang="en-US" sz="1050" dirty="0"/>
+              <a:t>	</a:t>
+            </a:r>
+            <a:r>
+              <a:rPr lang="en-US" sz="1050" dirty="0" err="1"/>
+              <a:t>rc</a:t>
+            </a:r>
+            <a:r>
+              <a:rPr lang="en-US" sz="1050" dirty="0"/>
+              <a:t> = sqlite3_exec(</a:t>
+            </a:r>
+            <a:r>
+              <a:rPr lang="en-US" sz="1050" dirty="0" err="1"/>
+              <a:t>conn,bufferSelect,showList</a:t>
+            </a:r>
+            <a:r>
+              <a:rPr lang="en-US" sz="1050" dirty="0"/>
+              <a:t>, (void*)data, &amp;</a:t>
+            </a:r>
+            <a:r>
+              <a:rPr lang="en-US" sz="1050" dirty="0" err="1"/>
+              <a:t>zErrMsg</a:t>
+            </a:r>
+            <a:r>
+              <a:rPr lang="en-US" sz="1050" dirty="0"/>
+              <a:t>);</a:t>
+            </a:r>
+          </a:p>
+          <a:p>
+            <a:pPr marL="0" indent="0">
+              <a:buNone/>
+            </a:pPr>
+            <a:r>
+              <a:rPr lang="en-US" sz="1050" dirty="0"/>
+              <a:t>	if(</a:t>
+            </a:r>
+            <a:r>
+              <a:rPr lang="en-US" sz="1050" dirty="0" err="1"/>
+              <a:t>rc</a:t>
+            </a:r>
+            <a:r>
+              <a:rPr lang="en-US" sz="1050" dirty="0"/>
+              <a:t>){</a:t>
+            </a:r>
+          </a:p>
+          <a:p>
+            <a:pPr marL="0" indent="0">
+              <a:buNone/>
+            </a:pPr>
+            <a:r>
+              <a:rPr lang="en-US" sz="1050" dirty="0"/>
+              <a:t>		</a:t>
+            </a:r>
+            <a:r>
+              <a:rPr lang="en-US" sz="1050" dirty="0" err="1"/>
+              <a:t>printf</a:t>
+            </a:r>
+            <a:r>
+              <a:rPr lang="en-US" sz="1050" dirty="0"/>
+              <a:t>("Error!\n");</a:t>
+            </a:r>
+          </a:p>
+          <a:p>
+            <a:pPr marL="0" indent="0">
+              <a:buNone/>
+            </a:pPr>
+            <a:r>
+              <a:rPr lang="en-US" sz="1050" dirty="0"/>
+              <a:t>		sqlite3_close(conn);</a:t>
+            </a:r>
+          </a:p>
+          <a:p>
+            <a:pPr marL="0" indent="0">
+              <a:buNone/>
+            </a:pPr>
+            <a:r>
+              <a:rPr lang="en-US" sz="1050" dirty="0"/>
+              <a:t>		return;</a:t>
+            </a:r>
+          </a:p>
+          <a:p>
+            <a:pPr marL="0" indent="0">
+              <a:buNone/>
+            </a:pPr>
+            <a:r>
+              <a:rPr lang="en-US" sz="1050" dirty="0"/>
+              <a:t>	}</a:t>
+            </a:r>
+            <a:endParaRPr lang="ru-RU" sz="1050" dirty="0"/>
+          </a:p>
+        </p:txBody>
+      </p:sp>
+    </p:spTree>
+    <p:extLst>
+      <p:ext uri="{BB962C8B-B14F-4D97-AF65-F5344CB8AC3E}">
+        <p14:creationId xmlns:p14="http://schemas.microsoft.com/office/powerpoint/2010/main" val="2818867923"/>
+      </p:ext>
+    </p:extLst>
+  </p:cSld>
+  <p:clrMapOvr>
+    <a:masterClrMapping/>
+  </p:clrMapOvr>
+</p:sld>
+</file>
+
+<file path=ppt/slides/slide23.xml><?xml version="1.0" encoding="utf-8"?>
+<p:sld xmlns:a="http://schemas.openxmlformats.org/drawingml/2006/main" xmlns:r="http://schemas.openxmlformats.org/officeDocument/2006/relationships" xmlns:p="http://schemas.openxmlformats.org/presentationml/2006/main">
+  <p:cSld>
+    <p:spTree>
+      <p:nvGrpSpPr>
+        <p:cNvPr id="1" name=""/>
+        <p:cNvGrpSpPr/>
+        <p:nvPr/>
+      </p:nvGrpSpPr>
+      <p:grpSpPr>
+        <a:xfrm>
+          <a:off x="0" y="0"/>
+          <a:ext cx="0" cy="0"/>
+          <a:chOff x="0" y="0"/>
+          <a:chExt cx="0" cy="0"/>
+        </a:xfrm>
+      </p:grpSpPr>
+      <p:sp>
+        <p:nvSpPr>
+          <p:cNvPr id="2" name="Заголовок 1"/>
+          <p:cNvSpPr>
+            <a:spLocks noGrp="1"/>
+          </p:cNvSpPr>
+          <p:nvPr>
+            <p:ph type="title"/>
+          </p:nvPr>
+        </p:nvSpPr>
+        <p:spPr/>
+        <p:txBody>
+          <a:bodyPr/>
+          <a:lstStyle/>
+          <a:p>
+            <a:endParaRPr lang="ru-RU"/>
+          </a:p>
+        </p:txBody>
+      </p:sp>
+      <p:sp>
+        <p:nvSpPr>
+          <p:cNvPr id="3" name="Объект 2"/>
+          <p:cNvSpPr>
+            <a:spLocks noGrp="1"/>
+          </p:cNvSpPr>
+          <p:nvPr>
+            <p:ph sz="quarter" idx="1"/>
+          </p:nvPr>
+        </p:nvSpPr>
+        <p:spPr>
+          <a:xfrm>
+            <a:off x="179512" y="0"/>
+            <a:ext cx="8964488" cy="6858000"/>
+          </a:xfrm>
+        </p:spPr>
+        <p:txBody>
+          <a:bodyPr>
+            <a:normAutofit fontScale="70000" lnSpcReduction="20000"/>
+          </a:bodyPr>
+          <a:lstStyle/>
+          <a:p>
+            <a:pPr marL="0" indent="0">
+              <a:buNone/>
+            </a:pPr>
+            <a:r>
+              <a:rPr lang="en-US" dirty="0" err="1"/>
+              <a:t>printf</a:t>
+            </a:r>
+            <a:r>
+              <a:rPr lang="en-US" dirty="0"/>
+              <a:t>("Enter id of client\n");</a:t>
+            </a:r>
+          </a:p>
+          <a:p>
+            <a:pPr marL="0" indent="0">
+              <a:buNone/>
+            </a:pPr>
+            <a:r>
+              <a:rPr lang="en-US" dirty="0"/>
+              <a:t>	</a:t>
+            </a:r>
+            <a:r>
+              <a:rPr lang="en-US" dirty="0" err="1"/>
+              <a:t>scanf</a:t>
+            </a:r>
+            <a:r>
+              <a:rPr lang="en-US" dirty="0"/>
+              <a:t>("%d",&amp;</a:t>
+            </a:r>
+            <a:r>
+              <a:rPr lang="en-US" dirty="0" err="1"/>
+              <a:t>idClient</a:t>
+            </a:r>
+            <a:r>
+              <a:rPr lang="en-US" dirty="0"/>
+              <a:t>);</a:t>
+            </a:r>
+          </a:p>
+          <a:p>
+            <a:pPr marL="0" indent="0">
+              <a:buNone/>
+            </a:pPr>
+            <a:r>
+              <a:rPr lang="en-US" dirty="0"/>
+              <a:t>	char </a:t>
+            </a:r>
+            <a:r>
+              <a:rPr lang="en-US" dirty="0" err="1"/>
+              <a:t>bufferAccount</a:t>
+            </a:r>
+            <a:r>
+              <a:rPr lang="en-US" dirty="0"/>
+              <a:t>[500];</a:t>
+            </a:r>
+          </a:p>
+          <a:p>
+            <a:pPr marL="0" indent="0">
+              <a:buNone/>
+            </a:pPr>
+            <a:r>
+              <a:rPr lang="en-US" dirty="0"/>
+              <a:t>	</a:t>
+            </a:r>
+            <a:r>
+              <a:rPr lang="en-US" dirty="0" err="1"/>
+              <a:t>sprintf</a:t>
+            </a:r>
+            <a:r>
+              <a:rPr lang="en-US" dirty="0"/>
+              <a:t>(</a:t>
+            </a:r>
+            <a:r>
+              <a:rPr lang="en-US" dirty="0" err="1"/>
+              <a:t>bufferAccount</a:t>
+            </a:r>
+            <a:r>
+              <a:rPr lang="en-US" dirty="0"/>
+              <a:t>,"select </a:t>
+            </a:r>
+            <a:r>
+              <a:rPr lang="en-US" dirty="0" err="1"/>
+              <a:t>account_id,balance</a:t>
+            </a:r>
+            <a:r>
+              <a:rPr lang="en-US" dirty="0"/>
+              <a:t>, </a:t>
+            </a:r>
+            <a:r>
+              <a:rPr lang="en-US" dirty="0" err="1"/>
+              <a:t>current_transactions</a:t>
+            </a:r>
+            <a:r>
+              <a:rPr lang="en-US" dirty="0"/>
+              <a:t> from account where </a:t>
+            </a:r>
+            <a:r>
+              <a:rPr lang="en-US" dirty="0" err="1"/>
+              <a:t>client_id</a:t>
+            </a:r>
+            <a:r>
+              <a:rPr lang="en-US" dirty="0"/>
+              <a:t>='%d'",</a:t>
+            </a:r>
+            <a:r>
+              <a:rPr lang="en-US" dirty="0" err="1"/>
+              <a:t>idClient</a:t>
+            </a:r>
+            <a:r>
+              <a:rPr lang="en-US" dirty="0"/>
+              <a:t>);</a:t>
+            </a:r>
+          </a:p>
+          <a:p>
+            <a:pPr marL="0" indent="0">
+              <a:buNone/>
+            </a:pPr>
+            <a:r>
+              <a:rPr lang="en-US" dirty="0"/>
+              <a:t>	</a:t>
+            </a:r>
+            <a:r>
+              <a:rPr lang="en-US" dirty="0" err="1"/>
+              <a:t>rc</a:t>
+            </a:r>
+            <a:r>
+              <a:rPr lang="en-US" dirty="0"/>
+              <a:t> = sqlite3_exec(</a:t>
+            </a:r>
+            <a:r>
+              <a:rPr lang="en-US" dirty="0" err="1"/>
+              <a:t>conn,bufferAccount,showList</a:t>
+            </a:r>
+            <a:r>
+              <a:rPr lang="en-US" dirty="0"/>
+              <a:t>, (void*)data, &amp;</a:t>
+            </a:r>
+            <a:r>
+              <a:rPr lang="en-US" dirty="0" err="1"/>
+              <a:t>zErrMsg</a:t>
+            </a:r>
+            <a:r>
+              <a:rPr lang="en-US" dirty="0"/>
+              <a:t>);</a:t>
+            </a:r>
+          </a:p>
+          <a:p>
+            <a:pPr marL="0" indent="0">
+              <a:buNone/>
+            </a:pPr>
+            <a:r>
+              <a:rPr lang="en-US" dirty="0"/>
+              <a:t>	if(</a:t>
+            </a:r>
+            <a:r>
+              <a:rPr lang="en-US" dirty="0" err="1"/>
+              <a:t>rc</a:t>
+            </a:r>
+            <a:r>
+              <a:rPr lang="en-US" dirty="0"/>
+              <a:t>){</a:t>
+            </a:r>
+          </a:p>
+          <a:p>
+            <a:pPr marL="0" indent="0">
+              <a:buNone/>
+            </a:pPr>
+            <a:r>
+              <a:rPr lang="en-US" dirty="0"/>
+              <a:t>		</a:t>
+            </a:r>
+            <a:r>
+              <a:rPr lang="en-US" dirty="0" err="1"/>
+              <a:t>printf</a:t>
+            </a:r>
+            <a:r>
+              <a:rPr lang="en-US" dirty="0"/>
+              <a:t>("Error!\n");</a:t>
+            </a:r>
+          </a:p>
+          <a:p>
+            <a:pPr marL="0" indent="0">
+              <a:buNone/>
+            </a:pPr>
+            <a:r>
+              <a:rPr lang="en-US" dirty="0"/>
+              <a:t>		sqlite3_close(conn);</a:t>
+            </a:r>
+          </a:p>
+          <a:p>
+            <a:pPr marL="0" indent="0">
+              <a:buNone/>
+            </a:pPr>
+            <a:r>
+              <a:rPr lang="en-US" dirty="0"/>
+              <a:t>		return;</a:t>
+            </a:r>
+          </a:p>
+          <a:p>
+            <a:pPr marL="0" indent="0">
+              <a:buNone/>
+            </a:pPr>
+            <a:r>
+              <a:rPr lang="en-US" dirty="0"/>
+              <a:t>	}</a:t>
+            </a:r>
+          </a:p>
+          <a:p>
+            <a:pPr marL="0" indent="0">
+              <a:buNone/>
+            </a:pPr>
+            <a:r>
+              <a:rPr lang="en-US" dirty="0"/>
+              <a:t>	</a:t>
+            </a:r>
+            <a:r>
+              <a:rPr lang="en-US" dirty="0" err="1"/>
+              <a:t>printf</a:t>
+            </a:r>
+            <a:r>
+              <a:rPr lang="en-US" dirty="0"/>
+              <a:t>("Enter id of client`s account\n");</a:t>
+            </a:r>
+          </a:p>
+          <a:p>
+            <a:pPr marL="0" indent="0">
+              <a:buNone/>
+            </a:pPr>
+            <a:r>
+              <a:rPr lang="en-US" dirty="0"/>
+              <a:t>	</a:t>
+            </a:r>
+            <a:r>
+              <a:rPr lang="en-US" dirty="0" err="1"/>
+              <a:t>scanf</a:t>
+            </a:r>
+            <a:r>
+              <a:rPr lang="en-US" dirty="0"/>
+              <a:t>("%d",&amp;</a:t>
+            </a:r>
+            <a:r>
+              <a:rPr lang="en-US" dirty="0" err="1"/>
+              <a:t>idAccount</a:t>
+            </a:r>
+            <a:r>
+              <a:rPr lang="en-US" dirty="0"/>
+              <a:t>);</a:t>
+            </a:r>
+          </a:p>
+          <a:p>
+            <a:pPr marL="0" indent="0">
+              <a:buNone/>
+            </a:pPr>
+            <a:r>
+              <a:rPr lang="en-US" dirty="0"/>
+              <a:t>	char </a:t>
+            </a:r>
+            <a:r>
+              <a:rPr lang="en-US" dirty="0" err="1"/>
+              <a:t>bufferGetBalance</a:t>
+            </a:r>
+            <a:r>
+              <a:rPr lang="en-US" dirty="0"/>
+              <a:t>[500];</a:t>
+            </a:r>
+          </a:p>
+          <a:p>
+            <a:pPr marL="0" indent="0">
+              <a:buNone/>
+            </a:pPr>
+            <a:r>
+              <a:rPr lang="en-US" dirty="0"/>
+              <a:t>	</a:t>
+            </a:r>
+            <a:r>
+              <a:rPr lang="en-US" dirty="0" err="1"/>
+              <a:t>sprintf</a:t>
+            </a:r>
+            <a:r>
+              <a:rPr lang="en-US" dirty="0"/>
+              <a:t>(</a:t>
+            </a:r>
+            <a:r>
+              <a:rPr lang="en-US" dirty="0" err="1"/>
+              <a:t>bufferGetBalance</a:t>
+            </a:r>
+            <a:r>
+              <a:rPr lang="en-US" dirty="0"/>
+              <a:t>,"select balance, </a:t>
+            </a:r>
+            <a:r>
+              <a:rPr lang="en-US" dirty="0" err="1"/>
+              <a:t>current_transactions</a:t>
+            </a:r>
+            <a:r>
+              <a:rPr lang="en-US" dirty="0"/>
+              <a:t> from account where </a:t>
+            </a:r>
+            <a:r>
+              <a:rPr lang="en-US" dirty="0" err="1"/>
+              <a:t>account_id</a:t>
+            </a:r>
+            <a:r>
+              <a:rPr lang="en-US" dirty="0"/>
+              <a:t>='%d'",</a:t>
+            </a:r>
+            <a:r>
+              <a:rPr lang="en-US" dirty="0" err="1"/>
+              <a:t>idAccount</a:t>
+            </a:r>
+            <a:r>
+              <a:rPr lang="en-US" dirty="0"/>
+              <a:t>);</a:t>
+            </a:r>
+          </a:p>
+          <a:p>
+            <a:pPr marL="0" indent="0">
+              <a:buNone/>
+            </a:pPr>
+            <a:r>
+              <a:rPr lang="en-US" dirty="0"/>
+              <a:t>	</a:t>
+            </a:r>
+            <a:r>
+              <a:rPr lang="en-US" dirty="0" err="1"/>
+              <a:t>rc</a:t>
+            </a:r>
+            <a:r>
+              <a:rPr lang="en-US" dirty="0"/>
+              <a:t> = sqlite3_exec(</a:t>
+            </a:r>
+            <a:r>
+              <a:rPr lang="en-US" dirty="0" err="1"/>
+              <a:t>conn,bufferGetBalance,getCurrentBalance</a:t>
+            </a:r>
+            <a:r>
+              <a:rPr lang="en-US" dirty="0"/>
+              <a:t>, (void*)data, &amp;</a:t>
+            </a:r>
+            <a:r>
+              <a:rPr lang="en-US" dirty="0" err="1"/>
+              <a:t>zErrMsg</a:t>
+            </a:r>
+            <a:r>
+              <a:rPr lang="en-US" dirty="0"/>
+              <a:t>);</a:t>
+            </a:r>
+          </a:p>
+          <a:p>
+            <a:pPr marL="0" indent="0">
+              <a:buNone/>
+            </a:pPr>
+            <a:r>
+              <a:rPr lang="en-US" dirty="0"/>
+              <a:t>	if(</a:t>
+            </a:r>
+            <a:r>
+              <a:rPr lang="en-US" dirty="0" err="1"/>
+              <a:t>rc</a:t>
+            </a:r>
+            <a:r>
+              <a:rPr lang="en-US" dirty="0"/>
+              <a:t>){</a:t>
+            </a:r>
+          </a:p>
+          <a:p>
+            <a:pPr marL="0" indent="0">
+              <a:buNone/>
+            </a:pPr>
+            <a:r>
+              <a:rPr lang="en-US" dirty="0"/>
+              <a:t>		</a:t>
+            </a:r>
+            <a:r>
+              <a:rPr lang="en-US" dirty="0" err="1"/>
+              <a:t>printf</a:t>
+            </a:r>
+            <a:r>
+              <a:rPr lang="en-US" dirty="0"/>
+              <a:t>("Error!\n");</a:t>
+            </a:r>
+          </a:p>
+          <a:p>
+            <a:pPr marL="0" indent="0">
+              <a:buNone/>
+            </a:pPr>
+            <a:r>
+              <a:rPr lang="en-US" dirty="0"/>
+              <a:t>		sqlite3_close(conn);</a:t>
+            </a:r>
+          </a:p>
+          <a:p>
+            <a:pPr marL="0" indent="0">
+              <a:buNone/>
+            </a:pPr>
+            <a:r>
+              <a:rPr lang="en-US" dirty="0"/>
+              <a:t>		return;</a:t>
+            </a:r>
+          </a:p>
+          <a:p>
+            <a:pPr marL="0" indent="0">
+              <a:buNone/>
+            </a:pPr>
+            <a:r>
+              <a:rPr lang="en-US" dirty="0"/>
+              <a:t>	}</a:t>
+            </a:r>
+            <a:endParaRPr lang="ru-RU" dirty="0"/>
+          </a:p>
+        </p:txBody>
+      </p:sp>
+    </p:spTree>
+    <p:extLst>
+      <p:ext uri="{BB962C8B-B14F-4D97-AF65-F5344CB8AC3E}">
+        <p14:creationId xmlns:p14="http://schemas.microsoft.com/office/powerpoint/2010/main" val="568991327"/>
+      </p:ext>
+    </p:extLst>
+  </p:cSld>
+  <p:clrMapOvr>
+    <a:masterClrMapping/>
+  </p:clrMapOvr>
+</p:sld>
+</file>
+
+<file path=ppt/slides/slide24.xml><?xml version="1.0" encoding="utf-8"?>
+<p:sld xmlns:a="http://schemas.openxmlformats.org/drawingml/2006/main" xmlns:r="http://schemas.openxmlformats.org/officeDocument/2006/relationships" xmlns:p="http://schemas.openxmlformats.org/presentationml/2006/main">
+  <p:cSld>
+    <p:spTree>
+      <p:nvGrpSpPr>
+        <p:cNvPr id="1" name=""/>
+        <p:cNvGrpSpPr/>
+        <p:nvPr/>
+      </p:nvGrpSpPr>
+      <p:grpSpPr>
+        <a:xfrm>
+          <a:off x="0" y="0"/>
+          <a:ext cx="0" cy="0"/>
+          <a:chOff x="0" y="0"/>
+          <a:chExt cx="0" cy="0"/>
+        </a:xfrm>
+      </p:grpSpPr>
+      <p:sp>
+        <p:nvSpPr>
+          <p:cNvPr id="2" name="Заголовок 1"/>
+          <p:cNvSpPr>
+            <a:spLocks noGrp="1"/>
+          </p:cNvSpPr>
+          <p:nvPr>
+            <p:ph type="title"/>
+          </p:nvPr>
+        </p:nvSpPr>
+        <p:spPr/>
+        <p:txBody>
+          <a:bodyPr/>
+          <a:lstStyle/>
+          <a:p>
+            <a:endParaRPr lang="ru-RU"/>
+          </a:p>
+        </p:txBody>
+      </p:sp>
+      <p:sp>
+        <p:nvSpPr>
+          <p:cNvPr id="3" name="Объект 2"/>
+          <p:cNvSpPr>
+            <a:spLocks noGrp="1"/>
+          </p:cNvSpPr>
+          <p:nvPr>
+            <p:ph sz="quarter" idx="1"/>
+          </p:nvPr>
+        </p:nvSpPr>
+        <p:spPr/>
+        <p:txBody>
+          <a:bodyPr>
+            <a:normAutofit lnSpcReduction="10000"/>
+          </a:bodyPr>
+          <a:lstStyle/>
+          <a:p>
+            <a:pPr marL="0" indent="0">
+              <a:buNone/>
+            </a:pPr>
+            <a:r>
+              <a:rPr lang="en-US" dirty="0" err="1"/>
+              <a:t>int</a:t>
+            </a:r>
+            <a:r>
+              <a:rPr lang="en-US" dirty="0"/>
+              <a:t> </a:t>
+            </a:r>
+            <a:r>
+              <a:rPr lang="en-US" dirty="0" err="1"/>
+              <a:t>numberOfOperation</a:t>
+            </a:r>
+            <a:r>
+              <a:rPr lang="en-US" dirty="0"/>
+              <a:t>=0;</a:t>
+            </a:r>
+          </a:p>
+          <a:p>
+            <a:pPr marL="0" indent="0">
+              <a:buNone/>
+            </a:pPr>
+            <a:r>
+              <a:rPr lang="en-US" dirty="0"/>
+              <a:t>	</a:t>
+            </a:r>
+            <a:r>
+              <a:rPr lang="en-US" dirty="0" err="1"/>
+              <a:t>bool</a:t>
+            </a:r>
+            <a:r>
+              <a:rPr lang="en-US" dirty="0"/>
+              <a:t> </a:t>
+            </a:r>
+            <a:r>
+              <a:rPr lang="en-US" dirty="0" err="1"/>
+              <a:t>isExit</a:t>
+            </a:r>
+            <a:r>
+              <a:rPr lang="en-US" dirty="0"/>
+              <a:t>=false;</a:t>
+            </a:r>
+          </a:p>
+          <a:p>
+            <a:pPr marL="0" indent="0">
+              <a:buNone/>
+            </a:pPr>
+            <a:r>
+              <a:rPr lang="en-US" dirty="0"/>
+              <a:t>	</a:t>
+            </a:r>
+            <a:r>
+              <a:rPr lang="en-US" dirty="0" err="1"/>
+              <a:t>printf</a:t>
+            </a:r>
+            <a:r>
+              <a:rPr lang="en-US" dirty="0"/>
+              <a:t>("Operations:\n");</a:t>
+            </a:r>
+          </a:p>
+          <a:p>
+            <a:pPr marL="0" indent="0">
+              <a:buNone/>
+            </a:pPr>
+            <a:endParaRPr lang="en-US" dirty="0"/>
+          </a:p>
+          <a:p>
+            <a:pPr marL="0" indent="0">
+              <a:buNone/>
+            </a:pPr>
+            <a:r>
+              <a:rPr lang="en-US" dirty="0"/>
+              <a:t>	</a:t>
+            </a:r>
+            <a:r>
+              <a:rPr lang="en-US" dirty="0" err="1"/>
+              <a:t>printf</a:t>
+            </a:r>
+            <a:r>
+              <a:rPr lang="en-US" dirty="0"/>
+              <a:t>("%d %s\n",</a:t>
+            </a:r>
+            <a:r>
+              <a:rPr lang="en-US" dirty="0" err="1"/>
+              <a:t>operator_add_money,add_money</a:t>
+            </a:r>
+            <a:r>
+              <a:rPr lang="en-US" dirty="0"/>
+              <a:t>);</a:t>
+            </a:r>
+          </a:p>
+          <a:p>
+            <a:pPr marL="0" indent="0">
+              <a:buNone/>
+            </a:pPr>
+            <a:r>
+              <a:rPr lang="en-US" dirty="0"/>
+              <a:t>	</a:t>
+            </a:r>
+            <a:r>
+              <a:rPr lang="en-US" dirty="0" err="1"/>
+              <a:t>printf</a:t>
+            </a:r>
+            <a:r>
+              <a:rPr lang="en-US" dirty="0"/>
+              <a:t>("%d %s\n",</a:t>
+            </a:r>
+            <a:r>
+              <a:rPr lang="en-US" dirty="0" err="1"/>
+              <a:t>operator_withdraw_money</a:t>
+            </a:r>
+            <a:r>
+              <a:rPr lang="en-US" dirty="0"/>
+              <a:t> ,</a:t>
+            </a:r>
+            <a:r>
+              <a:rPr lang="en-US" dirty="0" err="1"/>
+              <a:t>withdraw_money</a:t>
+            </a:r>
+            <a:r>
+              <a:rPr lang="en-US" dirty="0"/>
+              <a:t>);</a:t>
+            </a:r>
+          </a:p>
+          <a:p>
+            <a:pPr marL="0" indent="0">
+              <a:buNone/>
+            </a:pPr>
+            <a:r>
+              <a:rPr lang="en-US" dirty="0"/>
+              <a:t>	</a:t>
+            </a:r>
+            <a:r>
+              <a:rPr lang="en-US" dirty="0" err="1"/>
+              <a:t>printf</a:t>
+            </a:r>
+            <a:r>
+              <a:rPr lang="en-US" dirty="0"/>
+              <a:t>("%d %s\n",</a:t>
+            </a:r>
+            <a:r>
+              <a:rPr lang="en-US" dirty="0" err="1"/>
+              <a:t>operator_exit</a:t>
+            </a:r>
+            <a:r>
+              <a:rPr lang="en-US" dirty="0"/>
+              <a:t>, exit);</a:t>
+            </a:r>
+          </a:p>
+          <a:p>
+            <a:pPr marL="0" indent="0">
+              <a:buNone/>
+            </a:pPr>
+            <a:r>
+              <a:rPr lang="en-US" dirty="0"/>
+              <a:t>	</a:t>
+            </a:r>
+            <a:r>
+              <a:rPr lang="en-US" dirty="0" err="1"/>
+              <a:t>scanf</a:t>
+            </a:r>
+            <a:r>
+              <a:rPr lang="en-US" dirty="0"/>
+              <a:t>("%d",&amp;</a:t>
+            </a:r>
+            <a:r>
+              <a:rPr lang="en-US" dirty="0" err="1"/>
+              <a:t>numberOfOperation</a:t>
+            </a:r>
+            <a:r>
+              <a:rPr lang="en-US" dirty="0"/>
+              <a:t>);</a:t>
+            </a:r>
+          </a:p>
+          <a:p>
+            <a:pPr marL="0" indent="0">
+              <a:buNone/>
+            </a:pPr>
+            <a:r>
+              <a:rPr lang="en-US" dirty="0"/>
+              <a:t>	</a:t>
+            </a:r>
+            <a:r>
+              <a:rPr lang="en-US" dirty="0" err="1"/>
+              <a:t>int</a:t>
+            </a:r>
+            <a:r>
+              <a:rPr lang="en-US" dirty="0"/>
+              <a:t> result = 0;</a:t>
+            </a:r>
+          </a:p>
+          <a:p>
+            <a:pPr marL="0" indent="0">
+              <a:buNone/>
+            </a:pPr>
+            <a:r>
+              <a:rPr lang="en-US" dirty="0"/>
+              <a:t>	</a:t>
+            </a:r>
+            <a:r>
+              <a:rPr lang="en-US" dirty="0" err="1"/>
+              <a:t>int</a:t>
+            </a:r>
+            <a:r>
+              <a:rPr lang="en-US" dirty="0"/>
+              <a:t> balance = 0;</a:t>
+            </a:r>
+            <a:endParaRPr lang="ru-RU" dirty="0"/>
+          </a:p>
+        </p:txBody>
+      </p:sp>
+    </p:spTree>
+    <p:extLst>
+      <p:ext uri="{BB962C8B-B14F-4D97-AF65-F5344CB8AC3E}">
+        <p14:creationId xmlns:p14="http://schemas.microsoft.com/office/powerpoint/2010/main" val="1417383679"/>
+      </p:ext>
+    </p:extLst>
+  </p:cSld>
+  <p:clrMapOvr>
+    <a:masterClrMapping/>
+  </p:clrMapOvr>
+</p:sld>
+</file>
+
+<file path=ppt/slides/slide25.xml><?xml version="1.0" encoding="utf-8"?>
+<p:sld xmlns:a="http://schemas.openxmlformats.org/drawingml/2006/main" xmlns:r="http://schemas.openxmlformats.org/officeDocument/2006/relationships" xmlns:p="http://schemas.openxmlformats.org/presentationml/2006/main">
+  <p:cSld>
+    <p:spTree>
+      <p:nvGrpSpPr>
+        <p:cNvPr id="1" name=""/>
+        <p:cNvGrpSpPr/>
+        <p:nvPr/>
+      </p:nvGrpSpPr>
+      <p:grpSpPr>
+        <a:xfrm>
+          <a:off x="0" y="0"/>
+          <a:ext cx="0" cy="0"/>
+          <a:chOff x="0" y="0"/>
+          <a:chExt cx="0" cy="0"/>
+        </a:xfrm>
+      </p:grpSpPr>
+      <p:sp>
+        <p:nvSpPr>
+          <p:cNvPr id="2" name="Заголовок 1"/>
+          <p:cNvSpPr>
+            <a:spLocks noGrp="1"/>
+          </p:cNvSpPr>
+          <p:nvPr>
+            <p:ph type="title"/>
+          </p:nvPr>
+        </p:nvSpPr>
+        <p:spPr/>
+        <p:txBody>
+          <a:bodyPr/>
+          <a:lstStyle/>
+          <a:p>
+            <a:endParaRPr lang="ru-RU"/>
+          </a:p>
+        </p:txBody>
+      </p:sp>
+      <p:sp>
+        <p:nvSpPr>
+          <p:cNvPr id="3" name="Объект 2"/>
+          <p:cNvSpPr>
+            <a:spLocks noGrp="1"/>
+          </p:cNvSpPr>
+          <p:nvPr>
+            <p:ph sz="quarter" idx="1"/>
+          </p:nvPr>
+        </p:nvSpPr>
+        <p:spPr>
+          <a:xfrm>
+            <a:off x="179512" y="0"/>
+            <a:ext cx="8568952" cy="6473952"/>
+          </a:xfrm>
+        </p:spPr>
+        <p:txBody>
+          <a:bodyPr>
+            <a:normAutofit fontScale="70000" lnSpcReduction="20000"/>
+          </a:bodyPr>
+          <a:lstStyle/>
+          <a:p>
+            <a:pPr marL="0" indent="0">
+              <a:buNone/>
+            </a:pPr>
+            <a:r>
+              <a:rPr lang="en-US" dirty="0"/>
+              <a:t>switch(</a:t>
+            </a:r>
+            <a:r>
+              <a:rPr lang="en-US" dirty="0" err="1"/>
+              <a:t>numberOfOperation</a:t>
+            </a:r>
+            <a:r>
+              <a:rPr lang="en-US" dirty="0"/>
+              <a:t>){</a:t>
+            </a:r>
+          </a:p>
+          <a:p>
+            <a:pPr marL="0" indent="0">
+              <a:buNone/>
+            </a:pPr>
+            <a:endParaRPr lang="en-US" dirty="0"/>
+          </a:p>
+          <a:p>
+            <a:pPr marL="0" indent="0">
+              <a:buNone/>
+            </a:pPr>
+            <a:r>
+              <a:rPr lang="en-US" dirty="0"/>
+              <a:t>		case </a:t>
+            </a:r>
+            <a:r>
+              <a:rPr lang="en-US" dirty="0" err="1"/>
+              <a:t>operator_add_money</a:t>
+            </a:r>
+            <a:r>
+              <a:rPr lang="en-US" dirty="0"/>
+              <a:t>:</a:t>
+            </a:r>
+          </a:p>
+          <a:p>
+            <a:pPr marL="0" indent="0">
+              <a:buNone/>
+            </a:pPr>
+            <a:r>
+              <a:rPr lang="en-US" dirty="0"/>
+              <a:t>			</a:t>
+            </a:r>
+            <a:r>
+              <a:rPr lang="en-US" dirty="0" err="1"/>
+              <a:t>printf</a:t>
+            </a:r>
+            <a:r>
+              <a:rPr lang="en-US" dirty="0"/>
+              <a:t>("Enter sum: ");</a:t>
+            </a:r>
+          </a:p>
+          <a:p>
+            <a:pPr marL="0" indent="0">
+              <a:buNone/>
+            </a:pPr>
+            <a:r>
+              <a:rPr lang="en-US" dirty="0"/>
+              <a:t>			</a:t>
+            </a:r>
+            <a:r>
+              <a:rPr lang="en-US" dirty="0" err="1"/>
+              <a:t>scanf</a:t>
+            </a:r>
+            <a:r>
+              <a:rPr lang="en-US" dirty="0"/>
+              <a:t>("%d", &amp;balance);</a:t>
+            </a:r>
+          </a:p>
+          <a:p>
+            <a:pPr marL="0" indent="0">
+              <a:buNone/>
+            </a:pPr>
+            <a:r>
+              <a:rPr lang="en-US" dirty="0"/>
+              <a:t>		result = </a:t>
+            </a:r>
+            <a:r>
+              <a:rPr lang="en-US" dirty="0" err="1"/>
+              <a:t>addMoney</a:t>
+            </a:r>
+            <a:r>
+              <a:rPr lang="en-US" dirty="0"/>
+              <a:t>(balance, </a:t>
+            </a:r>
+            <a:r>
+              <a:rPr lang="en-US" dirty="0" err="1"/>
+              <a:t>totalTransaction</a:t>
+            </a:r>
+            <a:r>
+              <a:rPr lang="en-US" dirty="0"/>
+              <a:t>, </a:t>
+            </a:r>
+            <a:r>
+              <a:rPr lang="en-US" dirty="0" err="1"/>
+              <a:t>currentBalance</a:t>
+            </a:r>
+            <a:r>
+              <a:rPr lang="en-US" dirty="0"/>
+              <a:t>, </a:t>
+            </a:r>
+            <a:r>
+              <a:rPr lang="en-US" dirty="0" err="1"/>
+              <a:t>currentTransaction</a:t>
+            </a:r>
+            <a:r>
+              <a:rPr lang="en-US" dirty="0"/>
+              <a:t>, </a:t>
+            </a:r>
+            <a:r>
+              <a:rPr lang="en-US" dirty="0" err="1"/>
+              <a:t>monthlyQuota</a:t>
+            </a:r>
+            <a:r>
+              <a:rPr lang="en-US" dirty="0"/>
+              <a:t>);</a:t>
+            </a:r>
+          </a:p>
+          <a:p>
+            <a:pPr marL="0" indent="0">
+              <a:buNone/>
+            </a:pPr>
+            <a:r>
+              <a:rPr lang="en-US" dirty="0"/>
+              <a:t>		break;</a:t>
+            </a:r>
+          </a:p>
+          <a:p>
+            <a:pPr marL="0" indent="0">
+              <a:buNone/>
+            </a:pPr>
+            <a:r>
+              <a:rPr lang="en-US" dirty="0"/>
+              <a:t>		case </a:t>
+            </a:r>
+            <a:r>
+              <a:rPr lang="en-US" dirty="0" err="1"/>
+              <a:t>operator_withdraw_money</a:t>
+            </a:r>
+            <a:r>
+              <a:rPr lang="en-US" dirty="0"/>
+              <a:t>:</a:t>
+            </a:r>
+          </a:p>
+          <a:p>
+            <a:pPr marL="0" indent="0">
+              <a:buNone/>
+            </a:pPr>
+            <a:r>
+              <a:rPr lang="en-US" dirty="0"/>
+              <a:t>			</a:t>
+            </a:r>
+            <a:r>
+              <a:rPr lang="en-US" dirty="0" err="1"/>
+              <a:t>printf</a:t>
+            </a:r>
+            <a:r>
+              <a:rPr lang="en-US" dirty="0"/>
+              <a:t>("Enter sum: ");</a:t>
+            </a:r>
+          </a:p>
+          <a:p>
+            <a:pPr marL="0" indent="0">
+              <a:buNone/>
+            </a:pPr>
+            <a:r>
+              <a:rPr lang="en-US" dirty="0"/>
+              <a:t>			</a:t>
+            </a:r>
+            <a:r>
+              <a:rPr lang="en-US" dirty="0" err="1"/>
+              <a:t>scanf</a:t>
+            </a:r>
+            <a:r>
+              <a:rPr lang="en-US" dirty="0"/>
+              <a:t>("%d", &amp;balance);</a:t>
+            </a:r>
+          </a:p>
+          <a:p>
+            <a:pPr marL="0" indent="0">
+              <a:buNone/>
+            </a:pPr>
+            <a:r>
+              <a:rPr lang="en-US" dirty="0"/>
+              <a:t>		result = </a:t>
+            </a:r>
+            <a:r>
+              <a:rPr lang="en-US" dirty="0" err="1"/>
+              <a:t>withdrawMoney</a:t>
+            </a:r>
+            <a:r>
+              <a:rPr lang="en-US" dirty="0"/>
+              <a:t>(balance, </a:t>
+            </a:r>
+            <a:r>
+              <a:rPr lang="en-US" dirty="0" err="1"/>
+              <a:t>totalTransaction</a:t>
+            </a:r>
+            <a:r>
+              <a:rPr lang="en-US" dirty="0"/>
+              <a:t>, </a:t>
+            </a:r>
+            <a:r>
+              <a:rPr lang="en-US" dirty="0" err="1"/>
+              <a:t>currentBalance</a:t>
+            </a:r>
+            <a:r>
+              <a:rPr lang="en-US" dirty="0"/>
+              <a:t>, </a:t>
+            </a:r>
+            <a:r>
+              <a:rPr lang="en-US" dirty="0" err="1"/>
+              <a:t>currentTransaction</a:t>
+            </a:r>
+            <a:r>
+              <a:rPr lang="en-US" dirty="0"/>
+              <a:t>, </a:t>
+            </a:r>
+            <a:r>
+              <a:rPr lang="en-US" dirty="0" err="1"/>
+              <a:t>monthlyQuota</a:t>
+            </a:r>
+            <a:r>
+              <a:rPr lang="en-US" dirty="0"/>
+              <a:t>);</a:t>
+            </a:r>
+          </a:p>
+          <a:p>
+            <a:pPr marL="0" indent="0">
+              <a:buNone/>
+            </a:pPr>
+            <a:r>
+              <a:rPr lang="en-US" dirty="0"/>
+              <a:t>		break;</a:t>
+            </a:r>
+          </a:p>
+          <a:p>
+            <a:pPr marL="0" indent="0">
+              <a:buNone/>
+            </a:pPr>
+            <a:r>
+              <a:rPr lang="en-US" dirty="0"/>
+              <a:t>	case </a:t>
+            </a:r>
+            <a:r>
+              <a:rPr lang="en-US" dirty="0" err="1"/>
+              <a:t>operator_exit</a:t>
+            </a:r>
+            <a:r>
+              <a:rPr lang="en-US" dirty="0"/>
+              <a:t>:</a:t>
+            </a:r>
+          </a:p>
+          <a:p>
+            <a:pPr marL="0" indent="0">
+              <a:buNone/>
+            </a:pPr>
+            <a:r>
+              <a:rPr lang="en-US" dirty="0"/>
+              <a:t>		</a:t>
+            </a:r>
+            <a:r>
+              <a:rPr lang="en-US" dirty="0" err="1"/>
+              <a:t>printf</a:t>
+            </a:r>
+            <a:r>
+              <a:rPr lang="en-US" dirty="0"/>
+              <a:t>("Good bye!\n");</a:t>
+            </a:r>
+          </a:p>
+          <a:p>
+            <a:pPr marL="0" indent="0">
+              <a:buNone/>
+            </a:pPr>
+            <a:r>
+              <a:rPr lang="en-US" dirty="0"/>
+              <a:t>		</a:t>
+            </a:r>
+            <a:r>
+              <a:rPr lang="en-US" dirty="0" err="1"/>
+              <a:t>roleIdentified</a:t>
+            </a:r>
+            <a:r>
+              <a:rPr lang="en-US" dirty="0"/>
+              <a:t>=UNKNOWN;</a:t>
+            </a:r>
+          </a:p>
+          <a:p>
+            <a:pPr marL="0" indent="0">
+              <a:buNone/>
+            </a:pPr>
+            <a:r>
+              <a:rPr lang="en-US" dirty="0"/>
+              <a:t>		</a:t>
+            </a:r>
+            <a:r>
+              <a:rPr lang="en-US" dirty="0" err="1"/>
+              <a:t>isExit</a:t>
+            </a:r>
+            <a:r>
+              <a:rPr lang="en-US" dirty="0"/>
+              <a:t>=true;</a:t>
+            </a:r>
+          </a:p>
+          <a:p>
+            <a:pPr marL="0" indent="0">
+              <a:buNone/>
+            </a:pPr>
+            <a:r>
+              <a:rPr lang="en-US" dirty="0"/>
+              <a:t>		break;</a:t>
+            </a:r>
+          </a:p>
+          <a:p>
+            <a:pPr marL="0" indent="0">
+              <a:buNone/>
+            </a:pPr>
+            <a:r>
+              <a:rPr lang="en-US" dirty="0"/>
+              <a:t>	default:</a:t>
+            </a:r>
+          </a:p>
+          <a:p>
+            <a:pPr marL="0" indent="0">
+              <a:buNone/>
+            </a:pPr>
+            <a:r>
+              <a:rPr lang="en-US" dirty="0"/>
+              <a:t>		</a:t>
+            </a:r>
+            <a:r>
+              <a:rPr lang="en-US" dirty="0" err="1"/>
+              <a:t>printf</a:t>
+            </a:r>
+            <a:r>
+              <a:rPr lang="en-US" dirty="0"/>
+              <a:t>("Unknown </a:t>
+            </a:r>
+            <a:r>
+              <a:rPr lang="en-US" dirty="0" err="1"/>
+              <a:t>operation.Please</a:t>
+            </a:r>
+            <a:r>
+              <a:rPr lang="en-US" dirty="0"/>
+              <a:t>, try again.\n");</a:t>
+            </a:r>
+          </a:p>
+          <a:p>
+            <a:pPr marL="0" indent="0">
+              <a:buNone/>
+            </a:pPr>
+            <a:r>
+              <a:rPr lang="en-US" dirty="0"/>
+              <a:t>		break;</a:t>
+            </a:r>
+          </a:p>
+          <a:p>
+            <a:pPr marL="0" indent="0">
+              <a:buNone/>
+            </a:pPr>
+            <a:r>
+              <a:rPr lang="en-US" dirty="0"/>
+              <a:t>	}</a:t>
+            </a:r>
+            <a:endParaRPr lang="ru-RU" dirty="0"/>
+          </a:p>
+        </p:txBody>
+      </p:sp>
+    </p:spTree>
+    <p:extLst>
+      <p:ext uri="{BB962C8B-B14F-4D97-AF65-F5344CB8AC3E}">
+        <p14:creationId xmlns:p14="http://schemas.microsoft.com/office/powerpoint/2010/main" val="3351492554"/>
+      </p:ext>
+    </p:extLst>
+  </p:cSld>
+  <p:clrMapOvr>
+    <a:masterClrMapping/>
+  </p:clrMapOvr>
+</p:sld>
+</file>
+
+<file path=ppt/slides/slide26.xml><?xml version="1.0" encoding="utf-8"?>
+<p:sld xmlns:a="http://schemas.openxmlformats.org/drawingml/2006/main" xmlns:r="http://schemas.openxmlformats.org/officeDocument/2006/relationships" xmlns:p="http://schemas.openxmlformats.org/presentationml/2006/main">
+  <p:cSld>
+    <p:spTree>
+      <p:nvGrpSpPr>
+        <p:cNvPr id="1" name=""/>
+        <p:cNvGrpSpPr/>
+        <p:nvPr/>
+      </p:nvGrpSpPr>
+      <p:grpSpPr>
+        <a:xfrm>
+          <a:off x="0" y="0"/>
+          <a:ext cx="0" cy="0"/>
+          <a:chOff x="0" y="0"/>
+          <a:chExt cx="0" cy="0"/>
+        </a:xfrm>
+      </p:grpSpPr>
+      <p:sp>
+        <p:nvSpPr>
+          <p:cNvPr id="2" name="Заголовок 1"/>
+          <p:cNvSpPr>
+            <a:spLocks noGrp="1"/>
+          </p:cNvSpPr>
+          <p:nvPr>
+            <p:ph type="title"/>
+          </p:nvPr>
+        </p:nvSpPr>
+        <p:spPr/>
+        <p:txBody>
+          <a:bodyPr/>
+          <a:lstStyle/>
+          <a:p>
+            <a:endParaRPr lang="ru-RU"/>
+          </a:p>
+        </p:txBody>
+      </p:sp>
+      <p:sp>
+        <p:nvSpPr>
+          <p:cNvPr id="3" name="Объект 2"/>
+          <p:cNvSpPr>
+            <a:spLocks noGrp="1"/>
+          </p:cNvSpPr>
+          <p:nvPr>
+            <p:ph sz="quarter" idx="1"/>
+          </p:nvPr>
+        </p:nvSpPr>
+        <p:spPr/>
+        <p:txBody>
+          <a:bodyPr>
+            <a:normAutofit fontScale="62500" lnSpcReduction="20000"/>
+          </a:bodyPr>
+          <a:lstStyle/>
+          <a:p>
+            <a:pPr marL="0" indent="0">
+              <a:buNone/>
+            </a:pPr>
+            <a:r>
+              <a:rPr lang="en-US" dirty="0"/>
+              <a:t>if(!</a:t>
+            </a:r>
+            <a:r>
+              <a:rPr lang="en-US" dirty="0" err="1"/>
+              <a:t>isExit</a:t>
+            </a:r>
+            <a:r>
+              <a:rPr lang="en-US" dirty="0"/>
+              <a:t> &amp;&amp; result == 0){</a:t>
+            </a:r>
+          </a:p>
+          <a:p>
+            <a:pPr marL="0" indent="0">
+              <a:buNone/>
+            </a:pPr>
+            <a:r>
+              <a:rPr lang="en-US" dirty="0"/>
+              <a:t>		char </a:t>
+            </a:r>
+            <a:r>
+              <a:rPr lang="en-US" dirty="0" err="1"/>
+              <a:t>bufferUpdate</a:t>
+            </a:r>
+            <a:r>
+              <a:rPr lang="en-US" dirty="0"/>
+              <a:t>[500];</a:t>
+            </a:r>
+          </a:p>
+          <a:p>
+            <a:pPr marL="0" indent="0">
+              <a:buNone/>
+            </a:pPr>
+            <a:r>
+              <a:rPr lang="en-US" dirty="0"/>
+              <a:t>		</a:t>
+            </a:r>
+            <a:r>
+              <a:rPr lang="en-US" dirty="0" err="1"/>
+              <a:t>sprintf</a:t>
+            </a:r>
+            <a:r>
+              <a:rPr lang="en-US" dirty="0"/>
+              <a:t>(</a:t>
+            </a:r>
+            <a:r>
+              <a:rPr lang="en-US" dirty="0" err="1"/>
+              <a:t>bufferUpdate</a:t>
+            </a:r>
+            <a:r>
+              <a:rPr lang="en-US" dirty="0"/>
+              <a:t>,"update account set balance='%d', </a:t>
+            </a:r>
+            <a:r>
+              <a:rPr lang="en-US" dirty="0" err="1"/>
+              <a:t>current_transactions</a:t>
+            </a:r>
+            <a:r>
+              <a:rPr lang="en-US" dirty="0"/>
+              <a:t>='%d' where </a:t>
+            </a:r>
+            <a:r>
+              <a:rPr lang="en-US" dirty="0" err="1"/>
+              <a:t>account_id</a:t>
+            </a:r>
+            <a:r>
+              <a:rPr lang="en-US" dirty="0"/>
+              <a:t>='%</a:t>
+            </a:r>
+            <a:r>
+              <a:rPr lang="en-US" dirty="0" err="1"/>
+              <a:t>d'",balance</a:t>
+            </a:r>
+            <a:r>
+              <a:rPr lang="en-US" dirty="0"/>
+              <a:t>, </a:t>
+            </a:r>
+            <a:r>
+              <a:rPr lang="en-US" dirty="0" err="1"/>
+              <a:t>currentTransaction</a:t>
+            </a:r>
+            <a:r>
+              <a:rPr lang="en-US" dirty="0"/>
+              <a:t>, </a:t>
+            </a:r>
+            <a:r>
+              <a:rPr lang="en-US" dirty="0" err="1"/>
+              <a:t>idAccount</a:t>
+            </a:r>
+            <a:r>
+              <a:rPr lang="en-US" dirty="0"/>
+              <a:t>);</a:t>
+            </a:r>
+          </a:p>
+          <a:p>
+            <a:pPr marL="0" indent="0">
+              <a:buNone/>
+            </a:pPr>
+            <a:r>
+              <a:rPr lang="en-US" dirty="0"/>
+              <a:t>		sqlite3_exec(conn, "BEGIN TRANSACTION;", NULL, NULL, NULL);</a:t>
+            </a:r>
+          </a:p>
+          <a:p>
+            <a:pPr marL="0" indent="0">
+              <a:buNone/>
+            </a:pPr>
+            <a:r>
+              <a:rPr lang="en-US" dirty="0"/>
+              <a:t>		</a:t>
+            </a:r>
+            <a:r>
+              <a:rPr lang="en-US" dirty="0" err="1"/>
+              <a:t>int</a:t>
+            </a:r>
+            <a:r>
+              <a:rPr lang="en-US" dirty="0"/>
+              <a:t> </a:t>
+            </a:r>
+            <a:r>
+              <a:rPr lang="en-US" dirty="0" err="1"/>
+              <a:t>rc</a:t>
+            </a:r>
+            <a:r>
+              <a:rPr lang="en-US" dirty="0"/>
+              <a:t> = sqlite3_exec(</a:t>
+            </a:r>
+            <a:r>
+              <a:rPr lang="en-US" dirty="0" err="1"/>
+              <a:t>conn,bufferUpdate,NULL,NULL,NULL</a:t>
+            </a:r>
+            <a:r>
+              <a:rPr lang="en-US" dirty="0"/>
+              <a:t>);</a:t>
+            </a:r>
+          </a:p>
+          <a:p>
+            <a:pPr marL="0" indent="0">
+              <a:buNone/>
+            </a:pPr>
+            <a:r>
+              <a:rPr lang="en-US" dirty="0"/>
+              <a:t>		sqlite3_exec(conn, "END TRANSACTION;", NULL, NULL, NULL);</a:t>
+            </a:r>
+          </a:p>
+          <a:p>
+            <a:pPr marL="0" indent="0">
+              <a:buNone/>
+            </a:pPr>
+            <a:r>
+              <a:rPr lang="en-US" dirty="0"/>
+              <a:t>		if(</a:t>
+            </a:r>
+            <a:r>
+              <a:rPr lang="en-US" dirty="0" err="1"/>
+              <a:t>rc</a:t>
+            </a:r>
+            <a:r>
+              <a:rPr lang="en-US" dirty="0"/>
+              <a:t>){</a:t>
+            </a:r>
+          </a:p>
+          <a:p>
+            <a:pPr marL="0" indent="0">
+              <a:buNone/>
+            </a:pPr>
+            <a:r>
+              <a:rPr lang="en-US" dirty="0"/>
+              <a:t>			</a:t>
+            </a:r>
+            <a:r>
+              <a:rPr lang="en-US" dirty="0" err="1"/>
+              <a:t>printf</a:t>
+            </a:r>
+            <a:r>
+              <a:rPr lang="en-US" dirty="0"/>
+              <a:t>("Error");</a:t>
+            </a:r>
+          </a:p>
+          <a:p>
+            <a:pPr marL="0" indent="0">
+              <a:buNone/>
+            </a:pPr>
+            <a:r>
+              <a:rPr lang="en-US" dirty="0"/>
+              <a:t>		}else{</a:t>
+            </a:r>
+          </a:p>
+          <a:p>
+            <a:pPr marL="0" indent="0">
+              <a:buNone/>
+            </a:pPr>
+            <a:r>
+              <a:rPr lang="en-US" dirty="0"/>
+              <a:t>			</a:t>
+            </a:r>
+            <a:r>
+              <a:rPr lang="en-US" dirty="0" err="1"/>
+              <a:t>printf</a:t>
+            </a:r>
+            <a:r>
+              <a:rPr lang="en-US" dirty="0"/>
+              <a:t>("Operation is executed successfully!\n");</a:t>
+            </a:r>
+          </a:p>
+          <a:p>
+            <a:pPr marL="0" indent="0">
+              <a:buNone/>
+            </a:pPr>
+            <a:r>
+              <a:rPr lang="en-US" dirty="0"/>
+              <a:t>		}</a:t>
+            </a:r>
+          </a:p>
+          <a:p>
+            <a:pPr marL="0" indent="0">
+              <a:buNone/>
+            </a:pPr>
+            <a:r>
+              <a:rPr lang="en-US" dirty="0"/>
+              <a:t>	}</a:t>
+            </a:r>
+          </a:p>
+          <a:p>
+            <a:pPr marL="0" indent="0">
+              <a:buNone/>
+            </a:pPr>
+            <a:r>
+              <a:rPr lang="en-US" dirty="0"/>
+              <a:t>	sqlite3_close(conn</a:t>
+            </a:r>
+            <a:r>
+              <a:rPr lang="en-US" dirty="0" smtClean="0"/>
+              <a:t>);</a:t>
+            </a:r>
+            <a:endParaRPr lang="ru-RU" dirty="0" smtClean="0"/>
+          </a:p>
+          <a:p>
+            <a:pPr marL="0" indent="0">
+              <a:buNone/>
+            </a:pPr>
+            <a:r>
+              <a:rPr lang="en-US" smtClean="0"/>
+              <a:t>}</a:t>
+            </a:r>
+            <a:endParaRPr lang="ru-RU" dirty="0"/>
+          </a:p>
+        </p:txBody>
+      </p:sp>
+    </p:spTree>
+    <p:extLst>
+      <p:ext uri="{BB962C8B-B14F-4D97-AF65-F5344CB8AC3E}">
+        <p14:creationId xmlns:p14="http://schemas.microsoft.com/office/powerpoint/2010/main" val="4096456834"/>
+      </p:ext>
+    </p:extLst>
+  </p:cSld>
+  <p:clrMapOvr>
+    <a:masterClrMapping/>
+  </p:clrMapOvr>
 </p:sld>
 </file>
 

</xml_diff>